<commit_message>
Implement AddMedicinePageViewModel, Change Image quality when saving, Update UI
Works:
- Implement AddMedicinePageViewModel
- Reduce image quality to 30%
- Update UI: Add Supplier column to MedicineManagementPage, Change default_medicine_image

Signed-off-by: PhuocTran95 <nguyenbaphuoctran@gmail.com>
Change-Id: I3f82ef630d34dc6e7c0ebe2b75d22787fa3ad60e
</commit_message>
<xml_diff>
--- a/Pharmacy/UXUI/PagesUI.pptx
+++ b/Pharmacy/UXUI/PagesUI.pptx
@@ -234,7 +234,7 @@
           <a:p>
             <a:fld id="{E193EC3E-9EBC-4FB4-91A0-D81688C87301}" type="datetimeFigureOut">
               <a:rPr lang="en-US" smtClean="0"/>
-              <a:t>12/13/2020</a:t>
+              <a:t>1/7/2021</a:t>
             </a:fld>
             <a:endParaRPr lang="en-US"/>
           </a:p>
@@ -1436,7 +1436,7 @@
           <a:p>
             <a:fld id="{EA91886C-002B-40DC-BBAF-4CA608631BA0}" type="datetimeFigureOut">
               <a:rPr lang="en-US" smtClean="0"/>
-              <a:t>12/13/2020</a:t>
+              <a:t>1/7/2021</a:t>
             </a:fld>
             <a:endParaRPr lang="en-US"/>
           </a:p>
@@ -1604,7 +1604,7 @@
           <a:p>
             <a:fld id="{EA91886C-002B-40DC-BBAF-4CA608631BA0}" type="datetimeFigureOut">
               <a:rPr lang="en-US" smtClean="0"/>
-              <a:t>12/13/2020</a:t>
+              <a:t>1/7/2021</a:t>
             </a:fld>
             <a:endParaRPr lang="en-US"/>
           </a:p>
@@ -1782,7 +1782,7 @@
           <a:p>
             <a:fld id="{EA91886C-002B-40DC-BBAF-4CA608631BA0}" type="datetimeFigureOut">
               <a:rPr lang="en-US" smtClean="0"/>
-              <a:t>12/13/2020</a:t>
+              <a:t>1/7/2021</a:t>
             </a:fld>
             <a:endParaRPr lang="en-US"/>
           </a:p>
@@ -1950,7 +1950,7 @@
           <a:p>
             <a:fld id="{EA91886C-002B-40DC-BBAF-4CA608631BA0}" type="datetimeFigureOut">
               <a:rPr lang="en-US" smtClean="0"/>
-              <a:t>12/13/2020</a:t>
+              <a:t>1/7/2021</a:t>
             </a:fld>
             <a:endParaRPr lang="en-US"/>
           </a:p>
@@ -2195,7 +2195,7 @@
           <a:p>
             <a:fld id="{EA91886C-002B-40DC-BBAF-4CA608631BA0}" type="datetimeFigureOut">
               <a:rPr lang="en-US" smtClean="0"/>
-              <a:t>12/13/2020</a:t>
+              <a:t>1/7/2021</a:t>
             </a:fld>
             <a:endParaRPr lang="en-US"/>
           </a:p>
@@ -2480,7 +2480,7 @@
           <a:p>
             <a:fld id="{EA91886C-002B-40DC-BBAF-4CA608631BA0}" type="datetimeFigureOut">
               <a:rPr lang="en-US" smtClean="0"/>
-              <a:t>12/13/2020</a:t>
+              <a:t>1/7/2021</a:t>
             </a:fld>
             <a:endParaRPr lang="en-US"/>
           </a:p>
@@ -2899,7 +2899,7 @@
           <a:p>
             <a:fld id="{EA91886C-002B-40DC-BBAF-4CA608631BA0}" type="datetimeFigureOut">
               <a:rPr lang="en-US" smtClean="0"/>
-              <a:t>12/13/2020</a:t>
+              <a:t>1/7/2021</a:t>
             </a:fld>
             <a:endParaRPr lang="en-US"/>
           </a:p>
@@ -3016,7 +3016,7 @@
           <a:p>
             <a:fld id="{EA91886C-002B-40DC-BBAF-4CA608631BA0}" type="datetimeFigureOut">
               <a:rPr lang="en-US" smtClean="0"/>
-              <a:t>12/13/2020</a:t>
+              <a:t>1/7/2021</a:t>
             </a:fld>
             <a:endParaRPr lang="en-US"/>
           </a:p>
@@ -3111,7 +3111,7 @@
           <a:p>
             <a:fld id="{EA91886C-002B-40DC-BBAF-4CA608631BA0}" type="datetimeFigureOut">
               <a:rPr lang="en-US" smtClean="0"/>
-              <a:t>12/13/2020</a:t>
+              <a:t>1/7/2021</a:t>
             </a:fld>
             <a:endParaRPr lang="en-US"/>
           </a:p>
@@ -3386,7 +3386,7 @@
           <a:p>
             <a:fld id="{EA91886C-002B-40DC-BBAF-4CA608631BA0}" type="datetimeFigureOut">
               <a:rPr lang="en-US" smtClean="0"/>
-              <a:t>12/13/2020</a:t>
+              <a:t>1/7/2021</a:t>
             </a:fld>
             <a:endParaRPr lang="en-US"/>
           </a:p>
@@ -3638,7 +3638,7 @@
           <a:p>
             <a:fld id="{EA91886C-002B-40DC-BBAF-4CA608631BA0}" type="datetimeFigureOut">
               <a:rPr lang="en-US" smtClean="0"/>
-              <a:t>12/13/2020</a:t>
+              <a:t>1/7/2021</a:t>
             </a:fld>
             <a:endParaRPr lang="en-US"/>
           </a:p>
@@ -3849,7 +3849,7 @@
           <a:p>
             <a:fld id="{EA91886C-002B-40DC-BBAF-4CA608631BA0}" type="datetimeFigureOut">
               <a:rPr lang="en-US" smtClean="0"/>
-              <a:t>12/13/2020</a:t>
+              <a:t>1/7/2021</a:t>
             </a:fld>
             <a:endParaRPr lang="en-US"/>
           </a:p>
@@ -43599,14 +43599,14 @@
           <p:nvPr>
             <p:extLst>
               <p:ext uri="{D42A27DB-BD31-4B8C-83A1-F6EECF244321}">
-                <p14:modId xmlns:p14="http://schemas.microsoft.com/office/powerpoint/2010/main" val="2543291872"/>
+                <p14:modId xmlns:p14="http://schemas.microsoft.com/office/powerpoint/2010/main" val="815096880"/>
               </p:ext>
             </p:extLst>
           </p:nvPr>
         </p:nvGraphicFramePr>
         <p:xfrm>
           <a:off x="532704" y="1905000"/>
-          <a:ext cx="8458896" cy="3339590"/>
+          <a:ext cx="8458898" cy="3339590"/>
         </p:xfrm>
         <a:graphic>
           <a:graphicData uri="http://schemas.openxmlformats.org/drawingml/2006/table">
@@ -43615,42 +43615,49 @@
                 <a:tableStyleId>{5C22544A-7EE6-4342-B048-85BDC9FD1C3A}</a:tableStyleId>
               </a:tblPr>
               <a:tblGrid>
-                <a:gridCol w="1409816">
+                <a:gridCol w="1208414">
                   <a:extLst>
                     <a:ext uri="{9D8B030D-6E8A-4147-A177-3AD203B41FA5}">
                       <a16:colId xmlns:a16="http://schemas.microsoft.com/office/drawing/2014/main" val="3679797539"/>
                     </a:ext>
                   </a:extLst>
                 </a:gridCol>
-                <a:gridCol w="1409816">
+                <a:gridCol w="1208414">
                   <a:extLst>
                     <a:ext uri="{9D8B030D-6E8A-4147-A177-3AD203B41FA5}">
                       <a16:colId xmlns:a16="http://schemas.microsoft.com/office/drawing/2014/main" val="4188008786"/>
                     </a:ext>
                   </a:extLst>
                 </a:gridCol>
-                <a:gridCol w="1409816">
+                <a:gridCol w="1208414">
                   <a:extLst>
                     <a:ext uri="{9D8B030D-6E8A-4147-A177-3AD203B41FA5}">
                       <a16:colId xmlns:a16="http://schemas.microsoft.com/office/drawing/2014/main" val="240713644"/>
                     </a:ext>
                   </a:extLst>
                 </a:gridCol>
-                <a:gridCol w="1409816">
+                <a:gridCol w="1208414">
+                  <a:extLst>
+                    <a:ext uri="{9D8B030D-6E8A-4147-A177-3AD203B41FA5}">
+                      <a16:colId xmlns:a16="http://schemas.microsoft.com/office/drawing/2014/main" val="2702378126"/>
+                    </a:ext>
+                  </a:extLst>
+                </a:gridCol>
+                <a:gridCol w="1208414">
                   <a:extLst>
                     <a:ext uri="{9D8B030D-6E8A-4147-A177-3AD203B41FA5}">
                       <a16:colId xmlns:a16="http://schemas.microsoft.com/office/drawing/2014/main" val="3214238948"/>
                     </a:ext>
                   </a:extLst>
                 </a:gridCol>
-                <a:gridCol w="1409816">
+                <a:gridCol w="1208414">
                   <a:extLst>
                     <a:ext uri="{9D8B030D-6E8A-4147-A177-3AD203B41FA5}">
                       <a16:colId xmlns:a16="http://schemas.microsoft.com/office/drawing/2014/main" val="1291486487"/>
                     </a:ext>
                   </a:extLst>
                 </a:gridCol>
-                <a:gridCol w="1409816">
+                <a:gridCol w="1208414">
                   <a:extLst>
                     <a:ext uri="{9D8B030D-6E8A-4147-A177-3AD203B41FA5}">
                       <a16:colId xmlns:a16="http://schemas.microsoft.com/office/drawing/2014/main" val="3117914522"/>
@@ -43722,6 +43729,43 @@
                       <a:r>
                         <a:rPr lang="en-US" sz="1200" dirty="0" err="1"/>
                         <a:t>thuốc</a:t>
+                      </a:r>
+                      <a:endParaRPr lang="en-US" sz="1200" dirty="0"/>
+                    </a:p>
+                  </a:txBody>
+                  <a:tcPr anchor="ctr">
+                    <a:solidFill>
+                      <a:schemeClr val="bg1">
+                        <a:lumMod val="50000"/>
+                      </a:schemeClr>
+                    </a:solidFill>
+                  </a:tcPr>
+                </a:tc>
+                <a:tc>
+                  <a:txBody>
+                    <a:bodyPr/>
+                    <a:lstStyle/>
+                    <a:p>
+                      <a:pPr algn="ctr"/>
+                      <a:r>
+                        <a:rPr lang="en-US" sz="1200" dirty="0" err="1"/>
+                        <a:t>Nhà</a:t>
+                      </a:r>
+                      <a:r>
+                        <a:rPr lang="en-US" sz="1200" dirty="0"/>
+                        <a:t> </a:t>
+                      </a:r>
+                      <a:r>
+                        <a:rPr lang="en-US" sz="1200" dirty="0" err="1"/>
+                        <a:t>cung</a:t>
+                      </a:r>
+                      <a:r>
+                        <a:rPr lang="en-US" sz="1200" dirty="0"/>
+                        <a:t> </a:t>
+                      </a:r>
+                      <a:r>
+                        <a:rPr lang="en-US" sz="1200" dirty="0" err="1"/>
+                        <a:t>cấp</a:t>
                       </a:r>
                       <a:endParaRPr lang="en-US" sz="1200" dirty="0"/>
                     </a:p>
@@ -43904,6 +43948,46 @@
                     <a:p>
                       <a:pPr algn="ctr"/>
                       <a:r>
+                        <a:rPr lang="en-US" sz="1200" dirty="0" err="1"/>
+                        <a:t>Nhà</a:t>
+                      </a:r>
+                      <a:r>
+                        <a:rPr lang="en-US" sz="1200" dirty="0"/>
+                        <a:t> </a:t>
+                      </a:r>
+                      <a:r>
+                        <a:rPr lang="en-US" sz="1200" dirty="0" err="1"/>
+                        <a:t>cung</a:t>
+                      </a:r>
+                      <a:r>
+                        <a:rPr lang="en-US" sz="1200" dirty="0"/>
+                        <a:t> </a:t>
+                      </a:r>
+                      <a:r>
+                        <a:rPr lang="en-US" sz="1200" dirty="0" err="1"/>
+                        <a:t>cấp</a:t>
+                      </a:r>
+                      <a:r>
+                        <a:rPr lang="en-US" sz="1200" dirty="0"/>
+                        <a:t> 1</a:t>
+                      </a:r>
+                    </a:p>
+                  </a:txBody>
+                  <a:tcPr anchor="ctr">
+                    <a:solidFill>
+                      <a:schemeClr val="bg1">
+                        <a:lumMod val="95000"/>
+                      </a:schemeClr>
+                    </a:solidFill>
+                  </a:tcPr>
+                </a:tc>
+                <a:tc>
+                  <a:txBody>
+                    <a:bodyPr/>
+                    <a:lstStyle/>
+                    <a:p>
+                      <a:pPr algn="ctr"/>
+                      <a:r>
                         <a:rPr lang="en-US" sz="1200" dirty="0"/>
                         <a:t>10,000</a:t>
                       </a:r>
@@ -44066,6 +44150,62 @@
                         <a:defRPr/>
                       </a:pPr>
                       <a:r>
+                        <a:rPr lang="en-US" sz="1200" dirty="0" err="1"/>
+                        <a:t>Nhà</a:t>
+                      </a:r>
+                      <a:r>
+                        <a:rPr lang="en-US" sz="1200" dirty="0"/>
+                        <a:t> </a:t>
+                      </a:r>
+                      <a:r>
+                        <a:rPr lang="en-US" sz="1200" dirty="0" err="1"/>
+                        <a:t>cung</a:t>
+                      </a:r>
+                      <a:r>
+                        <a:rPr lang="en-US" sz="1200" dirty="0"/>
+                        <a:t> </a:t>
+                      </a:r>
+                      <a:r>
+                        <a:rPr lang="en-US" sz="1200" dirty="0" err="1"/>
+                        <a:t>cấp</a:t>
+                      </a:r>
+                      <a:r>
+                        <a:rPr lang="en-US" sz="1200" dirty="0"/>
+                        <a:t> 2</a:t>
+                      </a:r>
+                    </a:p>
+                  </a:txBody>
+                  <a:tcPr anchor="ctr">
+                    <a:solidFill>
+                      <a:schemeClr val="bg1">
+                        <a:lumMod val="95000"/>
+                      </a:schemeClr>
+                    </a:solidFill>
+                  </a:tcPr>
+                </a:tc>
+                <a:tc>
+                  <a:txBody>
+                    <a:bodyPr/>
+                    <a:lstStyle/>
+                    <a:p>
+                      <a:pPr marL="0" marR="0" lvl="0" indent="0" algn="ctr" defTabSz="914400" rtl="0" eaLnBrk="1" fontAlgn="auto" latinLnBrk="0" hangingPunct="1">
+                        <a:lnSpc>
+                          <a:spcPct val="100000"/>
+                        </a:lnSpc>
+                        <a:spcBef>
+                          <a:spcPts val="0"/>
+                        </a:spcBef>
+                        <a:spcAft>
+                          <a:spcPts val="0"/>
+                        </a:spcAft>
+                        <a:buClrTx/>
+                        <a:buSzTx/>
+                        <a:buFontTx/>
+                        <a:buNone/>
+                        <a:tabLst/>
+                        <a:defRPr/>
+                      </a:pPr>
+                      <a:r>
                         <a:rPr lang="en-US" sz="1200" dirty="0"/>
                         <a:t>3,000</a:t>
                       </a:r>
@@ -44153,7 +44293,7 @@
         </p:blipFill>
         <p:spPr>
           <a:xfrm>
-            <a:off x="7713801" y="3122310"/>
+            <a:off x="7848600" y="3122310"/>
             <a:ext cx="304800" cy="304800"/>
           </a:xfrm>
           <a:prstGeom prst="rect">
@@ -44189,7 +44329,7 @@
         </p:blipFill>
         <p:spPr>
           <a:xfrm>
-            <a:off x="8106229" y="3122310"/>
+            <a:off x="8241028" y="3122310"/>
             <a:ext cx="304800" cy="304800"/>
           </a:xfrm>
           <a:prstGeom prst="rect">
@@ -44560,7 +44700,7 @@
         </p:blipFill>
         <p:spPr>
           <a:xfrm>
-            <a:off x="8509543" y="3082232"/>
+            <a:off x="8644342" y="3082232"/>
             <a:ext cx="384956" cy="384956"/>
           </a:xfrm>
           <a:prstGeom prst="rect">
@@ -44595,7 +44735,7 @@
         </p:blipFill>
         <p:spPr>
           <a:xfrm>
-            <a:off x="7710173" y="4419600"/>
+            <a:off x="7848600" y="4419600"/>
             <a:ext cx="304800" cy="304800"/>
           </a:xfrm>
           <a:prstGeom prst="rect">
@@ -44631,7 +44771,7 @@
         </p:blipFill>
         <p:spPr>
           <a:xfrm>
-            <a:off x="8102601" y="4419600"/>
+            <a:off x="8241028" y="4419600"/>
             <a:ext cx="304800" cy="304800"/>
           </a:xfrm>
           <a:prstGeom prst="rect">
@@ -44666,7 +44806,7 @@
         </p:blipFill>
         <p:spPr>
           <a:xfrm>
-            <a:off x="8505915" y="4379522"/>
+            <a:off x="8644342" y="4379522"/>
             <a:ext cx="384956" cy="384956"/>
           </a:xfrm>
           <a:prstGeom prst="rect">

</xml_diff>

<commit_message>
Implement ModifyMedicinePage, Update filter logic of MedicineManagementPage, Update UI
Works:
- Implement ModifyMedicinePage
- Update filter logic of MedicineManagementPage (using Predicate)
- Remove Exp column of Warehouse (ModifyMedicinePage, WarehouseManagement)

Signed-off-by: PhuocTran95 <nguyenbaphuoctran@gmail.com>
Change-Id: I9f80ee7b8e83b4184ac06cb26a96c0a2dbe8ef68
</commit_message>
<xml_diff>
--- a/Pharmacy/UXUI/PagesUI.pptx
+++ b/Pharmacy/UXUI/PagesUI.pptx
@@ -234,7 +234,7 @@
           <a:p>
             <a:fld id="{E193EC3E-9EBC-4FB4-91A0-D81688C87301}" type="datetimeFigureOut">
               <a:rPr lang="en-US" smtClean="0"/>
-              <a:t>1/7/2021</a:t>
+              <a:t>1/8/2021</a:t>
             </a:fld>
             <a:endParaRPr lang="en-US"/>
           </a:p>
@@ -1436,7 +1436,7 @@
           <a:p>
             <a:fld id="{EA91886C-002B-40DC-BBAF-4CA608631BA0}" type="datetimeFigureOut">
               <a:rPr lang="en-US" smtClean="0"/>
-              <a:t>1/7/2021</a:t>
+              <a:t>1/8/2021</a:t>
             </a:fld>
             <a:endParaRPr lang="en-US"/>
           </a:p>
@@ -1604,7 +1604,7 @@
           <a:p>
             <a:fld id="{EA91886C-002B-40DC-BBAF-4CA608631BA0}" type="datetimeFigureOut">
               <a:rPr lang="en-US" smtClean="0"/>
-              <a:t>1/7/2021</a:t>
+              <a:t>1/8/2021</a:t>
             </a:fld>
             <a:endParaRPr lang="en-US"/>
           </a:p>
@@ -1782,7 +1782,7 @@
           <a:p>
             <a:fld id="{EA91886C-002B-40DC-BBAF-4CA608631BA0}" type="datetimeFigureOut">
               <a:rPr lang="en-US" smtClean="0"/>
-              <a:t>1/7/2021</a:t>
+              <a:t>1/8/2021</a:t>
             </a:fld>
             <a:endParaRPr lang="en-US"/>
           </a:p>
@@ -1950,7 +1950,7 @@
           <a:p>
             <a:fld id="{EA91886C-002B-40DC-BBAF-4CA608631BA0}" type="datetimeFigureOut">
               <a:rPr lang="en-US" smtClean="0"/>
-              <a:t>1/7/2021</a:t>
+              <a:t>1/8/2021</a:t>
             </a:fld>
             <a:endParaRPr lang="en-US"/>
           </a:p>
@@ -2195,7 +2195,7 @@
           <a:p>
             <a:fld id="{EA91886C-002B-40DC-BBAF-4CA608631BA0}" type="datetimeFigureOut">
               <a:rPr lang="en-US" smtClean="0"/>
-              <a:t>1/7/2021</a:t>
+              <a:t>1/8/2021</a:t>
             </a:fld>
             <a:endParaRPr lang="en-US"/>
           </a:p>
@@ -2480,7 +2480,7 @@
           <a:p>
             <a:fld id="{EA91886C-002B-40DC-BBAF-4CA608631BA0}" type="datetimeFigureOut">
               <a:rPr lang="en-US" smtClean="0"/>
-              <a:t>1/7/2021</a:t>
+              <a:t>1/8/2021</a:t>
             </a:fld>
             <a:endParaRPr lang="en-US"/>
           </a:p>
@@ -2899,7 +2899,7 @@
           <a:p>
             <a:fld id="{EA91886C-002B-40DC-BBAF-4CA608631BA0}" type="datetimeFigureOut">
               <a:rPr lang="en-US" smtClean="0"/>
-              <a:t>1/7/2021</a:t>
+              <a:t>1/8/2021</a:t>
             </a:fld>
             <a:endParaRPr lang="en-US"/>
           </a:p>
@@ -3016,7 +3016,7 @@
           <a:p>
             <a:fld id="{EA91886C-002B-40DC-BBAF-4CA608631BA0}" type="datetimeFigureOut">
               <a:rPr lang="en-US" smtClean="0"/>
-              <a:t>1/7/2021</a:t>
+              <a:t>1/8/2021</a:t>
             </a:fld>
             <a:endParaRPr lang="en-US"/>
           </a:p>
@@ -3111,7 +3111,7 @@
           <a:p>
             <a:fld id="{EA91886C-002B-40DC-BBAF-4CA608631BA0}" type="datetimeFigureOut">
               <a:rPr lang="en-US" smtClean="0"/>
-              <a:t>1/7/2021</a:t>
+              <a:t>1/8/2021</a:t>
             </a:fld>
             <a:endParaRPr lang="en-US"/>
           </a:p>
@@ -3386,7 +3386,7 @@
           <a:p>
             <a:fld id="{EA91886C-002B-40DC-BBAF-4CA608631BA0}" type="datetimeFigureOut">
               <a:rPr lang="en-US" smtClean="0"/>
-              <a:t>1/7/2021</a:t>
+              <a:t>1/8/2021</a:t>
             </a:fld>
             <a:endParaRPr lang="en-US"/>
           </a:p>
@@ -3638,7 +3638,7 @@
           <a:p>
             <a:fld id="{EA91886C-002B-40DC-BBAF-4CA608631BA0}" type="datetimeFigureOut">
               <a:rPr lang="en-US" smtClean="0"/>
-              <a:t>1/7/2021</a:t>
+              <a:t>1/8/2021</a:t>
             </a:fld>
             <a:endParaRPr lang="en-US"/>
           </a:p>
@@ -3849,7 +3849,7 @@
           <a:p>
             <a:fld id="{EA91886C-002B-40DC-BBAF-4CA608631BA0}" type="datetimeFigureOut">
               <a:rPr lang="en-US" smtClean="0"/>
-              <a:t>1/7/2021</a:t>
+              <a:t>1/8/2021</a:t>
             </a:fld>
             <a:endParaRPr lang="en-US"/>
           </a:p>
@@ -14483,14 +14483,14 @@
           <p:nvPr>
             <p:extLst>
               <p:ext uri="{D42A27DB-BD31-4B8C-83A1-F6EECF244321}">
-                <p14:modId xmlns:p14="http://schemas.microsoft.com/office/powerpoint/2010/main" val="2617225367"/>
+                <p14:modId xmlns:p14="http://schemas.microsoft.com/office/powerpoint/2010/main" val="4061540469"/>
               </p:ext>
             </p:extLst>
           </p:nvPr>
         </p:nvGraphicFramePr>
         <p:xfrm>
-          <a:off x="544188" y="4513088"/>
-          <a:ext cx="8473843" cy="1021810"/>
+          <a:off x="544188" y="4144136"/>
+          <a:ext cx="8447412" cy="1390762"/>
         </p:xfrm>
         <a:graphic>
           <a:graphicData uri="http://schemas.openxmlformats.org/drawingml/2006/table">
@@ -14499,49 +14499,42 @@
                 <a:tableStyleId>{5C22544A-7EE6-4342-B048-85BDC9FD1C3A}</a:tableStyleId>
               </a:tblPr>
               <a:tblGrid>
-                <a:gridCol w="1210549">
+                <a:gridCol w="1407902">
                   <a:extLst>
                     <a:ext uri="{9D8B030D-6E8A-4147-A177-3AD203B41FA5}">
                       <a16:colId xmlns:a16="http://schemas.microsoft.com/office/drawing/2014/main" val="2205170896"/>
                     </a:ext>
                   </a:extLst>
                 </a:gridCol>
-                <a:gridCol w="1210549">
+                <a:gridCol w="1407902">
                   <a:extLst>
                     <a:ext uri="{9D8B030D-6E8A-4147-A177-3AD203B41FA5}">
                       <a16:colId xmlns:a16="http://schemas.microsoft.com/office/drawing/2014/main" val="3679797539"/>
                     </a:ext>
                   </a:extLst>
                 </a:gridCol>
-                <a:gridCol w="1210549">
+                <a:gridCol w="1407902">
                   <a:extLst>
                     <a:ext uri="{9D8B030D-6E8A-4147-A177-3AD203B41FA5}">
                       <a16:colId xmlns:a16="http://schemas.microsoft.com/office/drawing/2014/main" val="742831095"/>
                     </a:ext>
                   </a:extLst>
                 </a:gridCol>
-                <a:gridCol w="1210549">
+                <a:gridCol w="1407902">
                   <a:extLst>
                     <a:ext uri="{9D8B030D-6E8A-4147-A177-3AD203B41FA5}">
                       <a16:colId xmlns:a16="http://schemas.microsoft.com/office/drawing/2014/main" val="4188008786"/>
                     </a:ext>
                   </a:extLst>
                 </a:gridCol>
-                <a:gridCol w="1210549">
+                <a:gridCol w="2282404">
                   <a:extLst>
                     <a:ext uri="{9D8B030D-6E8A-4147-A177-3AD203B41FA5}">
                       <a16:colId xmlns:a16="http://schemas.microsoft.com/office/drawing/2014/main" val="3214238948"/>
                     </a:ext>
                   </a:extLst>
                 </a:gridCol>
-                <a:gridCol w="1210549">
-                  <a:extLst>
-                    <a:ext uri="{9D8B030D-6E8A-4147-A177-3AD203B41FA5}">
-                      <a16:colId xmlns:a16="http://schemas.microsoft.com/office/drawing/2014/main" val="1429314134"/>
-                    </a:ext>
-                  </a:extLst>
-                </a:gridCol>
-                <a:gridCol w="1210549">
+                <a:gridCol w="533400">
                   <a:extLst>
                     <a:ext uri="{9D8B030D-6E8A-4147-A177-3AD203B41FA5}">
                       <a16:colId xmlns:a16="http://schemas.microsoft.com/office/drawing/2014/main" val="4284112643"/>
@@ -14549,7 +14542,7 @@
                   </a:extLst>
                 </a:gridCol>
               </a:tblGrid>
-              <a:tr h="228151">
+              <a:tr h="373371">
                 <a:tc>
                   <a:txBody>
                     <a:bodyPr/>
@@ -14709,26 +14702,6 @@
                     <a:lstStyle/>
                     <a:p>
                       <a:pPr algn="ctr"/>
-                      <a:r>
-                        <a:rPr lang="en-US" sz="1200" dirty="0"/>
-                        <a:t>HSD</a:t>
-                      </a:r>
-                    </a:p>
-                  </a:txBody>
-                  <a:tcPr anchor="ctr">
-                    <a:solidFill>
-                      <a:schemeClr val="bg1">
-                        <a:lumMod val="50000"/>
-                      </a:schemeClr>
-                    </a:solidFill>
-                  </a:tcPr>
-                </a:tc>
-                <a:tc>
-                  <a:txBody>
-                    <a:bodyPr/>
-                    <a:lstStyle/>
-                    <a:p>
-                      <a:pPr algn="ctr"/>
                       <a:endParaRPr lang="en-US" sz="1200" dirty="0"/>
                     </a:p>
                   </a:txBody>
@@ -14746,7 +14719,7 @@
                   </a:ext>
                 </a:extLst>
               </a:tr>
-              <a:tr h="359223">
+              <a:tr h="488930">
                 <a:tc>
                   <a:txBody>
                     <a:bodyPr/>
@@ -14865,26 +14838,6 @@
                     <a:lstStyle/>
                     <a:p>
                       <a:pPr algn="ctr"/>
-                      <a:r>
-                        <a:rPr lang="en-US" sz="1200" dirty="0"/>
-                        <a:t>30/09/2022</a:t>
-                      </a:r>
-                    </a:p>
-                  </a:txBody>
-                  <a:tcPr anchor="ctr">
-                    <a:solidFill>
-                      <a:schemeClr val="bg1">
-                        <a:lumMod val="95000"/>
-                      </a:schemeClr>
-                    </a:solidFill>
-                  </a:tcPr>
-                </a:tc>
-                <a:tc>
-                  <a:txBody>
-                    <a:bodyPr/>
-                    <a:lstStyle/>
-                    <a:p>
-                      <a:pPr algn="ctr"/>
                       <a:endParaRPr lang="en-US" sz="1200" dirty="0"/>
                     </a:p>
                   </a:txBody>
@@ -14902,7 +14855,7 @@
                   </a:ext>
                 </a:extLst>
               </a:tr>
-              <a:tr h="388267">
+              <a:tr h="528461">
                 <a:tc>
                   <a:txBody>
                     <a:bodyPr/>
@@ -15021,26 +14974,6 @@
                     <a:lstStyle/>
                     <a:p>
                       <a:pPr algn="ctr"/>
-                      <a:r>
-                        <a:rPr lang="en-US" sz="1200" dirty="0"/>
-                        <a:t>24/10/2023</a:t>
-                      </a:r>
-                    </a:p>
-                  </a:txBody>
-                  <a:tcPr anchor="ctr">
-                    <a:solidFill>
-                      <a:schemeClr val="bg1">
-                        <a:lumMod val="95000"/>
-                      </a:schemeClr>
-                    </a:solidFill>
-                  </a:tcPr>
-                </a:tc>
-                <a:tc>
-                  <a:txBody>
-                    <a:bodyPr/>
-                    <a:lstStyle/>
-                    <a:p>
-                      <a:pPr algn="ctr"/>
                       <a:endParaRPr lang="en-US" sz="1200" dirty="0"/>
                     </a:p>
                   </a:txBody>
@@ -15090,7 +15023,7 @@
         </p:blipFill>
         <p:spPr>
           <a:xfrm flipV="1">
-            <a:off x="8019191" y="4844091"/>
+            <a:off x="8649810" y="4701021"/>
             <a:ext cx="152400" cy="152400"/>
           </a:xfrm>
           <a:prstGeom prst="rect">
@@ -15126,7 +15059,7 @@
         </p:blipFill>
         <p:spPr>
           <a:xfrm flipV="1">
-            <a:off x="8019191" y="5313863"/>
+            <a:off x="8649810" y="5170793"/>
             <a:ext cx="152400" cy="152400"/>
           </a:xfrm>
           <a:prstGeom prst="rect">
@@ -15345,7 +15278,7 @@
         </p:nvSpPr>
         <p:spPr>
           <a:xfrm>
-            <a:off x="1766845" y="4090247"/>
+            <a:off x="4913267" y="3768759"/>
             <a:ext cx="1295400" cy="246221"/>
           </a:xfrm>
           <a:prstGeom prst="rect">
@@ -15400,7 +15333,7 @@
         </p:nvSpPr>
         <p:spPr>
           <a:xfrm>
-            <a:off x="2535564" y="4113831"/>
+            <a:off x="5681986" y="3783441"/>
             <a:ext cx="830510" cy="261554"/>
           </a:xfrm>
           <a:prstGeom prst="rect">
@@ -15446,7 +15379,7 @@
         </p:nvSpPr>
         <p:spPr>
           <a:xfrm>
-            <a:off x="3411709" y="4116730"/>
+            <a:off x="6558131" y="3786340"/>
             <a:ext cx="1295400" cy="246221"/>
           </a:xfrm>
           <a:prstGeom prst="rect">
@@ -15501,7 +15434,7 @@
         </p:nvSpPr>
         <p:spPr>
           <a:xfrm>
-            <a:off x="4065002" y="4118733"/>
+            <a:off x="7211424" y="3788343"/>
             <a:ext cx="830510" cy="261554"/>
           </a:xfrm>
           <a:prstGeom prst="rect">
@@ -15547,7 +15480,7 @@
         </p:nvSpPr>
         <p:spPr>
           <a:xfrm>
-            <a:off x="7639455" y="3765652"/>
+            <a:off x="8181364" y="3775909"/>
             <a:ext cx="325460" cy="256652"/>
           </a:xfrm>
           <a:prstGeom prst="roundRect">
@@ -15785,90 +15718,6 @@
               </a:rPr>
               <a:t>152,000</a:t>
             </a:r>
-          </a:p>
-        </p:txBody>
-      </p:sp>
-      <p:sp>
-        <p:nvSpPr>
-          <p:cNvPr id="36" name="TextBox 35">
-            <a:extLst>
-              <a:ext uri="{FF2B5EF4-FFF2-40B4-BE49-F238E27FC236}">
-                <a16:creationId xmlns:a16="http://schemas.microsoft.com/office/drawing/2014/main" id="{3E344CDA-106C-4A55-A864-946A3AF5C40C}"/>
-              </a:ext>
-            </a:extLst>
-          </p:cNvPr>
-          <p:cNvSpPr txBox="1"/>
-          <p:nvPr/>
-        </p:nvSpPr>
-        <p:spPr>
-          <a:xfrm>
-            <a:off x="4962493" y="3785387"/>
-            <a:ext cx="2676962" cy="246221"/>
-          </a:xfrm>
-          <a:prstGeom prst="rect">
-            <a:avLst/>
-          </a:prstGeom>
-          <a:noFill/>
-        </p:spPr>
-        <p:txBody>
-          <a:bodyPr wrap="square" rtlCol="0">
-            <a:spAutoFit/>
-          </a:bodyPr>
-          <a:lstStyle/>
-          <a:p>
-            <a:r>
-              <a:rPr lang="en-US" sz="1000" dirty="0">
-                <a:sym typeface="Wingdings" panose="05000000000000000000" pitchFamily="2" charset="2"/>
-              </a:rPr>
-              <a:t>HSD:</a:t>
-            </a:r>
-            <a:endParaRPr lang="en-US" sz="1000" dirty="0"/>
-          </a:p>
-        </p:txBody>
-      </p:sp>
-      <p:sp>
-        <p:nvSpPr>
-          <p:cNvPr id="37" name="Rectangle 36">
-            <a:extLst>
-              <a:ext uri="{FF2B5EF4-FFF2-40B4-BE49-F238E27FC236}">
-                <a16:creationId xmlns:a16="http://schemas.microsoft.com/office/drawing/2014/main" id="{91B436E0-29B7-4858-BD69-6D498D98FC02}"/>
-              </a:ext>
-            </a:extLst>
-          </p:cNvPr>
-          <p:cNvSpPr/>
-          <p:nvPr/>
-        </p:nvSpPr>
-        <p:spPr>
-          <a:xfrm>
-            <a:off x="5354339" y="3770054"/>
-            <a:ext cx="2113262" cy="261554"/>
-          </a:xfrm>
-          <a:prstGeom prst="rect">
-            <a:avLst/>
-          </a:prstGeom>
-        </p:spPr>
-        <p:style>
-          <a:lnRef idx="2">
-            <a:schemeClr val="dk1"/>
-          </a:lnRef>
-          <a:fillRef idx="1">
-            <a:schemeClr val="lt1"/>
-          </a:fillRef>
-          <a:effectRef idx="0">
-            <a:schemeClr val="dk1"/>
-          </a:effectRef>
-          <a:fontRef idx="minor">
-            <a:schemeClr val="dk1"/>
-          </a:fontRef>
-        </p:style>
-        <p:txBody>
-          <a:bodyPr rtlCol="0" anchor="ctr"/>
-          <a:lstStyle/>
-          <a:p>
-            <a:pPr algn="ctr"/>
-            <a:endParaRPr lang="en-US" sz="1200">
-              <a:latin typeface="+mj-lt"/>
-            </a:endParaRPr>
           </a:p>
         </p:txBody>
       </p:sp>
@@ -17204,10 +17053,10 @@
       </p:sp>
       <p:sp>
         <p:nvSpPr>
-          <p:cNvPr id="72" name="TextBox 71">
-            <a:extLst>
-              <a:ext uri="{FF2B5EF4-FFF2-40B4-BE49-F238E27FC236}">
-                <a16:creationId xmlns:a16="http://schemas.microsoft.com/office/drawing/2014/main" id="{F843BFAF-1BDA-4B4F-A7EF-9C04F474B4E6}"/>
+          <p:cNvPr id="39" name="TextBox 38">
+            <a:extLst>
+              <a:ext uri="{FF2B5EF4-FFF2-40B4-BE49-F238E27FC236}">
+                <a16:creationId xmlns:a16="http://schemas.microsoft.com/office/drawing/2014/main" id="{4C71F624-40A6-41EE-BDCD-7D44E117F542}"/>
               </a:ext>
             </a:extLst>
           </p:cNvPr>
@@ -17271,10 +17120,10 @@
       </p:sp>
       <p:graphicFrame>
         <p:nvGraphicFramePr>
-          <p:cNvPr id="73" name="Table 3">
-            <a:extLst>
-              <a:ext uri="{FF2B5EF4-FFF2-40B4-BE49-F238E27FC236}">
-                <a16:creationId xmlns:a16="http://schemas.microsoft.com/office/drawing/2014/main" id="{2FA00453-A7CF-43BA-8FCF-9188CFC2B8D3}"/>
+          <p:cNvPr id="41" name="Table 3">
+            <a:extLst>
+              <a:ext uri="{FF2B5EF4-FFF2-40B4-BE49-F238E27FC236}">
+                <a16:creationId xmlns:a16="http://schemas.microsoft.com/office/drawing/2014/main" id="{623E82C4-7A03-43F7-BE80-5D37858F3225}"/>
               </a:ext>
             </a:extLst>
           </p:cNvPr>
@@ -17284,14 +17133,14 @@
           <p:nvPr>
             <p:extLst>
               <p:ext uri="{D42A27DB-BD31-4B8C-83A1-F6EECF244321}">
-                <p14:modId xmlns:p14="http://schemas.microsoft.com/office/powerpoint/2010/main" val="2970023854"/>
+                <p14:modId xmlns:p14="http://schemas.microsoft.com/office/powerpoint/2010/main" val="925843536"/>
               </p:ext>
             </p:extLst>
           </p:nvPr>
         </p:nvGraphicFramePr>
         <p:xfrm>
-          <a:off x="544188" y="4513088"/>
-          <a:ext cx="8473843" cy="1021810"/>
+          <a:off x="544188" y="4144136"/>
+          <a:ext cx="8447412" cy="1390762"/>
         </p:xfrm>
         <a:graphic>
           <a:graphicData uri="http://schemas.openxmlformats.org/drawingml/2006/table">
@@ -17300,49 +17149,42 @@
                 <a:tableStyleId>{5C22544A-7EE6-4342-B048-85BDC9FD1C3A}</a:tableStyleId>
               </a:tblPr>
               <a:tblGrid>
-                <a:gridCol w="1210549">
+                <a:gridCol w="1407902">
                   <a:extLst>
                     <a:ext uri="{9D8B030D-6E8A-4147-A177-3AD203B41FA5}">
                       <a16:colId xmlns:a16="http://schemas.microsoft.com/office/drawing/2014/main" val="2205170896"/>
                     </a:ext>
                   </a:extLst>
                 </a:gridCol>
-                <a:gridCol w="1210549">
+                <a:gridCol w="1407902">
                   <a:extLst>
                     <a:ext uri="{9D8B030D-6E8A-4147-A177-3AD203B41FA5}">
                       <a16:colId xmlns:a16="http://schemas.microsoft.com/office/drawing/2014/main" val="3679797539"/>
                     </a:ext>
                   </a:extLst>
                 </a:gridCol>
-                <a:gridCol w="1210549">
+                <a:gridCol w="1407902">
                   <a:extLst>
                     <a:ext uri="{9D8B030D-6E8A-4147-A177-3AD203B41FA5}">
                       <a16:colId xmlns:a16="http://schemas.microsoft.com/office/drawing/2014/main" val="742831095"/>
                     </a:ext>
                   </a:extLst>
                 </a:gridCol>
-                <a:gridCol w="1210549">
+                <a:gridCol w="1407902">
                   <a:extLst>
                     <a:ext uri="{9D8B030D-6E8A-4147-A177-3AD203B41FA5}">
                       <a16:colId xmlns:a16="http://schemas.microsoft.com/office/drawing/2014/main" val="4188008786"/>
                     </a:ext>
                   </a:extLst>
                 </a:gridCol>
-                <a:gridCol w="1210549">
+                <a:gridCol w="2282404">
                   <a:extLst>
                     <a:ext uri="{9D8B030D-6E8A-4147-A177-3AD203B41FA5}">
                       <a16:colId xmlns:a16="http://schemas.microsoft.com/office/drawing/2014/main" val="3214238948"/>
                     </a:ext>
                   </a:extLst>
                 </a:gridCol>
-                <a:gridCol w="1210549">
-                  <a:extLst>
-                    <a:ext uri="{9D8B030D-6E8A-4147-A177-3AD203B41FA5}">
-                      <a16:colId xmlns:a16="http://schemas.microsoft.com/office/drawing/2014/main" val="1429314134"/>
-                    </a:ext>
-                  </a:extLst>
-                </a:gridCol>
-                <a:gridCol w="1210549">
+                <a:gridCol w="533400">
                   <a:extLst>
                     <a:ext uri="{9D8B030D-6E8A-4147-A177-3AD203B41FA5}">
                       <a16:colId xmlns:a16="http://schemas.microsoft.com/office/drawing/2014/main" val="4284112643"/>
@@ -17350,7 +17192,7 @@
                   </a:extLst>
                 </a:gridCol>
               </a:tblGrid>
-              <a:tr h="228151">
+              <a:tr h="373371">
                 <a:tc>
                   <a:txBody>
                     <a:bodyPr/>
@@ -17510,26 +17352,6 @@
                     <a:lstStyle/>
                     <a:p>
                       <a:pPr algn="ctr"/>
-                      <a:r>
-                        <a:rPr lang="en-US" sz="1200" dirty="0"/>
-                        <a:t>HSD</a:t>
-                      </a:r>
-                    </a:p>
-                  </a:txBody>
-                  <a:tcPr anchor="ctr">
-                    <a:solidFill>
-                      <a:schemeClr val="bg1">
-                        <a:lumMod val="50000"/>
-                      </a:schemeClr>
-                    </a:solidFill>
-                  </a:tcPr>
-                </a:tc>
-                <a:tc>
-                  <a:txBody>
-                    <a:bodyPr/>
-                    <a:lstStyle/>
-                    <a:p>
-                      <a:pPr algn="ctr"/>
                       <a:endParaRPr lang="en-US" sz="1200" dirty="0"/>
                     </a:p>
                   </a:txBody>
@@ -17547,7 +17369,7 @@
                   </a:ext>
                 </a:extLst>
               </a:tr>
-              <a:tr h="359223">
+              <a:tr h="488930">
                 <a:tc>
                   <a:txBody>
                     <a:bodyPr/>
@@ -17666,26 +17488,6 @@
                     <a:lstStyle/>
                     <a:p>
                       <a:pPr algn="ctr"/>
-                      <a:r>
-                        <a:rPr lang="en-US" sz="1200" dirty="0"/>
-                        <a:t>30/09/2022</a:t>
-                      </a:r>
-                    </a:p>
-                  </a:txBody>
-                  <a:tcPr anchor="ctr">
-                    <a:solidFill>
-                      <a:schemeClr val="bg1">
-                        <a:lumMod val="95000"/>
-                      </a:schemeClr>
-                    </a:solidFill>
-                  </a:tcPr>
-                </a:tc>
-                <a:tc>
-                  <a:txBody>
-                    <a:bodyPr/>
-                    <a:lstStyle/>
-                    <a:p>
-                      <a:pPr algn="ctr"/>
                       <a:endParaRPr lang="en-US" sz="1200" dirty="0"/>
                     </a:p>
                   </a:txBody>
@@ -17703,7 +17505,7 @@
                   </a:ext>
                 </a:extLst>
               </a:tr>
-              <a:tr h="388267">
+              <a:tr h="528461">
                 <a:tc>
                   <a:txBody>
                     <a:bodyPr/>
@@ -17822,26 +17624,6 @@
                     <a:lstStyle/>
                     <a:p>
                       <a:pPr algn="ctr"/>
-                      <a:r>
-                        <a:rPr lang="en-US" sz="1200" dirty="0"/>
-                        <a:t>24/10/2023</a:t>
-                      </a:r>
-                    </a:p>
-                  </a:txBody>
-                  <a:tcPr anchor="ctr">
-                    <a:solidFill>
-                      <a:schemeClr val="bg1">
-                        <a:lumMod val="95000"/>
-                      </a:schemeClr>
-                    </a:solidFill>
-                  </a:tcPr>
-                </a:tc>
-                <a:tc>
-                  <a:txBody>
-                    <a:bodyPr/>
-                    <a:lstStyle/>
-                    <a:p>
-                      <a:pPr algn="ctr"/>
                       <a:endParaRPr lang="en-US" sz="1200" dirty="0"/>
                     </a:p>
                   </a:txBody>
@@ -17865,10 +17647,10 @@
       </p:graphicFrame>
       <p:pic>
         <p:nvPicPr>
-          <p:cNvPr id="74" name="Picture 73">
-            <a:extLst>
-              <a:ext uri="{FF2B5EF4-FFF2-40B4-BE49-F238E27FC236}">
-                <a16:creationId xmlns:a16="http://schemas.microsoft.com/office/drawing/2014/main" id="{FA774F3B-AB68-44C1-9EC0-5A6B34AB7453}"/>
+          <p:cNvPr id="42" name="Picture 41">
+            <a:extLst>
+              <a:ext uri="{FF2B5EF4-FFF2-40B4-BE49-F238E27FC236}">
+                <a16:creationId xmlns:a16="http://schemas.microsoft.com/office/drawing/2014/main" id="{4567B398-2131-46D9-B112-83C5F1C09B28}"/>
               </a:ext>
             </a:extLst>
           </p:cNvPr>
@@ -17891,7 +17673,7 @@
         </p:blipFill>
         <p:spPr>
           <a:xfrm flipV="1">
-            <a:off x="8019191" y="4844091"/>
+            <a:off x="8649810" y="4701021"/>
             <a:ext cx="152400" cy="152400"/>
           </a:xfrm>
           <a:prstGeom prst="rect">
@@ -17901,10 +17683,10 @@
       </p:pic>
       <p:pic>
         <p:nvPicPr>
-          <p:cNvPr id="75" name="Picture 74">
-            <a:extLst>
-              <a:ext uri="{FF2B5EF4-FFF2-40B4-BE49-F238E27FC236}">
-                <a16:creationId xmlns:a16="http://schemas.microsoft.com/office/drawing/2014/main" id="{3DF94D99-3353-4EBD-A0B6-A8925179BE32}"/>
+          <p:cNvPr id="43" name="Picture 42">
+            <a:extLst>
+              <a:ext uri="{FF2B5EF4-FFF2-40B4-BE49-F238E27FC236}">
+                <a16:creationId xmlns:a16="http://schemas.microsoft.com/office/drawing/2014/main" id="{9683BAC7-01CC-4E36-BE64-BC92448C1B97}"/>
               </a:ext>
             </a:extLst>
           </p:cNvPr>
@@ -17927,7 +17709,7 @@
         </p:blipFill>
         <p:spPr>
           <a:xfrm flipV="1">
-            <a:off x="8019191" y="5313863"/>
+            <a:off x="8649810" y="5170793"/>
             <a:ext cx="152400" cy="152400"/>
           </a:xfrm>
           <a:prstGeom prst="rect">
@@ -17937,10 +17719,10 @@
       </p:pic>
       <p:sp>
         <p:nvSpPr>
-          <p:cNvPr id="76" name="TextBox 75">
-            <a:extLst>
-              <a:ext uri="{FF2B5EF4-FFF2-40B4-BE49-F238E27FC236}">
-                <a16:creationId xmlns:a16="http://schemas.microsoft.com/office/drawing/2014/main" id="{98998D69-3157-4007-9AFB-AABA1332941A}"/>
+          <p:cNvPr id="44" name="TextBox 43">
+            <a:extLst>
+              <a:ext uri="{FF2B5EF4-FFF2-40B4-BE49-F238E27FC236}">
+                <a16:creationId xmlns:a16="http://schemas.microsoft.com/office/drawing/2014/main" id="{159C924A-BAB9-4F70-98EE-2C236BD81870}"/>
               </a:ext>
             </a:extLst>
           </p:cNvPr>
@@ -17993,10 +17775,10 @@
       </p:sp>
       <p:sp>
         <p:nvSpPr>
-          <p:cNvPr id="77" name="Rectangle 76">
-            <a:extLst>
-              <a:ext uri="{FF2B5EF4-FFF2-40B4-BE49-F238E27FC236}">
-                <a16:creationId xmlns:a16="http://schemas.microsoft.com/office/drawing/2014/main" id="{3936ED12-431B-437F-8285-AF64B826F5F6}"/>
+          <p:cNvPr id="45" name="Rectangle 44">
+            <a:extLst>
+              <a:ext uri="{FF2B5EF4-FFF2-40B4-BE49-F238E27FC236}">
+                <a16:creationId xmlns:a16="http://schemas.microsoft.com/office/drawing/2014/main" id="{733821FB-A144-450F-A525-F435896F24F5}"/>
               </a:ext>
             </a:extLst>
           </p:cNvPr>
@@ -18039,10 +17821,10 @@
       </p:sp>
       <p:sp>
         <p:nvSpPr>
-          <p:cNvPr id="78" name="TextBox 77">
-            <a:extLst>
-              <a:ext uri="{FF2B5EF4-FFF2-40B4-BE49-F238E27FC236}">
-                <a16:creationId xmlns:a16="http://schemas.microsoft.com/office/drawing/2014/main" id="{784766D1-9181-4B31-82B2-B5032E7F5040}"/>
+          <p:cNvPr id="46" name="TextBox 45">
+            <a:extLst>
+              <a:ext uri="{FF2B5EF4-FFF2-40B4-BE49-F238E27FC236}">
+                <a16:creationId xmlns:a16="http://schemas.microsoft.com/office/drawing/2014/main" id="{B2BCB21D-ADDC-4636-A63A-769412B9DF89}"/>
               </a:ext>
             </a:extLst>
           </p:cNvPr>
@@ -18051,7 +17833,7 @@
         </p:nvSpPr>
         <p:spPr>
           <a:xfrm>
-            <a:off x="1766845" y="4090247"/>
+            <a:off x="4913267" y="3768759"/>
             <a:ext cx="1295400" cy="246221"/>
           </a:xfrm>
           <a:prstGeom prst="rect">
@@ -18094,10 +17876,10 @@
       </p:sp>
       <p:sp>
         <p:nvSpPr>
-          <p:cNvPr id="79" name="Rectangle 78">
-            <a:extLst>
-              <a:ext uri="{FF2B5EF4-FFF2-40B4-BE49-F238E27FC236}">
-                <a16:creationId xmlns:a16="http://schemas.microsoft.com/office/drawing/2014/main" id="{AC0412B7-7AF2-4D15-967D-0E5DB3B912D7}"/>
+          <p:cNvPr id="50" name="Rectangle 49">
+            <a:extLst>
+              <a:ext uri="{FF2B5EF4-FFF2-40B4-BE49-F238E27FC236}">
+                <a16:creationId xmlns:a16="http://schemas.microsoft.com/office/drawing/2014/main" id="{AD827624-0269-4002-9DF4-6D1732A7D877}"/>
               </a:ext>
             </a:extLst>
           </p:cNvPr>
@@ -18106,7 +17888,7 @@
         </p:nvSpPr>
         <p:spPr>
           <a:xfrm>
-            <a:off x="2535564" y="4113831"/>
+            <a:off x="5681986" y="3783441"/>
             <a:ext cx="830510" cy="261554"/>
           </a:xfrm>
           <a:prstGeom prst="rect">
@@ -18140,10 +17922,10 @@
       </p:sp>
       <p:sp>
         <p:nvSpPr>
-          <p:cNvPr id="80" name="TextBox 79">
-            <a:extLst>
-              <a:ext uri="{FF2B5EF4-FFF2-40B4-BE49-F238E27FC236}">
-                <a16:creationId xmlns:a16="http://schemas.microsoft.com/office/drawing/2014/main" id="{92056D70-CBCD-4518-B18E-85A4AE008AAE}"/>
+          <p:cNvPr id="51" name="TextBox 50">
+            <a:extLst>
+              <a:ext uri="{FF2B5EF4-FFF2-40B4-BE49-F238E27FC236}">
+                <a16:creationId xmlns:a16="http://schemas.microsoft.com/office/drawing/2014/main" id="{0CD6DDA8-2E4B-465E-97E0-E664BFE291ED}"/>
               </a:ext>
             </a:extLst>
           </p:cNvPr>
@@ -18152,7 +17934,7 @@
         </p:nvSpPr>
         <p:spPr>
           <a:xfrm>
-            <a:off x="3411709" y="4116730"/>
+            <a:off x="6558131" y="3786340"/>
             <a:ext cx="1295400" cy="246221"/>
           </a:xfrm>
           <a:prstGeom prst="rect">
@@ -18195,10 +17977,10 @@
       </p:sp>
       <p:sp>
         <p:nvSpPr>
-          <p:cNvPr id="81" name="Rectangle 80">
-            <a:extLst>
-              <a:ext uri="{FF2B5EF4-FFF2-40B4-BE49-F238E27FC236}">
-                <a16:creationId xmlns:a16="http://schemas.microsoft.com/office/drawing/2014/main" id="{1C363F42-0417-4DA3-A511-A46278C237E8}"/>
+          <p:cNvPr id="52" name="Rectangle 51">
+            <a:extLst>
+              <a:ext uri="{FF2B5EF4-FFF2-40B4-BE49-F238E27FC236}">
+                <a16:creationId xmlns:a16="http://schemas.microsoft.com/office/drawing/2014/main" id="{4244D757-F192-430C-B9BA-2790D21B73D1}"/>
               </a:ext>
             </a:extLst>
           </p:cNvPr>
@@ -18207,7 +17989,7 @@
         </p:nvSpPr>
         <p:spPr>
           <a:xfrm>
-            <a:off x="4065002" y="4118733"/>
+            <a:off x="7211424" y="3788343"/>
             <a:ext cx="830510" cy="261554"/>
           </a:xfrm>
           <a:prstGeom prst="rect">
@@ -18241,10 +18023,10 @@
       </p:sp>
       <p:sp>
         <p:nvSpPr>
-          <p:cNvPr id="82" name="Rectangle: Rounded Corners 81">
-            <a:extLst>
-              <a:ext uri="{FF2B5EF4-FFF2-40B4-BE49-F238E27FC236}">
-                <a16:creationId xmlns:a16="http://schemas.microsoft.com/office/drawing/2014/main" id="{094694ED-9263-4895-8969-D13D416F8F78}"/>
+          <p:cNvPr id="53" name="Rectangle: Rounded Corners 52">
+            <a:extLst>
+              <a:ext uri="{FF2B5EF4-FFF2-40B4-BE49-F238E27FC236}">
+                <a16:creationId xmlns:a16="http://schemas.microsoft.com/office/drawing/2014/main" id="{3A0DE2D4-5BEB-44EC-A843-406A1D1D4B49}"/>
               </a:ext>
             </a:extLst>
           </p:cNvPr>
@@ -18253,7 +18035,7 @@
         </p:nvSpPr>
         <p:spPr>
           <a:xfrm>
-            <a:off x="7639455" y="3765652"/>
+            <a:off x="8181364" y="3775909"/>
             <a:ext cx="325460" cy="256652"/>
           </a:xfrm>
           <a:prstGeom prst="roundRect">
@@ -18283,90 +18065,6 @@
               <a:rPr lang="en-US" dirty="0"/>
               <a:t>+</a:t>
             </a:r>
-          </a:p>
-        </p:txBody>
-      </p:sp>
-      <p:sp>
-        <p:nvSpPr>
-          <p:cNvPr id="83" name="TextBox 82">
-            <a:extLst>
-              <a:ext uri="{FF2B5EF4-FFF2-40B4-BE49-F238E27FC236}">
-                <a16:creationId xmlns:a16="http://schemas.microsoft.com/office/drawing/2014/main" id="{237E1FA5-92F4-4F15-B662-B12AB9A2C084}"/>
-              </a:ext>
-            </a:extLst>
-          </p:cNvPr>
-          <p:cNvSpPr txBox="1"/>
-          <p:nvPr/>
-        </p:nvSpPr>
-        <p:spPr>
-          <a:xfrm>
-            <a:off x="4962493" y="3785387"/>
-            <a:ext cx="2676962" cy="246221"/>
-          </a:xfrm>
-          <a:prstGeom prst="rect">
-            <a:avLst/>
-          </a:prstGeom>
-          <a:noFill/>
-        </p:spPr>
-        <p:txBody>
-          <a:bodyPr wrap="square" rtlCol="0">
-            <a:spAutoFit/>
-          </a:bodyPr>
-          <a:lstStyle/>
-          <a:p>
-            <a:r>
-              <a:rPr lang="en-US" sz="1000" dirty="0">
-                <a:sym typeface="Wingdings" panose="05000000000000000000" pitchFamily="2" charset="2"/>
-              </a:rPr>
-              <a:t>HSD:</a:t>
-            </a:r>
-            <a:endParaRPr lang="en-US" sz="1000" dirty="0"/>
-          </a:p>
-        </p:txBody>
-      </p:sp>
-      <p:sp>
-        <p:nvSpPr>
-          <p:cNvPr id="84" name="Rectangle 83">
-            <a:extLst>
-              <a:ext uri="{FF2B5EF4-FFF2-40B4-BE49-F238E27FC236}">
-                <a16:creationId xmlns:a16="http://schemas.microsoft.com/office/drawing/2014/main" id="{917A8F65-513C-4C38-B269-E317B7715201}"/>
-              </a:ext>
-            </a:extLst>
-          </p:cNvPr>
-          <p:cNvSpPr/>
-          <p:nvPr/>
-        </p:nvSpPr>
-        <p:spPr>
-          <a:xfrm>
-            <a:off x="5354339" y="3770054"/>
-            <a:ext cx="2113262" cy="261554"/>
-          </a:xfrm>
-          <a:prstGeom prst="rect">
-            <a:avLst/>
-          </a:prstGeom>
-        </p:spPr>
-        <p:style>
-          <a:lnRef idx="2">
-            <a:schemeClr val="dk1"/>
-          </a:lnRef>
-          <a:fillRef idx="1">
-            <a:schemeClr val="lt1"/>
-          </a:fillRef>
-          <a:effectRef idx="0">
-            <a:schemeClr val="dk1"/>
-          </a:effectRef>
-          <a:fontRef idx="minor">
-            <a:schemeClr val="dk1"/>
-          </a:fontRef>
-        </p:style>
-        <p:txBody>
-          <a:bodyPr rtlCol="0" anchor="ctr"/>
-          <a:lstStyle/>
-          <a:p>
-            <a:pPr algn="ctr"/>
-            <a:endParaRPr lang="en-US" sz="1200">
-              <a:latin typeface="+mj-lt"/>
-            </a:endParaRPr>
           </a:p>
         </p:txBody>
       </p:sp>
@@ -48856,14 +48554,14 @@
           <p:nvPr>
             <p:extLst>
               <p:ext uri="{D42A27DB-BD31-4B8C-83A1-F6EECF244321}">
-                <p14:modId xmlns:p14="http://schemas.microsoft.com/office/powerpoint/2010/main" val="2562357705"/>
+                <p14:modId xmlns:p14="http://schemas.microsoft.com/office/powerpoint/2010/main" val="2341438139"/>
               </p:ext>
             </p:extLst>
           </p:nvPr>
         </p:nvGraphicFramePr>
         <p:xfrm>
           <a:off x="609600" y="5439314"/>
-          <a:ext cx="8382000" cy="822960"/>
+          <a:ext cx="8458200" cy="822960"/>
         </p:xfrm>
         <a:graphic>
           <a:graphicData uri="http://schemas.openxmlformats.org/drawingml/2006/table">
@@ -48872,31 +48570,24 @@
                 <a:tableStyleId>{5C22544A-7EE6-4342-B048-85BDC9FD1C3A}</a:tableStyleId>
               </a:tblPr>
               <a:tblGrid>
-                <a:gridCol w="2095500">
+                <a:gridCol w="2819400">
                   <a:extLst>
                     <a:ext uri="{9D8B030D-6E8A-4147-A177-3AD203B41FA5}">
                       <a16:colId xmlns:a16="http://schemas.microsoft.com/office/drawing/2014/main" val="3679797539"/>
                     </a:ext>
                   </a:extLst>
                 </a:gridCol>
-                <a:gridCol w="2095500">
+                <a:gridCol w="2819400">
                   <a:extLst>
                     <a:ext uri="{9D8B030D-6E8A-4147-A177-3AD203B41FA5}">
                       <a16:colId xmlns:a16="http://schemas.microsoft.com/office/drawing/2014/main" val="4188008786"/>
                     </a:ext>
                   </a:extLst>
                 </a:gridCol>
-                <a:gridCol w="2095500">
+                <a:gridCol w="2819400">
                   <a:extLst>
                     <a:ext uri="{9D8B030D-6E8A-4147-A177-3AD203B41FA5}">
                       <a16:colId xmlns:a16="http://schemas.microsoft.com/office/drawing/2014/main" val="3214238948"/>
-                    </a:ext>
-                  </a:extLst>
-                </a:gridCol>
-                <a:gridCol w="2095500">
-                  <a:extLst>
-                    <a:ext uri="{9D8B030D-6E8A-4147-A177-3AD203B41FA5}">
-                      <a16:colId xmlns:a16="http://schemas.microsoft.com/office/drawing/2014/main" val="1291486487"/>
                     </a:ext>
                   </a:extLst>
                 </a:gridCol>
@@ -48989,43 +48680,6 @@
                     </a:solidFill>
                   </a:tcPr>
                 </a:tc>
-                <a:tc>
-                  <a:txBody>
-                    <a:bodyPr/>
-                    <a:lstStyle/>
-                    <a:p>
-                      <a:pPr algn="ctr"/>
-                      <a:r>
-                        <a:rPr lang="en-US" sz="1200" dirty="0" err="1"/>
-                        <a:t>Hạn</a:t>
-                      </a:r>
-                      <a:r>
-                        <a:rPr lang="en-US" sz="1200" dirty="0"/>
-                        <a:t> </a:t>
-                      </a:r>
-                      <a:r>
-                        <a:rPr lang="en-US" sz="1200" dirty="0" err="1"/>
-                        <a:t>sử</a:t>
-                      </a:r>
-                      <a:r>
-                        <a:rPr lang="en-US" sz="1200" dirty="0"/>
-                        <a:t> </a:t>
-                      </a:r>
-                      <a:r>
-                        <a:rPr lang="en-US" sz="1200" dirty="0" err="1"/>
-                        <a:t>dụng</a:t>
-                      </a:r>
-                      <a:endParaRPr lang="en-US" sz="1200" dirty="0"/>
-                    </a:p>
-                  </a:txBody>
-                  <a:tcPr anchor="ctr">
-                    <a:solidFill>
-                      <a:schemeClr val="bg1">
-                        <a:lumMod val="50000"/>
-                      </a:schemeClr>
-                    </a:solidFill>
-                  </a:tcPr>
-                </a:tc>
                 <a:extLst>
                   <a:ext uri="{0D108BD9-81ED-4DB2-BD59-A6C34878D82A}">
                     <a16:rowId xmlns:a16="http://schemas.microsoft.com/office/drawing/2014/main" val="652390980"/>
@@ -49084,23 +48738,6 @@
                     </a:solidFill>
                   </a:tcPr>
                 </a:tc>
-                <a:tc>
-                  <a:txBody>
-                    <a:bodyPr/>
-                    <a:lstStyle/>
-                    <a:p>
-                      <a:pPr algn="ctr"/>
-                      <a:endParaRPr lang="en-US" sz="1200" dirty="0"/>
-                    </a:p>
-                  </a:txBody>
-                  <a:tcPr anchor="ctr">
-                    <a:solidFill>
-                      <a:schemeClr val="bg1">
-                        <a:lumMod val="95000"/>
-                      </a:schemeClr>
-                    </a:solidFill>
-                  </a:tcPr>
-                </a:tc>
                 <a:extLst>
                   <a:ext uri="{0D108BD9-81ED-4DB2-BD59-A6C34878D82A}">
                     <a16:rowId xmlns:a16="http://schemas.microsoft.com/office/drawing/2014/main" val="730336656"/>
@@ -49108,23 +48745,6 @@
                 </a:extLst>
               </a:tr>
               <a:tr h="201311">
-                <a:tc>
-                  <a:txBody>
-                    <a:bodyPr/>
-                    <a:lstStyle/>
-                    <a:p>
-                      <a:pPr algn="ctr"/>
-                      <a:endParaRPr lang="en-US" sz="1200" dirty="0"/>
-                    </a:p>
-                  </a:txBody>
-                  <a:tcPr anchor="ctr">
-                    <a:solidFill>
-                      <a:schemeClr val="bg1">
-                        <a:lumMod val="95000"/>
-                      </a:schemeClr>
-                    </a:solidFill>
-                  </a:tcPr>
-                </a:tc>
                 <a:tc>
                   <a:txBody>
                     <a:bodyPr/>

</xml_diff>

<commit_message>
Implement DiscountByMedicinePage, Update UI, Update fake Customer data
Works:
- Implement DiscountByMedicinePage
- Update UI: Remove EXP column of SellingPage
- Add fake customer data

Signed-off-by: PhuocTran95 <nguyenbaphuoctran@gmail.com>
Change-Id: I58b2b5f6894c5f7e132ef2dbfa53185829c1bf94
</commit_message>
<xml_diff>
--- a/Pharmacy/UXUI/PagesUI.pptx
+++ b/Pharmacy/UXUI/PagesUI.pptx
@@ -234,7 +234,7 @@
           <a:p>
             <a:fld id="{E193EC3E-9EBC-4FB4-91A0-D81688C87301}" type="datetimeFigureOut">
               <a:rPr lang="en-US" smtClean="0"/>
-              <a:t>1/8/2021</a:t>
+              <a:t>1/11/2021</a:t>
             </a:fld>
             <a:endParaRPr lang="en-US"/>
           </a:p>
@@ -1436,7 +1436,7 @@
           <a:p>
             <a:fld id="{EA91886C-002B-40DC-BBAF-4CA608631BA0}" type="datetimeFigureOut">
               <a:rPr lang="en-US" smtClean="0"/>
-              <a:t>1/8/2021</a:t>
+              <a:t>1/11/2021</a:t>
             </a:fld>
             <a:endParaRPr lang="en-US"/>
           </a:p>
@@ -1604,7 +1604,7 @@
           <a:p>
             <a:fld id="{EA91886C-002B-40DC-BBAF-4CA608631BA0}" type="datetimeFigureOut">
               <a:rPr lang="en-US" smtClean="0"/>
-              <a:t>1/8/2021</a:t>
+              <a:t>1/11/2021</a:t>
             </a:fld>
             <a:endParaRPr lang="en-US"/>
           </a:p>
@@ -1782,7 +1782,7 @@
           <a:p>
             <a:fld id="{EA91886C-002B-40DC-BBAF-4CA608631BA0}" type="datetimeFigureOut">
               <a:rPr lang="en-US" smtClean="0"/>
-              <a:t>1/8/2021</a:t>
+              <a:t>1/11/2021</a:t>
             </a:fld>
             <a:endParaRPr lang="en-US"/>
           </a:p>
@@ -1950,7 +1950,7 @@
           <a:p>
             <a:fld id="{EA91886C-002B-40DC-BBAF-4CA608631BA0}" type="datetimeFigureOut">
               <a:rPr lang="en-US" smtClean="0"/>
-              <a:t>1/8/2021</a:t>
+              <a:t>1/11/2021</a:t>
             </a:fld>
             <a:endParaRPr lang="en-US"/>
           </a:p>
@@ -2195,7 +2195,7 @@
           <a:p>
             <a:fld id="{EA91886C-002B-40DC-BBAF-4CA608631BA0}" type="datetimeFigureOut">
               <a:rPr lang="en-US" smtClean="0"/>
-              <a:t>1/8/2021</a:t>
+              <a:t>1/11/2021</a:t>
             </a:fld>
             <a:endParaRPr lang="en-US"/>
           </a:p>
@@ -2480,7 +2480,7 @@
           <a:p>
             <a:fld id="{EA91886C-002B-40DC-BBAF-4CA608631BA0}" type="datetimeFigureOut">
               <a:rPr lang="en-US" smtClean="0"/>
-              <a:t>1/8/2021</a:t>
+              <a:t>1/11/2021</a:t>
             </a:fld>
             <a:endParaRPr lang="en-US"/>
           </a:p>
@@ -2899,7 +2899,7 @@
           <a:p>
             <a:fld id="{EA91886C-002B-40DC-BBAF-4CA608631BA0}" type="datetimeFigureOut">
               <a:rPr lang="en-US" smtClean="0"/>
-              <a:t>1/8/2021</a:t>
+              <a:t>1/11/2021</a:t>
             </a:fld>
             <a:endParaRPr lang="en-US"/>
           </a:p>
@@ -3016,7 +3016,7 @@
           <a:p>
             <a:fld id="{EA91886C-002B-40DC-BBAF-4CA608631BA0}" type="datetimeFigureOut">
               <a:rPr lang="en-US" smtClean="0"/>
-              <a:t>1/8/2021</a:t>
+              <a:t>1/11/2021</a:t>
             </a:fld>
             <a:endParaRPr lang="en-US"/>
           </a:p>
@@ -3111,7 +3111,7 @@
           <a:p>
             <a:fld id="{EA91886C-002B-40DC-BBAF-4CA608631BA0}" type="datetimeFigureOut">
               <a:rPr lang="en-US" smtClean="0"/>
-              <a:t>1/8/2021</a:t>
+              <a:t>1/11/2021</a:t>
             </a:fld>
             <a:endParaRPr lang="en-US"/>
           </a:p>
@@ -3386,7 +3386,7 @@
           <a:p>
             <a:fld id="{EA91886C-002B-40DC-BBAF-4CA608631BA0}" type="datetimeFigureOut">
               <a:rPr lang="en-US" smtClean="0"/>
-              <a:t>1/8/2021</a:t>
+              <a:t>1/11/2021</a:t>
             </a:fld>
             <a:endParaRPr lang="en-US"/>
           </a:p>
@@ -3638,7 +3638,7 @@
           <a:p>
             <a:fld id="{EA91886C-002B-40DC-BBAF-4CA608631BA0}" type="datetimeFigureOut">
               <a:rPr lang="en-US" smtClean="0"/>
-              <a:t>1/8/2021</a:t>
+              <a:t>1/11/2021</a:t>
             </a:fld>
             <a:endParaRPr lang="en-US"/>
           </a:p>
@@ -3849,7 +3849,7 @@
           <a:p>
             <a:fld id="{EA91886C-002B-40DC-BBAF-4CA608631BA0}" type="datetimeFigureOut">
               <a:rPr lang="en-US" smtClean="0"/>
-              <a:t>1/8/2021</a:t>
+              <a:t>1/11/2021</a:t>
             </a:fld>
             <a:endParaRPr lang="en-US"/>
           </a:p>
@@ -4208,7 +4208,7 @@
 </file>
 
 <file path=ppt/slides/slide1.xml><?xml version="1.0" encoding="utf-8"?>
-<p:sld xmlns:a="http://schemas.openxmlformats.org/drawingml/2006/main" xmlns:r="http://schemas.openxmlformats.org/officeDocument/2006/relationships" xmlns:p="http://schemas.openxmlformats.org/presentationml/2006/main">
+<p:sld xmlns:a="http://schemas.openxmlformats.org/drawingml/2006/main" xmlns:r="http://schemas.openxmlformats.org/officeDocument/2006/relationships" xmlns:p="http://schemas.openxmlformats.org/presentationml/2006/main" show="0">
   <p:cSld>
     <p:spTree>
       <p:nvGrpSpPr>
@@ -4911,7 +4911,7 @@
         </p:nvSpPr>
         <p:spPr>
           <a:xfrm>
-            <a:off x="4648201" y="3097762"/>
+            <a:off x="4648201" y="2904268"/>
             <a:ext cx="1295400" cy="276999"/>
           </a:xfrm>
           <a:prstGeom prst="rect">
@@ -4966,7 +4966,7 @@
         </p:nvSpPr>
         <p:spPr>
           <a:xfrm>
-            <a:off x="4648200" y="3516024"/>
+            <a:off x="4648200" y="3322530"/>
             <a:ext cx="1496577" cy="276999"/>
           </a:xfrm>
           <a:prstGeom prst="rect">
@@ -5021,7 +5021,7 @@
         </p:nvSpPr>
         <p:spPr>
           <a:xfrm>
-            <a:off x="6096000" y="3089185"/>
+            <a:off x="6096000" y="2895691"/>
             <a:ext cx="2971800" cy="261554"/>
           </a:xfrm>
           <a:prstGeom prst="rect">
@@ -5067,7 +5067,7 @@
         </p:nvSpPr>
         <p:spPr>
           <a:xfrm>
-            <a:off x="6096000" y="3498869"/>
+            <a:off x="6096000" y="3305375"/>
             <a:ext cx="2971800" cy="598893"/>
           </a:xfrm>
           <a:prstGeom prst="rect">
@@ -5113,7 +5113,7 @@
         </p:nvSpPr>
         <p:spPr>
           <a:xfrm>
-            <a:off x="7714343" y="4245892"/>
+            <a:off x="7714343" y="4052398"/>
             <a:ext cx="1371600" cy="358165"/>
           </a:xfrm>
           <a:prstGeom prst="rect">
@@ -5173,7 +5173,7 @@
         </p:nvSpPr>
         <p:spPr>
           <a:xfrm>
-            <a:off x="6228443" y="4244590"/>
+            <a:off x="6228443" y="4051096"/>
             <a:ext cx="1371600" cy="358165"/>
           </a:xfrm>
           <a:prstGeom prst="rect">
@@ -5247,7 +5247,7 @@
         </p:nvSpPr>
         <p:spPr>
           <a:xfrm>
-            <a:off x="487531" y="3089094"/>
+            <a:off x="487531" y="2895600"/>
             <a:ext cx="1295400" cy="276999"/>
           </a:xfrm>
           <a:prstGeom prst="rect">
@@ -5302,7 +5302,7 @@
         </p:nvSpPr>
         <p:spPr>
           <a:xfrm>
-            <a:off x="1663537" y="3089094"/>
+            <a:off x="1663537" y="2895600"/>
             <a:ext cx="2780820" cy="261554"/>
           </a:xfrm>
           <a:prstGeom prst="rect">
@@ -5459,13 +5459,13 @@
           <p:nvPr>
             <p:extLst>
               <p:ext uri="{D42A27DB-BD31-4B8C-83A1-F6EECF244321}">
-                <p14:modId xmlns:p14="http://schemas.microsoft.com/office/powerpoint/2010/main" val="1704801808"/>
+                <p14:modId xmlns:p14="http://schemas.microsoft.com/office/powerpoint/2010/main" val="2713293810"/>
               </p:ext>
             </p:extLst>
           </p:nvPr>
         </p:nvGraphicFramePr>
         <p:xfrm>
-          <a:off x="637310" y="5035948"/>
+          <a:off x="637310" y="4643594"/>
           <a:ext cx="8324820" cy="1639912"/>
         </p:xfrm>
         <a:graphic>
@@ -6085,7 +6085,7 @@
         </p:blipFill>
         <p:spPr bwMode="auto">
           <a:xfrm>
-            <a:off x="1143000" y="5334720"/>
+            <a:off x="1143000" y="4942366"/>
             <a:ext cx="386946" cy="387334"/>
           </a:xfrm>
           <a:prstGeom prst="rect">
@@ -6131,7 +6131,7 @@
         </p:blipFill>
         <p:spPr>
           <a:xfrm>
-            <a:off x="8142073" y="5373115"/>
+            <a:off x="8142073" y="4980761"/>
             <a:ext cx="304800" cy="304800"/>
           </a:xfrm>
           <a:prstGeom prst="rect">
@@ -6167,7 +6167,7 @@
         </p:blipFill>
         <p:spPr>
           <a:xfrm>
-            <a:off x="8142073" y="5848362"/>
+            <a:off x="8142073" y="5456008"/>
             <a:ext cx="304800" cy="304800"/>
           </a:xfrm>
           <a:prstGeom prst="rect">
@@ -6204,7 +6204,7 @@
         </p:blipFill>
         <p:spPr bwMode="auto">
           <a:xfrm>
-            <a:off x="1143000" y="5786318"/>
+            <a:off x="1143000" y="5393964"/>
             <a:ext cx="386946" cy="387334"/>
           </a:xfrm>
           <a:prstGeom prst="rect">
@@ -6236,7 +6236,7 @@
         </p:nvSpPr>
         <p:spPr>
           <a:xfrm>
-            <a:off x="637310" y="4688670"/>
+            <a:off x="637310" y="4296316"/>
             <a:ext cx="2383918" cy="323165"/>
           </a:xfrm>
           <a:prstGeom prst="rect">
@@ -6337,6 +6337,80 @@
           </a:prstGeom>
         </p:spPr>
       </p:pic>
+      <p:sp>
+        <p:nvSpPr>
+          <p:cNvPr id="29" name="Rectangle 28">
+            <a:extLst>
+              <a:ext uri="{FF2B5EF4-FFF2-40B4-BE49-F238E27FC236}">
+                <a16:creationId xmlns:a16="http://schemas.microsoft.com/office/drawing/2014/main" id="{B016A826-C07C-4935-8309-3A8C25F43B25}"/>
+              </a:ext>
+            </a:extLst>
+          </p:cNvPr>
+          <p:cNvSpPr/>
+          <p:nvPr/>
+        </p:nvSpPr>
+        <p:spPr>
+          <a:xfrm>
+            <a:off x="7608673" y="6390186"/>
+            <a:ext cx="1371600" cy="358165"/>
+          </a:xfrm>
+          <a:prstGeom prst="rect">
+            <a:avLst/>
+          </a:prstGeom>
+          <a:solidFill>
+            <a:schemeClr val="bg1">
+              <a:lumMod val="65000"/>
+            </a:schemeClr>
+          </a:solidFill>
+          <a:ln>
+            <a:noFill/>
+          </a:ln>
+        </p:spPr>
+        <p:style>
+          <a:lnRef idx="2">
+            <a:schemeClr val="accent1">
+              <a:shade val="50000"/>
+            </a:schemeClr>
+          </a:lnRef>
+          <a:fillRef idx="1">
+            <a:schemeClr val="accent1"/>
+          </a:fillRef>
+          <a:effectRef idx="0">
+            <a:schemeClr val="accent1"/>
+          </a:effectRef>
+          <a:fontRef idx="minor">
+            <a:schemeClr val="lt1"/>
+          </a:fontRef>
+        </p:style>
+        <p:txBody>
+          <a:bodyPr rtlCol="0" anchor="ctr"/>
+          <a:lstStyle/>
+          <a:p>
+            <a:pPr algn="ctr"/>
+            <a:r>
+              <a:rPr lang="en-US" dirty="0" err="1">
+                <a:latin typeface="+mj-lt"/>
+              </a:rPr>
+              <a:t>Trở</a:t>
+            </a:r>
+            <a:r>
+              <a:rPr lang="en-US" dirty="0">
+                <a:latin typeface="+mj-lt"/>
+              </a:rPr>
+              <a:t> </a:t>
+            </a:r>
+            <a:r>
+              <a:rPr lang="en-US" dirty="0" err="1">
+                <a:latin typeface="+mj-lt"/>
+              </a:rPr>
+              <a:t>lại</a:t>
+            </a:r>
+            <a:endParaRPr lang="en-US" dirty="0">
+              <a:latin typeface="+mj-lt"/>
+            </a:endParaRPr>
+          </a:p>
+        </p:txBody>
+      </p:sp>
     </p:spTree>
     <p:extLst>
       <p:ext uri="{BB962C8B-B14F-4D97-AF65-F5344CB8AC3E}">
@@ -6351,7 +6425,7 @@
 </file>
 
 <file path=ppt/slides/slide11.xml><?xml version="1.0" encoding="utf-8"?>
-<p:sld xmlns:a="http://schemas.openxmlformats.org/drawingml/2006/main" xmlns:r="http://schemas.openxmlformats.org/officeDocument/2006/relationships" xmlns:p="http://schemas.openxmlformats.org/presentationml/2006/main">
+<p:sld xmlns:a="http://schemas.openxmlformats.org/drawingml/2006/main" xmlns:r="http://schemas.openxmlformats.org/officeDocument/2006/relationships" xmlns:p="http://schemas.openxmlformats.org/presentationml/2006/main" show="0">
   <p:cSld>
     <p:spTree>
       <p:nvGrpSpPr>
@@ -7635,7 +7709,7 @@
 </file>
 
 <file path=ppt/slides/slide12.xml><?xml version="1.0" encoding="utf-8"?>
-<p:sld xmlns:a="http://schemas.openxmlformats.org/drawingml/2006/main" xmlns:r="http://schemas.openxmlformats.org/officeDocument/2006/relationships" xmlns:p="http://schemas.openxmlformats.org/presentationml/2006/main">
+<p:sld xmlns:a="http://schemas.openxmlformats.org/drawingml/2006/main" xmlns:r="http://schemas.openxmlformats.org/officeDocument/2006/relationships" xmlns:p="http://schemas.openxmlformats.org/presentationml/2006/main" show="0">
   <p:cSld>
     <p:spTree>
       <p:nvGrpSpPr>
@@ -20466,7 +20540,7 @@
 </file>
 
 <file path=ppt/slides/slide2.xml><?xml version="1.0" encoding="utf-8"?>
-<p:sld xmlns:a="http://schemas.openxmlformats.org/drawingml/2006/main" xmlns:r="http://schemas.openxmlformats.org/officeDocument/2006/relationships" xmlns:p="http://schemas.openxmlformats.org/presentationml/2006/main">
+<p:sld xmlns:a="http://schemas.openxmlformats.org/drawingml/2006/main" xmlns:r="http://schemas.openxmlformats.org/officeDocument/2006/relationships" xmlns:p="http://schemas.openxmlformats.org/presentationml/2006/main" show="0">
   <p:cSld>
     <p:spTree>
       <p:nvGrpSpPr>
@@ -24000,14 +24074,14 @@
           <p:nvPr>
             <p:extLst>
               <p:ext uri="{D42A27DB-BD31-4B8C-83A1-F6EECF244321}">
-                <p14:modId xmlns:p14="http://schemas.microsoft.com/office/powerpoint/2010/main" val="109696124"/>
+                <p14:modId xmlns:p14="http://schemas.microsoft.com/office/powerpoint/2010/main" val="3420546601"/>
               </p:ext>
             </p:extLst>
           </p:nvPr>
         </p:nvGraphicFramePr>
         <p:xfrm>
           <a:off x="603599" y="3389288"/>
-          <a:ext cx="8235601" cy="1639912"/>
+          <a:ext cx="8217285" cy="1639912"/>
         </p:xfrm>
         <a:graphic>
           <a:graphicData uri="http://schemas.openxmlformats.org/drawingml/2006/table">
@@ -24016,56 +24090,49 @@
                 <a:tableStyleId>{5C22544A-7EE6-4342-B048-85BDC9FD1C3A}</a:tableStyleId>
               </a:tblPr>
               <a:tblGrid>
-                <a:gridCol w="1337199">
+                <a:gridCol w="1512602">
                   <a:extLst>
                     <a:ext uri="{9D8B030D-6E8A-4147-A177-3AD203B41FA5}">
                       <a16:colId xmlns:a16="http://schemas.microsoft.com/office/drawing/2014/main" val="2205170896"/>
                     </a:ext>
                   </a:extLst>
                 </a:gridCol>
-                <a:gridCol w="605203">
+                <a:gridCol w="684589">
                   <a:extLst>
                     <a:ext uri="{9D8B030D-6E8A-4147-A177-3AD203B41FA5}">
                       <a16:colId xmlns:a16="http://schemas.microsoft.com/office/drawing/2014/main" val="3679797539"/>
                     </a:ext>
                   </a:extLst>
                 </a:gridCol>
-                <a:gridCol w="971202">
+                <a:gridCol w="1098596">
                   <a:extLst>
                     <a:ext uri="{9D8B030D-6E8A-4147-A177-3AD203B41FA5}">
                       <a16:colId xmlns:a16="http://schemas.microsoft.com/office/drawing/2014/main" val="2142246052"/>
                     </a:ext>
                   </a:extLst>
                 </a:gridCol>
-                <a:gridCol w="971202">
-                  <a:extLst>
-                    <a:ext uri="{9D8B030D-6E8A-4147-A177-3AD203B41FA5}">
-                      <a16:colId xmlns:a16="http://schemas.microsoft.com/office/drawing/2014/main" val="1926319217"/>
-                    </a:ext>
-                  </a:extLst>
-                </a:gridCol>
-                <a:gridCol w="1220700">
+                <a:gridCol w="1380822">
                   <a:extLst>
                     <a:ext uri="{9D8B030D-6E8A-4147-A177-3AD203B41FA5}">
                       <a16:colId xmlns:a16="http://schemas.microsoft.com/office/drawing/2014/main" val="4188008786"/>
                     </a:ext>
                   </a:extLst>
                 </a:gridCol>
-                <a:gridCol w="1465150">
+                <a:gridCol w="1657337">
                   <a:extLst>
                     <a:ext uri="{9D8B030D-6E8A-4147-A177-3AD203B41FA5}">
                       <a16:colId xmlns:a16="http://schemas.microsoft.com/office/drawing/2014/main" val="3214238948"/>
                     </a:ext>
                   </a:extLst>
                 </a:gridCol>
-                <a:gridCol w="1189664">
+                <a:gridCol w="1345714">
                   <a:extLst>
                     <a:ext uri="{9D8B030D-6E8A-4147-A177-3AD203B41FA5}">
                       <a16:colId xmlns:a16="http://schemas.microsoft.com/office/drawing/2014/main" val="4284112643"/>
                     </a:ext>
                   </a:extLst>
                 </a:gridCol>
-                <a:gridCol w="475281">
+                <a:gridCol w="537625">
                   <a:extLst>
                     <a:ext uri="{9D8B030D-6E8A-4147-A177-3AD203B41FA5}">
                       <a16:colId xmlns:a16="http://schemas.microsoft.com/office/drawing/2014/main" val="4177220187"/>
@@ -24142,26 +24209,6 @@
                         <a:t>lượng</a:t>
                       </a:r>
                       <a:endParaRPr lang="en-US" sz="1200" dirty="0"/>
-                    </a:p>
-                  </a:txBody>
-                  <a:tcPr anchor="ctr">
-                    <a:solidFill>
-                      <a:schemeClr val="bg1">
-                        <a:lumMod val="50000"/>
-                      </a:schemeClr>
-                    </a:solidFill>
-                  </a:tcPr>
-                </a:tc>
-                <a:tc>
-                  <a:txBody>
-                    <a:bodyPr/>
-                    <a:lstStyle/>
-                    <a:p>
-                      <a:pPr algn="ctr"/>
-                      <a:r>
-                        <a:rPr lang="en-US" sz="1200" dirty="0"/>
-                        <a:t>HSD</a:t>
-                      </a:r>
                     </a:p>
                   </a:txBody>
                   <a:tcPr anchor="ctr">
@@ -24366,26 +24413,6 @@
                       <a:pPr algn="ctr"/>
                       <a:r>
                         <a:rPr lang="en-US" sz="1200" dirty="0"/>
-                        <a:t>12/12/2023</a:t>
-                      </a:r>
-                    </a:p>
-                  </a:txBody>
-                  <a:tcPr anchor="ctr">
-                    <a:solidFill>
-                      <a:schemeClr val="bg1">
-                        <a:lumMod val="95000"/>
-                      </a:schemeClr>
-                    </a:solidFill>
-                  </a:tcPr>
-                </a:tc>
-                <a:tc>
-                  <a:txBody>
-                    <a:bodyPr/>
-                    <a:lstStyle/>
-                    <a:p>
-                      <a:pPr algn="ctr"/>
-                      <a:r>
-                        <a:rPr lang="en-US" sz="1200" dirty="0"/>
                         <a:t>1,000</a:t>
                       </a:r>
                     </a:p>
@@ -24542,26 +24569,6 @@
                       <a:pPr algn="ctr"/>
                       <a:r>
                         <a:rPr lang="en-US" sz="1200" dirty="0"/>
-                        <a:t>25/12/2024</a:t>
-                      </a:r>
-                    </a:p>
-                  </a:txBody>
-                  <a:tcPr anchor="ctr">
-                    <a:solidFill>
-                      <a:schemeClr val="bg1">
-                        <a:lumMod val="95000"/>
-                      </a:schemeClr>
-                    </a:solidFill>
-                  </a:tcPr>
-                </a:tc>
-                <a:tc>
-                  <a:txBody>
-                    <a:bodyPr/>
-                    <a:lstStyle/>
-                    <a:p>
-                      <a:pPr algn="ctr"/>
-                      <a:r>
-                        <a:rPr lang="en-US" sz="1200" dirty="0"/>
                         <a:t>11,000</a:t>
                       </a:r>
                     </a:p>
@@ -24638,23 +24645,6 @@
                 </a:extLst>
               </a:tr>
               <a:tr h="466838">
-                <a:tc>
-                  <a:txBody>
-                    <a:bodyPr/>
-                    <a:lstStyle/>
-                    <a:p>
-                      <a:pPr algn="ctr"/>
-                      <a:endParaRPr lang="en-US" sz="1200" dirty="0"/>
-                    </a:p>
-                  </a:txBody>
-                  <a:tcPr anchor="ctr">
-                    <a:solidFill>
-                      <a:schemeClr val="bg1">
-                        <a:lumMod val="95000"/>
-                      </a:schemeClr>
-                    </a:solidFill>
-                  </a:tcPr>
-                </a:tc>
                 <a:tc>
                   <a:txBody>
                     <a:bodyPr/>
@@ -28747,14 +28737,14 @@
           <p:nvPr>
             <p:extLst>
               <p:ext uri="{D42A27DB-BD31-4B8C-83A1-F6EECF244321}">
-                <p14:modId xmlns:p14="http://schemas.microsoft.com/office/powerpoint/2010/main" val="1948894493"/>
+                <p14:modId xmlns:p14="http://schemas.microsoft.com/office/powerpoint/2010/main" val="2852358257"/>
               </p:ext>
             </p:extLst>
           </p:nvPr>
         </p:nvGraphicFramePr>
         <p:xfrm>
           <a:off x="679799" y="3683326"/>
-          <a:ext cx="8235601" cy="1639912"/>
+          <a:ext cx="8217284" cy="1639912"/>
         </p:xfrm>
         <a:graphic>
           <a:graphicData uri="http://schemas.openxmlformats.org/drawingml/2006/table">
@@ -28763,56 +28753,49 @@
                 <a:tableStyleId>{5C22544A-7EE6-4342-B048-85BDC9FD1C3A}</a:tableStyleId>
               </a:tblPr>
               <a:tblGrid>
-                <a:gridCol w="1337199">
+                <a:gridCol w="1512601">
                   <a:extLst>
                     <a:ext uri="{9D8B030D-6E8A-4147-A177-3AD203B41FA5}">
                       <a16:colId xmlns:a16="http://schemas.microsoft.com/office/drawing/2014/main" val="2205170896"/>
                     </a:ext>
                   </a:extLst>
                 </a:gridCol>
-                <a:gridCol w="605203">
+                <a:gridCol w="684589">
                   <a:extLst>
                     <a:ext uri="{9D8B030D-6E8A-4147-A177-3AD203B41FA5}">
                       <a16:colId xmlns:a16="http://schemas.microsoft.com/office/drawing/2014/main" val="3679797539"/>
                     </a:ext>
                   </a:extLst>
                 </a:gridCol>
-                <a:gridCol w="971202">
+                <a:gridCol w="1098597">
                   <a:extLst>
                     <a:ext uri="{9D8B030D-6E8A-4147-A177-3AD203B41FA5}">
                       <a16:colId xmlns:a16="http://schemas.microsoft.com/office/drawing/2014/main" val="2142246052"/>
                     </a:ext>
                   </a:extLst>
                 </a:gridCol>
-                <a:gridCol w="971202">
-                  <a:extLst>
-                    <a:ext uri="{9D8B030D-6E8A-4147-A177-3AD203B41FA5}">
-                      <a16:colId xmlns:a16="http://schemas.microsoft.com/office/drawing/2014/main" val="1926319217"/>
-                    </a:ext>
-                  </a:extLst>
-                </a:gridCol>
-                <a:gridCol w="1220700">
+                <a:gridCol w="1380822">
                   <a:extLst>
                     <a:ext uri="{9D8B030D-6E8A-4147-A177-3AD203B41FA5}">
                       <a16:colId xmlns:a16="http://schemas.microsoft.com/office/drawing/2014/main" val="4188008786"/>
                     </a:ext>
                   </a:extLst>
                 </a:gridCol>
-                <a:gridCol w="1465150">
+                <a:gridCol w="1657336">
                   <a:extLst>
                     <a:ext uri="{9D8B030D-6E8A-4147-A177-3AD203B41FA5}">
                       <a16:colId xmlns:a16="http://schemas.microsoft.com/office/drawing/2014/main" val="3214238948"/>
                     </a:ext>
                   </a:extLst>
                 </a:gridCol>
-                <a:gridCol w="1189664">
+                <a:gridCol w="1345714">
                   <a:extLst>
                     <a:ext uri="{9D8B030D-6E8A-4147-A177-3AD203B41FA5}">
                       <a16:colId xmlns:a16="http://schemas.microsoft.com/office/drawing/2014/main" val="4284112643"/>
                     </a:ext>
                   </a:extLst>
                 </a:gridCol>
-                <a:gridCol w="475281">
+                <a:gridCol w="537625">
                   <a:extLst>
                     <a:ext uri="{9D8B030D-6E8A-4147-A177-3AD203B41FA5}">
                       <a16:colId xmlns:a16="http://schemas.microsoft.com/office/drawing/2014/main" val="4177220187"/>
@@ -28889,26 +28872,6 @@
                         <a:t>lượng</a:t>
                       </a:r>
                       <a:endParaRPr lang="en-US" sz="1200" dirty="0"/>
-                    </a:p>
-                  </a:txBody>
-                  <a:tcPr anchor="ctr">
-                    <a:solidFill>
-                      <a:schemeClr val="bg1">
-                        <a:lumMod val="50000"/>
-                      </a:schemeClr>
-                    </a:solidFill>
-                  </a:tcPr>
-                </a:tc>
-                <a:tc>
-                  <a:txBody>
-                    <a:bodyPr/>
-                    <a:lstStyle/>
-                    <a:p>
-                      <a:pPr algn="ctr"/>
-                      <a:r>
-                        <a:rPr lang="en-US" sz="1200" dirty="0"/>
-                        <a:t>HSD</a:t>
-                      </a:r>
                     </a:p>
                   </a:txBody>
                   <a:tcPr anchor="ctr">
@@ -29113,26 +29076,6 @@
                       <a:pPr algn="ctr"/>
                       <a:r>
                         <a:rPr lang="en-US" sz="1200" dirty="0"/>
-                        <a:t>12/12/2023</a:t>
-                      </a:r>
-                    </a:p>
-                  </a:txBody>
-                  <a:tcPr anchor="ctr">
-                    <a:solidFill>
-                      <a:schemeClr val="bg1">
-                        <a:lumMod val="95000"/>
-                      </a:schemeClr>
-                    </a:solidFill>
-                  </a:tcPr>
-                </a:tc>
-                <a:tc>
-                  <a:txBody>
-                    <a:bodyPr/>
-                    <a:lstStyle/>
-                    <a:p>
-                      <a:pPr algn="ctr"/>
-                      <a:r>
-                        <a:rPr lang="en-US" sz="1200" dirty="0"/>
                         <a:t>1,000</a:t>
                       </a:r>
                     </a:p>
@@ -29289,26 +29232,6 @@
                       <a:pPr algn="ctr"/>
                       <a:r>
                         <a:rPr lang="en-US" sz="1200" dirty="0"/>
-                        <a:t>25/12/2024</a:t>
-                      </a:r>
-                    </a:p>
-                  </a:txBody>
-                  <a:tcPr anchor="ctr">
-                    <a:solidFill>
-                      <a:schemeClr val="bg1">
-                        <a:lumMod val="95000"/>
-                      </a:schemeClr>
-                    </a:solidFill>
-                  </a:tcPr>
-                </a:tc>
-                <a:tc>
-                  <a:txBody>
-                    <a:bodyPr/>
-                    <a:lstStyle/>
-                    <a:p>
-                      <a:pPr algn="ctr"/>
-                      <a:r>
-                        <a:rPr lang="en-US" sz="1200" dirty="0"/>
                         <a:t>11,000</a:t>
                       </a:r>
                     </a:p>
@@ -29385,23 +29308,6 @@
                 </a:extLst>
               </a:tr>
               <a:tr h="466838">
-                <a:tc>
-                  <a:txBody>
-                    <a:bodyPr/>
-                    <a:lstStyle/>
-                    <a:p>
-                      <a:pPr algn="ctr"/>
-                      <a:endParaRPr lang="en-US" sz="1200" dirty="0"/>
-                    </a:p>
-                  </a:txBody>
-                  <a:tcPr anchor="ctr">
-                    <a:solidFill>
-                      <a:schemeClr val="bg1">
-                        <a:lumMod val="95000"/>
-                      </a:schemeClr>
-                    </a:solidFill>
-                  </a:tcPr>
-                </a:tc>
                 <a:tc>
                   <a:txBody>
                     <a:bodyPr/>
@@ -36563,7 +36469,7 @@
 </file>
 
 <file path=ppt/slides/slide3.xml><?xml version="1.0" encoding="utf-8"?>
-<p:sld xmlns:a="http://schemas.openxmlformats.org/drawingml/2006/main" xmlns:r="http://schemas.openxmlformats.org/officeDocument/2006/relationships" xmlns:p="http://schemas.openxmlformats.org/presentationml/2006/main">
+<p:sld xmlns:a="http://schemas.openxmlformats.org/drawingml/2006/main" xmlns:r="http://schemas.openxmlformats.org/officeDocument/2006/relationships" xmlns:p="http://schemas.openxmlformats.org/presentationml/2006/main" show="0">
   <p:cSld>
     <p:spTree>
       <p:nvGrpSpPr>
@@ -38073,7 +37979,7 @@
 </file>
 
 <file path=ppt/slides/slide4.xml><?xml version="1.0" encoding="utf-8"?>
-<p:sld xmlns:a="http://schemas.openxmlformats.org/drawingml/2006/main" xmlns:r="http://schemas.openxmlformats.org/officeDocument/2006/relationships" xmlns:p="http://schemas.openxmlformats.org/presentationml/2006/main">
+<p:sld xmlns:a="http://schemas.openxmlformats.org/drawingml/2006/main" xmlns:r="http://schemas.openxmlformats.org/officeDocument/2006/relationships" xmlns:p="http://schemas.openxmlformats.org/presentationml/2006/main" show="0">
   <p:cSld>
     <p:spTree>
       <p:nvGrpSpPr>
@@ -39354,7 +39260,7 @@
 </file>
 
 <file path=ppt/slides/slide5.xml><?xml version="1.0" encoding="utf-8"?>
-<p:sld xmlns:a="http://schemas.openxmlformats.org/drawingml/2006/main" xmlns:r="http://schemas.openxmlformats.org/officeDocument/2006/relationships" xmlns:p="http://schemas.openxmlformats.org/presentationml/2006/main">
+<p:sld xmlns:a="http://schemas.openxmlformats.org/drawingml/2006/main" xmlns:r="http://schemas.openxmlformats.org/officeDocument/2006/relationships" xmlns:p="http://schemas.openxmlformats.org/presentationml/2006/main" show="0">
   <p:cSld>
     <p:spTree>
       <p:nvGrpSpPr>
@@ -41044,7 +40950,7 @@
 </file>
 
 <file path=ppt/slides/slide6.xml><?xml version="1.0" encoding="utf-8"?>
-<p:sld xmlns:a="http://schemas.openxmlformats.org/drawingml/2006/main" xmlns:r="http://schemas.openxmlformats.org/officeDocument/2006/relationships" xmlns:p="http://schemas.openxmlformats.org/presentationml/2006/main">
+<p:sld xmlns:a="http://schemas.openxmlformats.org/drawingml/2006/main" xmlns:r="http://schemas.openxmlformats.org/officeDocument/2006/relationships" xmlns:p="http://schemas.openxmlformats.org/presentationml/2006/main" show="0">
   <p:cSld>
     <p:spTree>
       <p:nvGrpSpPr>
@@ -42931,7 +42837,7 @@
 </file>
 
 <file path=ppt/slides/slide7.xml><?xml version="1.0" encoding="utf-8"?>
-<p:sld xmlns:a="http://schemas.openxmlformats.org/drawingml/2006/main" xmlns:r="http://schemas.openxmlformats.org/officeDocument/2006/relationships" xmlns:p="http://schemas.openxmlformats.org/presentationml/2006/main">
+<p:sld xmlns:a="http://schemas.openxmlformats.org/drawingml/2006/main" xmlns:r="http://schemas.openxmlformats.org/officeDocument/2006/relationships" xmlns:p="http://schemas.openxmlformats.org/presentationml/2006/main" show="0">
   <p:cSld>
     <p:spTree>
       <p:nvGrpSpPr>
@@ -44843,7 +44749,7 @@
 </file>
 
 <file path=ppt/slides/slide8.xml><?xml version="1.0" encoding="utf-8"?>
-<p:sld xmlns:a="http://schemas.openxmlformats.org/drawingml/2006/main" xmlns:r="http://schemas.openxmlformats.org/officeDocument/2006/relationships" xmlns:p="http://schemas.openxmlformats.org/presentationml/2006/main">
+<p:sld xmlns:a="http://schemas.openxmlformats.org/drawingml/2006/main" xmlns:r="http://schemas.openxmlformats.org/officeDocument/2006/relationships" xmlns:p="http://schemas.openxmlformats.org/presentationml/2006/main" show="0">
   <p:cSld>
     <p:spTree>
       <p:nvGrpSpPr>
@@ -46692,7 +46598,7 @@
 </file>
 
 <file path=ppt/slides/slide9.xml><?xml version="1.0" encoding="utf-8"?>
-<p:sld xmlns:a="http://schemas.openxmlformats.org/drawingml/2006/main" xmlns:r="http://schemas.openxmlformats.org/officeDocument/2006/relationships" xmlns:p="http://schemas.openxmlformats.org/presentationml/2006/main">
+<p:sld xmlns:a="http://schemas.openxmlformats.org/drawingml/2006/main" xmlns:r="http://schemas.openxmlformats.org/officeDocument/2006/relationships" xmlns:p="http://schemas.openxmlformats.org/presentationml/2006/main" show="0">
   <p:cSld>
     <p:spTree>
       <p:nvGrpSpPr>

</xml_diff>

<commit_message>
Implement SupplierImportHistoryPage, Update UI
Works:
- Implement SupplierImportHistoryPage
- Change UI: Xem lịch sử nhập kho, lịch sử mua hàng

Signed-off-by: PhuocTran95 <nguyenbaphuoctran@gmail.com>
Change-Id: I8a98d52d60fcba60c7bb7af6f18e7c7d9c58f2ae
</commit_message>
<xml_diff>
--- a/Pharmacy/UXUI/PagesUI.pptx
+++ b/Pharmacy/UXUI/PagesUI.pptx
@@ -9514,132 +9514,6 @@
       </p:sp>
       <p:sp>
         <p:nvSpPr>
-          <p:cNvPr id="21" name="TextBox 20">
-            <a:extLst>
-              <a:ext uri="{FF2B5EF4-FFF2-40B4-BE49-F238E27FC236}">
-                <a16:creationId xmlns:a16="http://schemas.microsoft.com/office/drawing/2014/main" id="{4BDFFEA8-D337-4BC0-8DCA-D76392741E23}"/>
-              </a:ext>
-            </a:extLst>
-          </p:cNvPr>
-          <p:cNvSpPr txBox="1"/>
-          <p:nvPr/>
-        </p:nvSpPr>
-        <p:spPr>
-          <a:xfrm>
-            <a:off x="638959" y="3181502"/>
-            <a:ext cx="3429000" cy="276999"/>
-          </a:xfrm>
-          <a:prstGeom prst="rect">
-            <a:avLst/>
-          </a:prstGeom>
-          <a:solidFill>
-            <a:schemeClr val="bg1">
-              <a:lumMod val="85000"/>
-            </a:schemeClr>
-          </a:solidFill>
-        </p:spPr>
-        <p:txBody>
-          <a:bodyPr wrap="square" rtlCol="0">
-            <a:spAutoFit/>
-          </a:bodyPr>
-          <a:lstStyle/>
-          <a:p>
-            <a:r>
-              <a:rPr lang="en-US" sz="1200" dirty="0">
-                <a:latin typeface="+mj-lt"/>
-              </a:rPr>
-              <a:t>20/10/2020 19:30 </a:t>
-            </a:r>
-            <a:r>
-              <a:rPr lang="en-US" sz="1200" dirty="0" err="1">
-                <a:latin typeface="+mj-lt"/>
-              </a:rPr>
-              <a:t>Thành</a:t>
-            </a:r>
-            <a:r>
-              <a:rPr lang="en-US" sz="1200" dirty="0">
-                <a:latin typeface="+mj-lt"/>
-              </a:rPr>
-              <a:t> </a:t>
-            </a:r>
-            <a:r>
-              <a:rPr lang="en-US" sz="1200" dirty="0" err="1">
-                <a:latin typeface="+mj-lt"/>
-              </a:rPr>
-              <a:t>tiền</a:t>
-            </a:r>
-            <a:r>
-              <a:rPr lang="en-US" sz="1200" dirty="0">
-                <a:latin typeface="+mj-lt"/>
-              </a:rPr>
-              <a:t>: 300,000đ</a:t>
-            </a:r>
-          </a:p>
-        </p:txBody>
-      </p:sp>
-      <p:sp>
-        <p:nvSpPr>
-          <p:cNvPr id="22" name="TextBox 21">
-            <a:extLst>
-              <a:ext uri="{FF2B5EF4-FFF2-40B4-BE49-F238E27FC236}">
-                <a16:creationId xmlns:a16="http://schemas.microsoft.com/office/drawing/2014/main" id="{3F6E2C2B-281C-49B5-89F1-ED3726EAF780}"/>
-              </a:ext>
-            </a:extLst>
-          </p:cNvPr>
-          <p:cNvSpPr txBox="1"/>
-          <p:nvPr/>
-        </p:nvSpPr>
-        <p:spPr>
-          <a:xfrm>
-            <a:off x="613794" y="3439536"/>
-            <a:ext cx="3496811" cy="276999"/>
-          </a:xfrm>
-          <a:prstGeom prst="rect">
-            <a:avLst/>
-          </a:prstGeom>
-          <a:noFill/>
-        </p:spPr>
-        <p:txBody>
-          <a:bodyPr wrap="square" rtlCol="0">
-            <a:spAutoFit/>
-          </a:bodyPr>
-          <a:lstStyle/>
-          <a:p>
-            <a:r>
-              <a:rPr lang="en-US" sz="1200" dirty="0">
-                <a:latin typeface="+mj-lt"/>
-              </a:rPr>
-              <a:t>10/10/2020 08:20 </a:t>
-            </a:r>
-            <a:r>
-              <a:rPr lang="en-US" sz="1200" dirty="0" err="1">
-                <a:latin typeface="+mj-lt"/>
-              </a:rPr>
-              <a:t>Thành</a:t>
-            </a:r>
-            <a:r>
-              <a:rPr lang="en-US" sz="1200" dirty="0">
-                <a:latin typeface="+mj-lt"/>
-              </a:rPr>
-              <a:t> </a:t>
-            </a:r>
-            <a:r>
-              <a:rPr lang="en-US" sz="1200" dirty="0" err="1">
-                <a:latin typeface="+mj-lt"/>
-              </a:rPr>
-              <a:t>tiền</a:t>
-            </a:r>
-            <a:r>
-              <a:rPr lang="en-US" sz="1200" dirty="0">
-                <a:latin typeface="+mj-lt"/>
-              </a:rPr>
-              <a:t>: 200,000đ</a:t>
-            </a:r>
-          </a:p>
-        </p:txBody>
-      </p:sp>
-      <p:sp>
-        <p:nvSpPr>
           <p:cNvPr id="34" name="TextBox 33">
             <a:extLst>
               <a:ext uri="{FF2B5EF4-FFF2-40B4-BE49-F238E27FC236}">
@@ -9724,85 +9598,6 @@
             <a:endParaRPr lang="en-US">
               <a:latin typeface="+mj-lt"/>
             </a:endParaRPr>
-          </a:p>
-        </p:txBody>
-      </p:sp>
-      <p:sp>
-        <p:nvSpPr>
-          <p:cNvPr id="36" name="TextBox 35">
-            <a:extLst>
-              <a:ext uri="{FF2B5EF4-FFF2-40B4-BE49-F238E27FC236}">
-                <a16:creationId xmlns:a16="http://schemas.microsoft.com/office/drawing/2014/main" id="{46AAFE98-E7BB-4ADB-897F-0B40DB41A22D}"/>
-              </a:ext>
-            </a:extLst>
-          </p:cNvPr>
-          <p:cNvSpPr txBox="1"/>
-          <p:nvPr/>
-        </p:nvSpPr>
-        <p:spPr>
-          <a:xfrm>
-            <a:off x="5426773" y="4622382"/>
-            <a:ext cx="3107627" cy="261610"/>
-          </a:xfrm>
-          <a:prstGeom prst="rect">
-            <a:avLst/>
-          </a:prstGeom>
-          <a:noFill/>
-        </p:spPr>
-        <p:txBody>
-          <a:bodyPr wrap="square" rtlCol="0">
-            <a:spAutoFit/>
-          </a:bodyPr>
-          <a:lstStyle/>
-          <a:p>
-            <a:r>
-              <a:rPr lang="en-US" sz="1100" dirty="0" err="1">
-                <a:latin typeface="+mj-lt"/>
-              </a:rPr>
-              <a:t>Thuốc</a:t>
-            </a:r>
-            <a:r>
-              <a:rPr lang="en-US" sz="1100" dirty="0">
-                <a:latin typeface="+mj-lt"/>
-              </a:rPr>
-              <a:t> A - ĐVT: </a:t>
-            </a:r>
-            <a:r>
-              <a:rPr lang="en-US" sz="1100" dirty="0" err="1">
-                <a:latin typeface="+mj-lt"/>
-              </a:rPr>
-              <a:t>viên</a:t>
-            </a:r>
-            <a:r>
-              <a:rPr lang="en-US" sz="1100" dirty="0">
-                <a:latin typeface="+mj-lt"/>
-              </a:rPr>
-              <a:t> - SL: 2 - </a:t>
-            </a:r>
-            <a:r>
-              <a:rPr lang="en-US" sz="1100" dirty="0" err="1">
-                <a:latin typeface="+mj-lt"/>
-              </a:rPr>
-              <a:t>Thành</a:t>
-            </a:r>
-            <a:r>
-              <a:rPr lang="en-US" sz="1100" dirty="0">
-                <a:latin typeface="+mj-lt"/>
-              </a:rPr>
-              <a:t> </a:t>
-            </a:r>
-            <a:r>
-              <a:rPr lang="en-US" sz="1100" dirty="0" err="1">
-                <a:latin typeface="+mj-lt"/>
-              </a:rPr>
-              <a:t>tiền</a:t>
-            </a:r>
-            <a:r>
-              <a:rPr lang="en-US" sz="1100" dirty="0">
-                <a:latin typeface="+mj-lt"/>
-              </a:rPr>
-              <a:t>: 250,000đ</a:t>
-            </a:r>
           </a:p>
         </p:txBody>
       </p:sp>
@@ -10077,55 +9872,6 @@
       </p:sp>
       <p:sp>
         <p:nvSpPr>
-          <p:cNvPr id="45" name="TextBox 44">
-            <a:extLst>
-              <a:ext uri="{FF2B5EF4-FFF2-40B4-BE49-F238E27FC236}">
-                <a16:creationId xmlns:a16="http://schemas.microsoft.com/office/drawing/2014/main" id="{BEB9BFB6-92D3-4FE6-B447-090767996ED7}"/>
-              </a:ext>
-            </a:extLst>
-          </p:cNvPr>
-          <p:cNvSpPr txBox="1"/>
-          <p:nvPr/>
-        </p:nvSpPr>
-        <p:spPr>
-          <a:xfrm>
-            <a:off x="4424215" y="3373219"/>
-            <a:ext cx="1295400" cy="276999"/>
-          </a:xfrm>
-          <a:prstGeom prst="rect">
-            <a:avLst/>
-          </a:prstGeom>
-          <a:noFill/>
-        </p:spPr>
-        <p:txBody>
-          <a:bodyPr wrap="square" rtlCol="0">
-            <a:spAutoFit/>
-          </a:bodyPr>
-          <a:lstStyle/>
-          <a:p>
-            <a:r>
-              <a:rPr lang="en-US" sz="1200" dirty="0">
-                <a:latin typeface="+mj-lt"/>
-              </a:rPr>
-              <a:t>Thanh </a:t>
-            </a:r>
-            <a:r>
-              <a:rPr lang="en-US" sz="1200" dirty="0" err="1">
-                <a:latin typeface="+mj-lt"/>
-              </a:rPr>
-              <a:t>toán</a:t>
-            </a:r>
-            <a:r>
-              <a:rPr lang="en-US" sz="1200" dirty="0">
-                <a:latin typeface="+mj-lt"/>
-              </a:rPr>
-              <a:t>:</a:t>
-            </a:r>
-          </a:p>
-        </p:txBody>
-      </p:sp>
-      <p:sp>
-        <p:nvSpPr>
           <p:cNvPr id="46" name="Rectangle 45">
             <a:extLst>
               <a:ext uri="{FF2B5EF4-FFF2-40B4-BE49-F238E27FC236}">
@@ -10172,10 +9918,65 @@
       </p:sp>
       <p:sp>
         <p:nvSpPr>
-          <p:cNvPr id="47" name="Rectangle 46">
-            <a:extLst>
-              <a:ext uri="{FF2B5EF4-FFF2-40B4-BE49-F238E27FC236}">
-                <a16:creationId xmlns:a16="http://schemas.microsoft.com/office/drawing/2014/main" id="{8159DB57-E520-4FB7-8FC5-35129A01AB2C}"/>
+          <p:cNvPr id="52" name="TextBox 51">
+            <a:extLst>
+              <a:ext uri="{FF2B5EF4-FFF2-40B4-BE49-F238E27FC236}">
+                <a16:creationId xmlns:a16="http://schemas.microsoft.com/office/drawing/2014/main" id="{D0690CA8-A5D4-4189-BFC1-F726D6EFC49C}"/>
+              </a:ext>
+            </a:extLst>
+          </p:cNvPr>
+          <p:cNvSpPr txBox="1"/>
+          <p:nvPr/>
+        </p:nvSpPr>
+        <p:spPr>
+          <a:xfrm>
+            <a:off x="4424215" y="2983333"/>
+            <a:ext cx="1295400" cy="276999"/>
+          </a:xfrm>
+          <a:prstGeom prst="rect">
+            <a:avLst/>
+          </a:prstGeom>
+          <a:noFill/>
+        </p:spPr>
+        <p:txBody>
+          <a:bodyPr wrap="square" rtlCol="0">
+            <a:spAutoFit/>
+          </a:bodyPr>
+          <a:lstStyle/>
+          <a:p>
+            <a:r>
+              <a:rPr lang="en-US" sz="1200" dirty="0" err="1">
+                <a:latin typeface="+mj-lt"/>
+              </a:rPr>
+              <a:t>Tổng</a:t>
+            </a:r>
+            <a:r>
+              <a:rPr lang="en-US" sz="1200" dirty="0">
+                <a:latin typeface="+mj-lt"/>
+              </a:rPr>
+              <a:t> </a:t>
+            </a:r>
+            <a:r>
+              <a:rPr lang="en-US" sz="1200" dirty="0" err="1">
+                <a:latin typeface="+mj-lt"/>
+              </a:rPr>
+              <a:t>cộng</a:t>
+            </a:r>
+            <a:r>
+              <a:rPr lang="en-US" sz="1200" dirty="0">
+                <a:latin typeface="+mj-lt"/>
+              </a:rPr>
+              <a:t>:</a:t>
+            </a:r>
+          </a:p>
+        </p:txBody>
+      </p:sp>
+      <p:sp>
+        <p:nvSpPr>
+          <p:cNvPr id="53" name="Rectangle 52">
+            <a:extLst>
+              <a:ext uri="{FF2B5EF4-FFF2-40B4-BE49-F238E27FC236}">
+                <a16:creationId xmlns:a16="http://schemas.microsoft.com/office/drawing/2014/main" id="{204F543E-2462-4DF1-B28D-57639D2BEE07}"/>
               </a:ext>
             </a:extLst>
           </p:cNvPr>
@@ -10184,7 +9985,7 @@
         </p:nvSpPr>
         <p:spPr>
           <a:xfrm>
-            <a:off x="5427678" y="3364642"/>
+            <a:off x="5427678" y="2974756"/>
             <a:ext cx="3124200" cy="261554"/>
           </a:xfrm>
           <a:prstGeom prst="rect">
@@ -10218,10 +10019,10 @@
       </p:sp>
       <p:sp>
         <p:nvSpPr>
-          <p:cNvPr id="50" name="TextBox 49">
-            <a:extLst>
-              <a:ext uri="{FF2B5EF4-FFF2-40B4-BE49-F238E27FC236}">
-                <a16:creationId xmlns:a16="http://schemas.microsoft.com/office/drawing/2014/main" id="{DBF1EB73-7CC8-4B17-A129-7E44D1479735}"/>
+          <p:cNvPr id="48" name="TextBox 47">
+            <a:extLst>
+              <a:ext uri="{FF2B5EF4-FFF2-40B4-BE49-F238E27FC236}">
+                <a16:creationId xmlns:a16="http://schemas.microsoft.com/office/drawing/2014/main" id="{4C8C3C9E-F5E0-44F3-86D1-CAA65DCCF7F9}"/>
               </a:ext>
             </a:extLst>
           </p:cNvPr>
@@ -10230,13 +10031,17 @@
         </p:nvSpPr>
         <p:spPr>
           <a:xfrm>
-            <a:off x="4424215" y="3844307"/>
-            <a:ext cx="1295400" cy="276999"/>
-          </a:xfrm>
-          <a:prstGeom prst="rect">
-            <a:avLst/>
-          </a:prstGeom>
-          <a:noFill/>
+            <a:off x="638959" y="3181502"/>
+            <a:ext cx="3429000" cy="276999"/>
+          </a:xfrm>
+          <a:prstGeom prst="rect">
+            <a:avLst/>
+          </a:prstGeom>
+          <a:solidFill>
+            <a:schemeClr val="bg1">
+              <a:lumMod val="85000"/>
+            </a:schemeClr>
+          </a:solidFill>
         </p:spPr>
         <p:txBody>
           <a:bodyPr wrap="square" rtlCol="0">
@@ -10245,10 +10050,16 @@
           <a:lstStyle/>
           <a:p>
             <a:r>
+              <a:rPr lang="en-US" sz="1200" dirty="0">
+                <a:latin typeface="+mj-lt"/>
+              </a:rPr>
+              <a:t>20/10/2020 19:30 </a:t>
+            </a:r>
+            <a:r>
               <a:rPr lang="en-US" sz="1200" dirty="0" err="1">
                 <a:latin typeface="+mj-lt"/>
               </a:rPr>
-              <a:t>Ghi</a:t>
+              <a:t>Thành</a:t>
             </a:r>
             <a:r>
               <a:rPr lang="en-US" sz="1200" dirty="0">
@@ -10260,12 +10071,220 @@
               <a:rPr lang="en-US" sz="1200" dirty="0" err="1">
                 <a:latin typeface="+mj-lt"/>
               </a:rPr>
-              <a:t>chú</a:t>
+              <a:t>tiền</a:t>
             </a:r>
             <a:r>
               <a:rPr lang="en-US" sz="1200" dirty="0">
                 <a:latin typeface="+mj-lt"/>
               </a:rPr>
+              <a:t>: 300,000VND</a:t>
+            </a:r>
+          </a:p>
+        </p:txBody>
+      </p:sp>
+      <p:sp>
+        <p:nvSpPr>
+          <p:cNvPr id="54" name="TextBox 53">
+            <a:extLst>
+              <a:ext uri="{FF2B5EF4-FFF2-40B4-BE49-F238E27FC236}">
+                <a16:creationId xmlns:a16="http://schemas.microsoft.com/office/drawing/2014/main" id="{849762B1-E659-4E62-B0B4-DD4E483263D7}"/>
+              </a:ext>
+            </a:extLst>
+          </p:cNvPr>
+          <p:cNvSpPr txBox="1"/>
+          <p:nvPr/>
+        </p:nvSpPr>
+        <p:spPr>
+          <a:xfrm>
+            <a:off x="613794" y="3439536"/>
+            <a:ext cx="3496811" cy="276999"/>
+          </a:xfrm>
+          <a:prstGeom prst="rect">
+            <a:avLst/>
+          </a:prstGeom>
+          <a:noFill/>
+        </p:spPr>
+        <p:txBody>
+          <a:bodyPr wrap="square" rtlCol="0">
+            <a:spAutoFit/>
+          </a:bodyPr>
+          <a:lstStyle/>
+          <a:p>
+            <a:r>
+              <a:rPr lang="en-US" sz="1200" dirty="0">
+                <a:latin typeface="+mj-lt"/>
+              </a:rPr>
+              <a:t>10/10/2020 08:20 </a:t>
+            </a:r>
+            <a:r>
+              <a:rPr lang="en-US" sz="1200" dirty="0" err="1">
+                <a:latin typeface="+mj-lt"/>
+              </a:rPr>
+              <a:t>Thành</a:t>
+            </a:r>
+            <a:r>
+              <a:rPr lang="en-US" sz="1200" dirty="0">
+                <a:latin typeface="+mj-lt"/>
+              </a:rPr>
+              <a:t> </a:t>
+            </a:r>
+            <a:r>
+              <a:rPr lang="en-US" sz="1200" dirty="0" err="1">
+                <a:latin typeface="+mj-lt"/>
+              </a:rPr>
+              <a:t>tiền</a:t>
+            </a:r>
+            <a:r>
+              <a:rPr lang="en-US" sz="1200" dirty="0">
+                <a:latin typeface="+mj-lt"/>
+              </a:rPr>
+              <a:t>: 200,000VND</a:t>
+            </a:r>
+          </a:p>
+        </p:txBody>
+      </p:sp>
+      <p:sp>
+        <p:nvSpPr>
+          <p:cNvPr id="55" name="TextBox 54">
+            <a:extLst>
+              <a:ext uri="{FF2B5EF4-FFF2-40B4-BE49-F238E27FC236}">
+                <a16:creationId xmlns:a16="http://schemas.microsoft.com/office/drawing/2014/main" id="{74AA062A-FBC2-4F86-943D-D61FDEE1F488}"/>
+              </a:ext>
+            </a:extLst>
+          </p:cNvPr>
+          <p:cNvSpPr txBox="1"/>
+          <p:nvPr/>
+        </p:nvSpPr>
+        <p:spPr>
+          <a:xfrm>
+            <a:off x="4444357" y="4502525"/>
+            <a:ext cx="1295400" cy="276999"/>
+          </a:xfrm>
+          <a:prstGeom prst="rect">
+            <a:avLst/>
+          </a:prstGeom>
+          <a:noFill/>
+        </p:spPr>
+        <p:txBody>
+          <a:bodyPr wrap="square" rtlCol="0">
+            <a:spAutoFit/>
+          </a:bodyPr>
+          <a:lstStyle/>
+          <a:p>
+            <a:r>
+              <a:rPr lang="en-US" sz="1200" dirty="0" err="1">
+                <a:latin typeface="+mj-lt"/>
+              </a:rPr>
+              <a:t>Nội</a:t>
+            </a:r>
+            <a:r>
+              <a:rPr lang="en-US" sz="1200" dirty="0">
+                <a:latin typeface="+mj-lt"/>
+              </a:rPr>
+              <a:t> dung:</a:t>
+            </a:r>
+          </a:p>
+        </p:txBody>
+      </p:sp>
+      <p:sp>
+        <p:nvSpPr>
+          <p:cNvPr id="56" name="TextBox 55">
+            <a:extLst>
+              <a:ext uri="{FF2B5EF4-FFF2-40B4-BE49-F238E27FC236}">
+                <a16:creationId xmlns:a16="http://schemas.microsoft.com/office/drawing/2014/main" id="{05337194-B16B-4C72-9C86-364E6C2685D3}"/>
+              </a:ext>
+            </a:extLst>
+          </p:cNvPr>
+          <p:cNvSpPr txBox="1"/>
+          <p:nvPr/>
+        </p:nvSpPr>
+        <p:spPr>
+          <a:xfrm>
+            <a:off x="5426773" y="4622382"/>
+            <a:ext cx="3107627" cy="261610"/>
+          </a:xfrm>
+          <a:prstGeom prst="rect">
+            <a:avLst/>
+          </a:prstGeom>
+          <a:noFill/>
+        </p:spPr>
+        <p:txBody>
+          <a:bodyPr wrap="square" rtlCol="0">
+            <a:spAutoFit/>
+          </a:bodyPr>
+          <a:lstStyle/>
+          <a:p>
+            <a:r>
+              <a:rPr lang="en-US" sz="1100" dirty="0" err="1">
+                <a:latin typeface="+mj-lt"/>
+              </a:rPr>
+              <a:t>Thuốc</a:t>
+            </a:r>
+            <a:r>
+              <a:rPr lang="en-US" sz="1100" dirty="0">
+                <a:latin typeface="+mj-lt"/>
+              </a:rPr>
+              <a:t> A – 2 </a:t>
+            </a:r>
+            <a:r>
+              <a:rPr lang="en-US" sz="1100" dirty="0" err="1">
+                <a:latin typeface="+mj-lt"/>
+              </a:rPr>
+              <a:t>Hộp</a:t>
+            </a:r>
+            <a:r>
+              <a:rPr lang="en-US" sz="1100" dirty="0">
+                <a:latin typeface="+mj-lt"/>
+              </a:rPr>
+              <a:t>: 250,000VND</a:t>
+            </a:r>
+          </a:p>
+        </p:txBody>
+      </p:sp>
+      <p:sp>
+        <p:nvSpPr>
+          <p:cNvPr id="57" name="TextBox 56">
+            <a:extLst>
+              <a:ext uri="{FF2B5EF4-FFF2-40B4-BE49-F238E27FC236}">
+                <a16:creationId xmlns:a16="http://schemas.microsoft.com/office/drawing/2014/main" id="{90D547BF-0762-41F5-84B4-303584072F7A}"/>
+              </a:ext>
+            </a:extLst>
+          </p:cNvPr>
+          <p:cNvSpPr txBox="1"/>
+          <p:nvPr/>
+        </p:nvSpPr>
+        <p:spPr>
+          <a:xfrm>
+            <a:off x="4424215" y="3373219"/>
+            <a:ext cx="1295400" cy="276999"/>
+          </a:xfrm>
+          <a:prstGeom prst="rect">
+            <a:avLst/>
+          </a:prstGeom>
+          <a:noFill/>
+        </p:spPr>
+        <p:txBody>
+          <a:bodyPr wrap="square" rtlCol="0">
+            <a:spAutoFit/>
+          </a:bodyPr>
+          <a:lstStyle/>
+          <a:p>
+            <a:r>
+              <a:rPr lang="en-US" sz="1200" dirty="0">
+                <a:latin typeface="+mj-lt"/>
+              </a:rPr>
+              <a:t>Thanh </a:t>
+            </a:r>
+            <a:r>
+              <a:rPr lang="en-US" sz="1200" dirty="0" err="1">
+                <a:latin typeface="+mj-lt"/>
+              </a:rPr>
+              <a:t>toán</a:t>
+            </a:r>
+            <a:r>
+              <a:rPr lang="en-US" sz="1200" dirty="0">
+                <a:latin typeface="+mj-lt"/>
+              </a:rPr>
               <a:t>:</a:t>
             </a:r>
           </a:p>
@@ -10273,10 +10292,10 @@
       </p:sp>
       <p:sp>
         <p:nvSpPr>
-          <p:cNvPr id="51" name="Rectangle 50">
-            <a:extLst>
-              <a:ext uri="{FF2B5EF4-FFF2-40B4-BE49-F238E27FC236}">
-                <a16:creationId xmlns:a16="http://schemas.microsoft.com/office/drawing/2014/main" id="{8AF4A862-5198-45B4-9562-839926384826}"/>
+          <p:cNvPr id="58" name="Rectangle 57">
+            <a:extLst>
+              <a:ext uri="{FF2B5EF4-FFF2-40B4-BE49-F238E27FC236}">
+                <a16:creationId xmlns:a16="http://schemas.microsoft.com/office/drawing/2014/main" id="{82554FE1-CC09-4756-8850-A0A61052E47C}"/>
               </a:ext>
             </a:extLst>
           </p:cNvPr>
@@ -10285,8 +10304,8 @@
         </p:nvSpPr>
         <p:spPr>
           <a:xfrm>
-            <a:off x="5427678" y="3810000"/>
-            <a:ext cx="3124200" cy="533400"/>
+            <a:off x="5427678" y="3364642"/>
+            <a:ext cx="3124200" cy="261554"/>
           </a:xfrm>
           <a:prstGeom prst="rect">
             <a:avLst/>
@@ -10319,10 +10338,10 @@
       </p:sp>
       <p:sp>
         <p:nvSpPr>
-          <p:cNvPr id="52" name="TextBox 51">
-            <a:extLst>
-              <a:ext uri="{FF2B5EF4-FFF2-40B4-BE49-F238E27FC236}">
-                <a16:creationId xmlns:a16="http://schemas.microsoft.com/office/drawing/2014/main" id="{D0690CA8-A5D4-4189-BFC1-F726D6EFC49C}"/>
+          <p:cNvPr id="59" name="TextBox 58">
+            <a:extLst>
+              <a:ext uri="{FF2B5EF4-FFF2-40B4-BE49-F238E27FC236}">
+                <a16:creationId xmlns:a16="http://schemas.microsoft.com/office/drawing/2014/main" id="{D0B60453-84DF-48C8-AB34-9C904AAB7B32}"/>
               </a:ext>
             </a:extLst>
           </p:cNvPr>
@@ -10331,7 +10350,7 @@
         </p:nvSpPr>
         <p:spPr>
           <a:xfrm>
-            <a:off x="4424215" y="2983333"/>
+            <a:off x="4424215" y="3844307"/>
             <a:ext cx="1295400" cy="276999"/>
           </a:xfrm>
           <a:prstGeom prst="rect">
@@ -10349,7 +10368,7 @@
               <a:rPr lang="en-US" sz="1200" dirty="0" err="1">
                 <a:latin typeface="+mj-lt"/>
               </a:rPr>
-              <a:t>Tổng</a:t>
+              <a:t>Ghi</a:t>
             </a:r>
             <a:r>
               <a:rPr lang="en-US" sz="1200" dirty="0">
@@ -10361,7 +10380,7 @@
               <a:rPr lang="en-US" sz="1200" dirty="0" err="1">
                 <a:latin typeface="+mj-lt"/>
               </a:rPr>
-              <a:t>cộng</a:t>
+              <a:t>chú</a:t>
             </a:r>
             <a:r>
               <a:rPr lang="en-US" sz="1200" dirty="0">
@@ -10374,10 +10393,10 @@
       </p:sp>
       <p:sp>
         <p:nvSpPr>
-          <p:cNvPr id="53" name="Rectangle 52">
-            <a:extLst>
-              <a:ext uri="{FF2B5EF4-FFF2-40B4-BE49-F238E27FC236}">
-                <a16:creationId xmlns:a16="http://schemas.microsoft.com/office/drawing/2014/main" id="{204F543E-2462-4DF1-B28D-57639D2BEE07}"/>
+          <p:cNvPr id="60" name="Rectangle 59">
+            <a:extLst>
+              <a:ext uri="{FF2B5EF4-FFF2-40B4-BE49-F238E27FC236}">
+                <a16:creationId xmlns:a16="http://schemas.microsoft.com/office/drawing/2014/main" id="{2AFB514D-A02F-4B5E-B2FD-5130CF4F3006}"/>
               </a:ext>
             </a:extLst>
           </p:cNvPr>
@@ -10386,8 +10405,8 @@
         </p:nvSpPr>
         <p:spPr>
           <a:xfrm>
-            <a:off x="5427678" y="2974756"/>
-            <a:ext cx="3124200" cy="261554"/>
+            <a:off x="5427678" y="3810000"/>
+            <a:ext cx="3124200" cy="533400"/>
           </a:xfrm>
           <a:prstGeom prst="rect">
             <a:avLst/>
@@ -22896,7 +22915,7 @@
               <a:rPr lang="en-US" sz="1200" dirty="0">
                 <a:latin typeface="+mj-lt"/>
               </a:rPr>
-              <a:t>: 300,000đ</a:t>
+              <a:t>: 300,000VND</a:t>
             </a:r>
           </a:p>
         </p:txBody>
@@ -22957,7 +22976,7 @@
               <a:rPr lang="en-US" sz="1200" dirty="0">
                 <a:latin typeface="+mj-lt"/>
               </a:rPr>
-              <a:t>: 200,000đ</a:t>
+              <a:t>: 200,000VND</a:t>
             </a:r>
           </a:p>
         </p:txBody>
@@ -23089,43 +23108,19 @@
               <a:rPr lang="en-US" sz="1100" dirty="0">
                 <a:latin typeface="+mj-lt"/>
               </a:rPr>
-              <a:t> A - ĐVT: </a:t>
+              <a:t> A – 2 </a:t>
             </a:r>
             <a:r>
               <a:rPr lang="en-US" sz="1100" dirty="0" err="1">
                 <a:latin typeface="+mj-lt"/>
               </a:rPr>
-              <a:t>viên</a:t>
+              <a:t>Hộp</a:t>
             </a:r>
             <a:r>
               <a:rPr lang="en-US" sz="1100" dirty="0">
                 <a:latin typeface="+mj-lt"/>
               </a:rPr>
-              <a:t> - SL: 2 - </a:t>
-            </a:r>
-            <a:r>
-              <a:rPr lang="en-US" sz="1100" dirty="0" err="1">
-                <a:latin typeface="+mj-lt"/>
-              </a:rPr>
-              <a:t>Thành</a:t>
-            </a:r>
-            <a:r>
-              <a:rPr lang="en-US" sz="1100" dirty="0">
-                <a:latin typeface="+mj-lt"/>
-              </a:rPr>
-              <a:t> </a:t>
-            </a:r>
-            <a:r>
-              <a:rPr lang="en-US" sz="1100" dirty="0" err="1">
-                <a:latin typeface="+mj-lt"/>
-              </a:rPr>
-              <a:t>tiền</a:t>
-            </a:r>
-            <a:r>
-              <a:rPr lang="en-US" sz="1100" dirty="0">
-                <a:latin typeface="+mj-lt"/>
-              </a:rPr>
-              <a:t>: 250,000đ</a:t>
+              <a:t>: 250,000VND</a:t>
             </a:r>
           </a:p>
         </p:txBody>

</xml_diff>

<commit_message>
Implement SupplierDebtPage, change some datagrids to READONLY, Update UI
UpdateUI: Customer Debt, Supplier Debt

Signed-off-by: PhuocTran95 <nguyenbaphuoctran@gmail.com>
Change-Id: I3972f7036b8e84b81249573ae6c3b82127505ee5
</commit_message>
<xml_diff>
--- a/Pharmacy/UXUI/PagesUI.pptx
+++ b/Pharmacy/UXUI/PagesUI.pptx
@@ -235,7 +235,7 @@
           <a:p>
             <a:fld id="{E193EC3E-9EBC-4FB4-91A0-D81688C87301}" type="datetimeFigureOut">
               <a:rPr lang="en-US" smtClean="0"/>
-              <a:t>2/1/2021</a:t>
+              <a:t>2/3/2021</a:t>
             </a:fld>
             <a:endParaRPr lang="en-US"/>
           </a:p>
@@ -651,6 +651,90 @@
           <a:p>
             <a:fld id="{A6F3B38A-DAB2-4820-BD2E-7A10EE47D0F8}" type="slidenum">
               <a:rPr lang="en-US" smtClean="0"/>
+              <a:t>22</a:t>
+            </a:fld>
+            <a:endParaRPr lang="en-US"/>
+          </a:p>
+        </p:txBody>
+      </p:sp>
+    </p:spTree>
+    <p:extLst>
+      <p:ext uri="{BB962C8B-B14F-4D97-AF65-F5344CB8AC3E}">
+        <p14:creationId xmlns:p14="http://schemas.microsoft.com/office/powerpoint/2010/main" val="73648494"/>
+      </p:ext>
+    </p:extLst>
+  </p:cSld>
+  <p:clrMapOvr>
+    <a:masterClrMapping/>
+  </p:clrMapOvr>
+</p:notes>
+</file>
+
+<file path=ppt/notesSlides/notesSlide11.xml><?xml version="1.0" encoding="utf-8"?>
+<p:notes xmlns:a="http://schemas.openxmlformats.org/drawingml/2006/main" xmlns:r="http://schemas.openxmlformats.org/officeDocument/2006/relationships" xmlns:p="http://schemas.openxmlformats.org/presentationml/2006/main">
+  <p:cSld>
+    <p:spTree>
+      <p:nvGrpSpPr>
+        <p:cNvPr id="1" name=""/>
+        <p:cNvGrpSpPr/>
+        <p:nvPr/>
+      </p:nvGrpSpPr>
+      <p:grpSpPr>
+        <a:xfrm>
+          <a:off x="0" y="0"/>
+          <a:ext cx="0" cy="0"/>
+          <a:chOff x="0" y="0"/>
+          <a:chExt cx="0" cy="0"/>
+        </a:xfrm>
+      </p:grpSpPr>
+      <p:sp>
+        <p:nvSpPr>
+          <p:cNvPr id="2" name="Slide Image Placeholder 1"/>
+          <p:cNvSpPr>
+            <a:spLocks noGrp="1" noRot="1" noChangeAspect="1"/>
+          </p:cNvSpPr>
+          <p:nvPr>
+            <p:ph type="sldImg"/>
+          </p:nvPr>
+        </p:nvSpPr>
+        <p:spPr/>
+      </p:sp>
+      <p:sp>
+        <p:nvSpPr>
+          <p:cNvPr id="3" name="Notes Placeholder 2"/>
+          <p:cNvSpPr>
+            <a:spLocks noGrp="1"/>
+          </p:cNvSpPr>
+          <p:nvPr>
+            <p:ph type="body" idx="1"/>
+          </p:nvPr>
+        </p:nvSpPr>
+        <p:spPr/>
+        <p:txBody>
+          <a:bodyPr/>
+          <a:lstStyle/>
+          <a:p>
+            <a:endParaRPr lang="en-US" dirty="0"/>
+          </a:p>
+        </p:txBody>
+      </p:sp>
+      <p:sp>
+        <p:nvSpPr>
+          <p:cNvPr id="4" name="Slide Number Placeholder 3"/>
+          <p:cNvSpPr>
+            <a:spLocks noGrp="1"/>
+          </p:cNvSpPr>
+          <p:nvPr>
+            <p:ph type="sldNum" sz="quarter" idx="5"/>
+          </p:nvPr>
+        </p:nvSpPr>
+        <p:spPr/>
+        <p:txBody>
+          <a:bodyPr/>
+          <a:lstStyle/>
+          <a:p>
+            <a:fld id="{A6F3B38A-DAB2-4820-BD2E-7A10EE47D0F8}" type="slidenum">
+              <a:rPr lang="en-US" smtClean="0"/>
               <a:t>25</a:t>
             </a:fld>
             <a:endParaRPr lang="en-US"/>
@@ -1521,7 +1605,7 @@
           <a:p>
             <a:fld id="{EA91886C-002B-40DC-BBAF-4CA608631BA0}" type="datetimeFigureOut">
               <a:rPr lang="en-US" smtClean="0"/>
-              <a:t>2/1/2021</a:t>
+              <a:t>2/3/2021</a:t>
             </a:fld>
             <a:endParaRPr lang="en-US"/>
           </a:p>
@@ -1689,7 +1773,7 @@
           <a:p>
             <a:fld id="{EA91886C-002B-40DC-BBAF-4CA608631BA0}" type="datetimeFigureOut">
               <a:rPr lang="en-US" smtClean="0"/>
-              <a:t>2/1/2021</a:t>
+              <a:t>2/3/2021</a:t>
             </a:fld>
             <a:endParaRPr lang="en-US"/>
           </a:p>
@@ -1867,7 +1951,7 @@
           <a:p>
             <a:fld id="{EA91886C-002B-40DC-BBAF-4CA608631BA0}" type="datetimeFigureOut">
               <a:rPr lang="en-US" smtClean="0"/>
-              <a:t>2/1/2021</a:t>
+              <a:t>2/3/2021</a:t>
             </a:fld>
             <a:endParaRPr lang="en-US"/>
           </a:p>
@@ -2035,7 +2119,7 @@
           <a:p>
             <a:fld id="{EA91886C-002B-40DC-BBAF-4CA608631BA0}" type="datetimeFigureOut">
               <a:rPr lang="en-US" smtClean="0"/>
-              <a:t>2/1/2021</a:t>
+              <a:t>2/3/2021</a:t>
             </a:fld>
             <a:endParaRPr lang="en-US"/>
           </a:p>
@@ -2280,7 +2364,7 @@
           <a:p>
             <a:fld id="{EA91886C-002B-40DC-BBAF-4CA608631BA0}" type="datetimeFigureOut">
               <a:rPr lang="en-US" smtClean="0"/>
-              <a:t>2/1/2021</a:t>
+              <a:t>2/3/2021</a:t>
             </a:fld>
             <a:endParaRPr lang="en-US"/>
           </a:p>
@@ -2565,7 +2649,7 @@
           <a:p>
             <a:fld id="{EA91886C-002B-40DC-BBAF-4CA608631BA0}" type="datetimeFigureOut">
               <a:rPr lang="en-US" smtClean="0"/>
-              <a:t>2/1/2021</a:t>
+              <a:t>2/3/2021</a:t>
             </a:fld>
             <a:endParaRPr lang="en-US"/>
           </a:p>
@@ -2984,7 +3068,7 @@
           <a:p>
             <a:fld id="{EA91886C-002B-40DC-BBAF-4CA608631BA0}" type="datetimeFigureOut">
               <a:rPr lang="en-US" smtClean="0"/>
-              <a:t>2/1/2021</a:t>
+              <a:t>2/3/2021</a:t>
             </a:fld>
             <a:endParaRPr lang="en-US"/>
           </a:p>
@@ -3101,7 +3185,7 @@
           <a:p>
             <a:fld id="{EA91886C-002B-40DC-BBAF-4CA608631BA0}" type="datetimeFigureOut">
               <a:rPr lang="en-US" smtClean="0"/>
-              <a:t>2/1/2021</a:t>
+              <a:t>2/3/2021</a:t>
             </a:fld>
             <a:endParaRPr lang="en-US"/>
           </a:p>
@@ -3196,7 +3280,7 @@
           <a:p>
             <a:fld id="{EA91886C-002B-40DC-BBAF-4CA608631BA0}" type="datetimeFigureOut">
               <a:rPr lang="en-US" smtClean="0"/>
-              <a:t>2/1/2021</a:t>
+              <a:t>2/3/2021</a:t>
             </a:fld>
             <a:endParaRPr lang="en-US"/>
           </a:p>
@@ -3471,7 +3555,7 @@
           <a:p>
             <a:fld id="{EA91886C-002B-40DC-BBAF-4CA608631BA0}" type="datetimeFigureOut">
               <a:rPr lang="en-US" smtClean="0"/>
-              <a:t>2/1/2021</a:t>
+              <a:t>2/3/2021</a:t>
             </a:fld>
             <a:endParaRPr lang="en-US"/>
           </a:p>
@@ -3723,7 +3807,7 @@
           <a:p>
             <a:fld id="{EA91886C-002B-40DC-BBAF-4CA608631BA0}" type="datetimeFigureOut">
               <a:rPr lang="en-US" smtClean="0"/>
-              <a:t>2/1/2021</a:t>
+              <a:t>2/3/2021</a:t>
             </a:fld>
             <a:endParaRPr lang="en-US"/>
           </a:p>
@@ -3934,7 +4018,7 @@
           <a:p>
             <a:fld id="{EA91886C-002B-40DC-BBAF-4CA608631BA0}" type="datetimeFigureOut">
               <a:rPr lang="en-US" smtClean="0"/>
-              <a:t>2/1/2021</a:t>
+              <a:t>2/3/2021</a:t>
             </a:fld>
             <a:endParaRPr lang="en-US"/>
           </a:p>
@@ -11535,285 +11619,6 @@
       </p:graphicFrame>
       <p:sp>
         <p:nvSpPr>
-          <p:cNvPr id="53" name="TextBox 52">
-            <a:extLst>
-              <a:ext uri="{FF2B5EF4-FFF2-40B4-BE49-F238E27FC236}">
-                <a16:creationId xmlns:a16="http://schemas.microsoft.com/office/drawing/2014/main" id="{0A81DF9D-3B66-4EB3-B913-764CB1451577}"/>
-              </a:ext>
-            </a:extLst>
-          </p:cNvPr>
-          <p:cNvSpPr txBox="1"/>
-          <p:nvPr/>
-        </p:nvSpPr>
-        <p:spPr>
-          <a:xfrm>
-            <a:off x="6248400" y="4763637"/>
-            <a:ext cx="1295400" cy="276999"/>
-          </a:xfrm>
-          <a:prstGeom prst="rect">
-            <a:avLst/>
-          </a:prstGeom>
-          <a:noFill/>
-        </p:spPr>
-        <p:txBody>
-          <a:bodyPr wrap="square" rtlCol="0">
-            <a:spAutoFit/>
-          </a:bodyPr>
-          <a:lstStyle/>
-          <a:p>
-            <a:r>
-              <a:rPr lang="en-US" sz="1200" dirty="0" err="1">
-                <a:latin typeface="+mj-lt"/>
-              </a:rPr>
-              <a:t>Tổng</a:t>
-            </a:r>
-            <a:r>
-              <a:rPr lang="en-US" sz="1200" dirty="0">
-                <a:latin typeface="+mj-lt"/>
-              </a:rPr>
-              <a:t> </a:t>
-            </a:r>
-            <a:r>
-              <a:rPr lang="en-US" sz="1200" dirty="0" err="1">
-                <a:latin typeface="+mj-lt"/>
-              </a:rPr>
-              <a:t>nợ</a:t>
-            </a:r>
-            <a:r>
-              <a:rPr lang="en-US" sz="1200" dirty="0">
-                <a:latin typeface="+mj-lt"/>
-              </a:rPr>
-              <a:t>:</a:t>
-            </a:r>
-          </a:p>
-        </p:txBody>
-      </p:sp>
-      <p:sp>
-        <p:nvSpPr>
-          <p:cNvPr id="54" name="TextBox 53">
-            <a:extLst>
-              <a:ext uri="{FF2B5EF4-FFF2-40B4-BE49-F238E27FC236}">
-                <a16:creationId xmlns:a16="http://schemas.microsoft.com/office/drawing/2014/main" id="{285ED952-B657-4DD6-BD3D-89C78E728766}"/>
-              </a:ext>
-            </a:extLst>
-          </p:cNvPr>
-          <p:cNvSpPr txBox="1"/>
-          <p:nvPr/>
-        </p:nvSpPr>
-        <p:spPr>
-          <a:xfrm>
-            <a:off x="6248400" y="5181899"/>
-            <a:ext cx="1295400" cy="276999"/>
-          </a:xfrm>
-          <a:prstGeom prst="rect">
-            <a:avLst/>
-          </a:prstGeom>
-          <a:noFill/>
-        </p:spPr>
-        <p:txBody>
-          <a:bodyPr wrap="square" rtlCol="0">
-            <a:spAutoFit/>
-          </a:bodyPr>
-          <a:lstStyle/>
-          <a:p>
-            <a:r>
-              <a:rPr lang="en-US" sz="1200" dirty="0" err="1">
-                <a:latin typeface="+mj-lt"/>
-              </a:rPr>
-              <a:t>Đã</a:t>
-            </a:r>
-            <a:r>
-              <a:rPr lang="en-US" sz="1200" dirty="0">
-                <a:latin typeface="+mj-lt"/>
-              </a:rPr>
-              <a:t> </a:t>
-            </a:r>
-            <a:r>
-              <a:rPr lang="en-US" sz="1200" dirty="0" err="1">
-                <a:latin typeface="+mj-lt"/>
-              </a:rPr>
-              <a:t>trả</a:t>
-            </a:r>
-            <a:r>
-              <a:rPr lang="en-US" sz="1200" dirty="0">
-                <a:latin typeface="+mj-lt"/>
-              </a:rPr>
-              <a:t>:</a:t>
-            </a:r>
-          </a:p>
-        </p:txBody>
-      </p:sp>
-      <p:sp>
-        <p:nvSpPr>
-          <p:cNvPr id="55" name="TextBox 54">
-            <a:extLst>
-              <a:ext uri="{FF2B5EF4-FFF2-40B4-BE49-F238E27FC236}">
-                <a16:creationId xmlns:a16="http://schemas.microsoft.com/office/drawing/2014/main" id="{0363DA7F-8F5F-4BF3-9734-5D5EF3109253}"/>
-              </a:ext>
-            </a:extLst>
-          </p:cNvPr>
-          <p:cNvSpPr txBox="1"/>
-          <p:nvPr/>
-        </p:nvSpPr>
-        <p:spPr>
-          <a:xfrm>
-            <a:off x="6248400" y="5600161"/>
-            <a:ext cx="1295400" cy="276999"/>
-          </a:xfrm>
-          <a:prstGeom prst="rect">
-            <a:avLst/>
-          </a:prstGeom>
-          <a:noFill/>
-        </p:spPr>
-        <p:txBody>
-          <a:bodyPr wrap="square" rtlCol="0">
-            <a:spAutoFit/>
-          </a:bodyPr>
-          <a:lstStyle/>
-          <a:p>
-            <a:r>
-              <a:rPr lang="en-US" sz="1200" dirty="0" err="1">
-                <a:latin typeface="+mj-lt"/>
-              </a:rPr>
-              <a:t>Còn</a:t>
-            </a:r>
-            <a:r>
-              <a:rPr lang="en-US" sz="1200" dirty="0">
-                <a:latin typeface="+mj-lt"/>
-              </a:rPr>
-              <a:t> </a:t>
-            </a:r>
-            <a:r>
-              <a:rPr lang="en-US" sz="1200" dirty="0" err="1">
-                <a:latin typeface="+mj-lt"/>
-              </a:rPr>
-              <a:t>lại</a:t>
-            </a:r>
-            <a:r>
-              <a:rPr lang="en-US" sz="1200" dirty="0">
-                <a:latin typeface="+mj-lt"/>
-              </a:rPr>
-              <a:t>:</a:t>
-            </a:r>
-          </a:p>
-        </p:txBody>
-      </p:sp>
-      <p:sp>
-        <p:nvSpPr>
-          <p:cNvPr id="56" name="TextBox 55">
-            <a:extLst>
-              <a:ext uri="{FF2B5EF4-FFF2-40B4-BE49-F238E27FC236}">
-                <a16:creationId xmlns:a16="http://schemas.microsoft.com/office/drawing/2014/main" id="{F00E7184-C9B4-4353-86E8-BF6E98915666}"/>
-              </a:ext>
-            </a:extLst>
-          </p:cNvPr>
-          <p:cNvSpPr txBox="1"/>
-          <p:nvPr/>
-        </p:nvSpPr>
-        <p:spPr>
-          <a:xfrm>
-            <a:off x="7162800" y="4763637"/>
-            <a:ext cx="1295400" cy="276999"/>
-          </a:xfrm>
-          <a:prstGeom prst="rect">
-            <a:avLst/>
-          </a:prstGeom>
-          <a:noFill/>
-        </p:spPr>
-        <p:txBody>
-          <a:bodyPr wrap="square" rtlCol="0">
-            <a:spAutoFit/>
-          </a:bodyPr>
-          <a:lstStyle/>
-          <a:p>
-            <a:r>
-              <a:rPr lang="en-US" sz="1200" dirty="0">
-                <a:latin typeface="+mj-lt"/>
-              </a:rPr>
-              <a:t>500,000</a:t>
-            </a:r>
-          </a:p>
-        </p:txBody>
-      </p:sp>
-      <p:sp>
-        <p:nvSpPr>
-          <p:cNvPr id="57" name="TextBox 56">
-            <a:extLst>
-              <a:ext uri="{FF2B5EF4-FFF2-40B4-BE49-F238E27FC236}">
-                <a16:creationId xmlns:a16="http://schemas.microsoft.com/office/drawing/2014/main" id="{B09DCD21-9F4F-426E-B731-3FBDA87B9E35}"/>
-              </a:ext>
-            </a:extLst>
-          </p:cNvPr>
-          <p:cNvSpPr txBox="1"/>
-          <p:nvPr/>
-        </p:nvSpPr>
-        <p:spPr>
-          <a:xfrm>
-            <a:off x="7162800" y="5181899"/>
-            <a:ext cx="1295400" cy="276999"/>
-          </a:xfrm>
-          <a:prstGeom prst="rect">
-            <a:avLst/>
-          </a:prstGeom>
-          <a:noFill/>
-        </p:spPr>
-        <p:txBody>
-          <a:bodyPr wrap="square" rtlCol="0">
-            <a:spAutoFit/>
-          </a:bodyPr>
-          <a:lstStyle/>
-          <a:p>
-            <a:r>
-              <a:rPr lang="en-US" sz="1200" dirty="0">
-                <a:latin typeface="+mj-lt"/>
-              </a:rPr>
-              <a:t>250,000</a:t>
-            </a:r>
-          </a:p>
-        </p:txBody>
-      </p:sp>
-      <p:sp>
-        <p:nvSpPr>
-          <p:cNvPr id="58" name="TextBox 57">
-            <a:extLst>
-              <a:ext uri="{FF2B5EF4-FFF2-40B4-BE49-F238E27FC236}">
-                <a16:creationId xmlns:a16="http://schemas.microsoft.com/office/drawing/2014/main" id="{CB8F6CBC-464E-4B8C-BD38-219F6D6BAE63}"/>
-              </a:ext>
-            </a:extLst>
-          </p:cNvPr>
-          <p:cNvSpPr txBox="1"/>
-          <p:nvPr/>
-        </p:nvSpPr>
-        <p:spPr>
-          <a:xfrm>
-            <a:off x="7162800" y="5600161"/>
-            <a:ext cx="1295400" cy="400110"/>
-          </a:xfrm>
-          <a:prstGeom prst="rect">
-            <a:avLst/>
-          </a:prstGeom>
-          <a:noFill/>
-        </p:spPr>
-        <p:txBody>
-          <a:bodyPr wrap="square" rtlCol="0">
-            <a:spAutoFit/>
-          </a:bodyPr>
-          <a:lstStyle/>
-          <a:p>
-            <a:r>
-              <a:rPr lang="en-US" sz="2000" b="1" dirty="0">
-                <a:solidFill>
-                  <a:srgbClr val="FF0000"/>
-                </a:solidFill>
-                <a:latin typeface="+mj-lt"/>
-              </a:rPr>
-              <a:t>250,000</a:t>
-            </a:r>
-          </a:p>
-        </p:txBody>
-      </p:sp>
-      <p:sp>
-        <p:nvSpPr>
           <p:cNvPr id="20" name="TextBox 19">
             <a:extLst>
               <a:ext uri="{FF2B5EF4-FFF2-40B4-BE49-F238E27FC236}">
@@ -12113,6 +11918,297 @@
           </p:spPr>
         </p:pic>
       </p:grpSp>
+      <p:sp>
+        <p:nvSpPr>
+          <p:cNvPr id="32" name="TextBox 31">
+            <a:extLst>
+              <a:ext uri="{FF2B5EF4-FFF2-40B4-BE49-F238E27FC236}">
+                <a16:creationId xmlns:a16="http://schemas.microsoft.com/office/drawing/2014/main" id="{23B352A9-D2E5-4E42-8F86-090C1E93CE40}"/>
+              </a:ext>
+            </a:extLst>
+          </p:cNvPr>
+          <p:cNvSpPr txBox="1"/>
+          <p:nvPr/>
+        </p:nvSpPr>
+        <p:spPr>
+          <a:xfrm>
+            <a:off x="535413" y="5569634"/>
+            <a:ext cx="1295400" cy="276999"/>
+          </a:xfrm>
+          <a:prstGeom prst="rect">
+            <a:avLst/>
+          </a:prstGeom>
+          <a:noFill/>
+        </p:spPr>
+        <p:txBody>
+          <a:bodyPr wrap="square" rtlCol="0">
+            <a:spAutoFit/>
+          </a:bodyPr>
+          <a:lstStyle/>
+          <a:p>
+            <a:r>
+              <a:rPr lang="en-US" sz="1200" dirty="0" err="1">
+                <a:latin typeface="+mj-lt"/>
+              </a:rPr>
+              <a:t>Tổng</a:t>
+            </a:r>
+            <a:r>
+              <a:rPr lang="en-US" sz="1200" dirty="0">
+                <a:latin typeface="+mj-lt"/>
+              </a:rPr>
+              <a:t> </a:t>
+            </a:r>
+            <a:r>
+              <a:rPr lang="en-US" sz="1200" dirty="0" err="1">
+                <a:latin typeface="+mj-lt"/>
+              </a:rPr>
+              <a:t>nợ</a:t>
+            </a:r>
+            <a:r>
+              <a:rPr lang="en-US" sz="1200" dirty="0">
+                <a:latin typeface="+mj-lt"/>
+              </a:rPr>
+              <a:t>:</a:t>
+            </a:r>
+          </a:p>
+        </p:txBody>
+      </p:sp>
+      <p:sp>
+        <p:nvSpPr>
+          <p:cNvPr id="33" name="TextBox 32">
+            <a:extLst>
+              <a:ext uri="{FF2B5EF4-FFF2-40B4-BE49-F238E27FC236}">
+                <a16:creationId xmlns:a16="http://schemas.microsoft.com/office/drawing/2014/main" id="{7D4D2B2E-1B88-4B74-94AD-CD5FAC516325}"/>
+              </a:ext>
+            </a:extLst>
+          </p:cNvPr>
+          <p:cNvSpPr txBox="1"/>
+          <p:nvPr/>
+        </p:nvSpPr>
+        <p:spPr>
+          <a:xfrm>
+            <a:off x="535413" y="5987896"/>
+            <a:ext cx="1295400" cy="276999"/>
+          </a:xfrm>
+          <a:prstGeom prst="rect">
+            <a:avLst/>
+          </a:prstGeom>
+          <a:noFill/>
+        </p:spPr>
+        <p:txBody>
+          <a:bodyPr wrap="square" rtlCol="0">
+            <a:spAutoFit/>
+          </a:bodyPr>
+          <a:lstStyle/>
+          <a:p>
+            <a:r>
+              <a:rPr lang="en-US" sz="1200" dirty="0" err="1">
+                <a:latin typeface="+mj-lt"/>
+              </a:rPr>
+              <a:t>Đã</a:t>
+            </a:r>
+            <a:r>
+              <a:rPr lang="en-US" sz="1200" dirty="0">
+                <a:latin typeface="+mj-lt"/>
+              </a:rPr>
+              <a:t> </a:t>
+            </a:r>
+            <a:r>
+              <a:rPr lang="en-US" sz="1200" dirty="0" err="1">
+                <a:latin typeface="+mj-lt"/>
+              </a:rPr>
+              <a:t>thanh</a:t>
+            </a:r>
+            <a:r>
+              <a:rPr lang="en-US" sz="1200" dirty="0">
+                <a:latin typeface="+mj-lt"/>
+              </a:rPr>
+              <a:t> </a:t>
+            </a:r>
+            <a:r>
+              <a:rPr lang="en-US" sz="1200" dirty="0" err="1">
+                <a:latin typeface="+mj-lt"/>
+              </a:rPr>
+              <a:t>toán</a:t>
+            </a:r>
+            <a:r>
+              <a:rPr lang="en-US" sz="1200" dirty="0">
+                <a:latin typeface="+mj-lt"/>
+              </a:rPr>
+              <a:t>:</a:t>
+            </a:r>
+          </a:p>
+        </p:txBody>
+      </p:sp>
+      <p:sp>
+        <p:nvSpPr>
+          <p:cNvPr id="34" name="TextBox 33">
+            <a:extLst>
+              <a:ext uri="{FF2B5EF4-FFF2-40B4-BE49-F238E27FC236}">
+                <a16:creationId xmlns:a16="http://schemas.microsoft.com/office/drawing/2014/main" id="{880CC98C-5F2F-4808-85CC-5513F0BBED06}"/>
+              </a:ext>
+            </a:extLst>
+          </p:cNvPr>
+          <p:cNvSpPr txBox="1"/>
+          <p:nvPr/>
+        </p:nvSpPr>
+        <p:spPr>
+          <a:xfrm>
+            <a:off x="535413" y="6406158"/>
+            <a:ext cx="1295400" cy="276999"/>
+          </a:xfrm>
+          <a:prstGeom prst="rect">
+            <a:avLst/>
+          </a:prstGeom>
+          <a:noFill/>
+        </p:spPr>
+        <p:txBody>
+          <a:bodyPr wrap="square" rtlCol="0">
+            <a:spAutoFit/>
+          </a:bodyPr>
+          <a:lstStyle/>
+          <a:p>
+            <a:r>
+              <a:rPr lang="en-US" sz="1200" dirty="0" err="1">
+                <a:latin typeface="+mj-lt"/>
+              </a:rPr>
+              <a:t>Còn</a:t>
+            </a:r>
+            <a:r>
+              <a:rPr lang="en-US" sz="1200" dirty="0">
+                <a:latin typeface="+mj-lt"/>
+              </a:rPr>
+              <a:t> </a:t>
+            </a:r>
+            <a:r>
+              <a:rPr lang="en-US" sz="1200" dirty="0" err="1">
+                <a:latin typeface="+mj-lt"/>
+              </a:rPr>
+              <a:t>lại</a:t>
+            </a:r>
+            <a:r>
+              <a:rPr lang="en-US" sz="1200" dirty="0">
+                <a:latin typeface="+mj-lt"/>
+              </a:rPr>
+              <a:t>:</a:t>
+            </a:r>
+          </a:p>
+        </p:txBody>
+      </p:sp>
+      <p:sp>
+        <p:nvSpPr>
+          <p:cNvPr id="35" name="TextBox 34">
+            <a:extLst>
+              <a:ext uri="{FF2B5EF4-FFF2-40B4-BE49-F238E27FC236}">
+                <a16:creationId xmlns:a16="http://schemas.microsoft.com/office/drawing/2014/main" id="{72644866-79CA-4747-80B5-367DBBC423E8}"/>
+              </a:ext>
+            </a:extLst>
+          </p:cNvPr>
+          <p:cNvSpPr txBox="1"/>
+          <p:nvPr/>
+        </p:nvSpPr>
+        <p:spPr>
+          <a:xfrm>
+            <a:off x="1676400" y="5569634"/>
+            <a:ext cx="1295400" cy="307777"/>
+          </a:xfrm>
+          <a:prstGeom prst="rect">
+            <a:avLst/>
+          </a:prstGeom>
+          <a:noFill/>
+        </p:spPr>
+        <p:txBody>
+          <a:bodyPr wrap="square" rtlCol="0">
+            <a:spAutoFit/>
+          </a:bodyPr>
+          <a:lstStyle/>
+          <a:p>
+            <a:r>
+              <a:rPr lang="en-US" sz="1400" b="1" dirty="0">
+                <a:latin typeface="+mj-lt"/>
+              </a:rPr>
+              <a:t>500,000</a:t>
+            </a:r>
+          </a:p>
+        </p:txBody>
+      </p:sp>
+      <p:sp>
+        <p:nvSpPr>
+          <p:cNvPr id="36" name="TextBox 35">
+            <a:extLst>
+              <a:ext uri="{FF2B5EF4-FFF2-40B4-BE49-F238E27FC236}">
+                <a16:creationId xmlns:a16="http://schemas.microsoft.com/office/drawing/2014/main" id="{6044C464-4557-4545-AE3E-834D38DAD8F6}"/>
+              </a:ext>
+            </a:extLst>
+          </p:cNvPr>
+          <p:cNvSpPr txBox="1"/>
+          <p:nvPr/>
+        </p:nvSpPr>
+        <p:spPr>
+          <a:xfrm>
+            <a:off x="1676400" y="5987896"/>
+            <a:ext cx="1295400" cy="276999"/>
+          </a:xfrm>
+          <a:prstGeom prst="rect">
+            <a:avLst/>
+          </a:prstGeom>
+          <a:noFill/>
+        </p:spPr>
+        <p:txBody>
+          <a:bodyPr wrap="square" rtlCol="0">
+            <a:spAutoFit/>
+          </a:bodyPr>
+          <a:lstStyle/>
+          <a:p>
+            <a:r>
+              <a:rPr lang="en-US" sz="1200" dirty="0">
+                <a:latin typeface="+mj-lt"/>
+              </a:rPr>
+              <a:t>250,000</a:t>
+            </a:r>
+          </a:p>
+        </p:txBody>
+      </p:sp>
+      <p:sp>
+        <p:nvSpPr>
+          <p:cNvPr id="37" name="TextBox 36">
+            <a:extLst>
+              <a:ext uri="{FF2B5EF4-FFF2-40B4-BE49-F238E27FC236}">
+                <a16:creationId xmlns:a16="http://schemas.microsoft.com/office/drawing/2014/main" id="{12A74E4C-1180-45CF-82D0-F78FC2C95AA5}"/>
+              </a:ext>
+            </a:extLst>
+          </p:cNvPr>
+          <p:cNvSpPr txBox="1"/>
+          <p:nvPr/>
+        </p:nvSpPr>
+        <p:spPr>
+          <a:xfrm>
+            <a:off x="1676400" y="6406158"/>
+            <a:ext cx="1295400" cy="400110"/>
+          </a:xfrm>
+          <a:prstGeom prst="rect">
+            <a:avLst/>
+          </a:prstGeom>
+          <a:noFill/>
+        </p:spPr>
+        <p:txBody>
+          <a:bodyPr wrap="square" rtlCol="0">
+            <a:spAutoFit/>
+          </a:bodyPr>
+          <a:lstStyle/>
+          <a:p>
+            <a:r>
+              <a:rPr lang="en-US" sz="2000" b="1" dirty="0">
+                <a:solidFill>
+                  <a:srgbClr val="FF0000"/>
+                </a:solidFill>
+                <a:latin typeface="+mj-lt"/>
+              </a:rPr>
+              <a:t>250,000</a:t>
+            </a:r>
+          </a:p>
+        </p:txBody>
+      </p:sp>
     </p:spTree>
     <p:extLst>
       <p:ext uri="{BB962C8B-B14F-4D97-AF65-F5344CB8AC3E}">
@@ -22510,7 +22606,7 @@
 </file>
 
 <file path=ppt/slides/slide21.xml><?xml version="1.0" encoding="utf-8"?>
-<p:sld xmlns:a="http://schemas.openxmlformats.org/drawingml/2006/main" xmlns:r="http://schemas.openxmlformats.org/officeDocument/2006/relationships" xmlns:p="http://schemas.openxmlformats.org/presentationml/2006/main">
+<p:sld xmlns:a="http://schemas.openxmlformats.org/drawingml/2006/main" xmlns:r="http://schemas.openxmlformats.org/officeDocument/2006/relationships" xmlns:p="http://schemas.openxmlformats.org/presentationml/2006/main" show="0">
   <p:cSld>
     <p:spTree>
       <p:nvGrpSpPr>
@@ -24159,7 +24255,7 @@
           <p:nvPr/>
         </p:nvPicPr>
         <p:blipFill>
-          <a:blip r:embed="rId2"/>
+          <a:blip r:embed="rId3"/>
           <a:stretch>
             <a:fillRect/>
           </a:stretch>
@@ -24174,80 +24270,6 @@
           </a:prstGeom>
         </p:spPr>
       </p:pic>
-      <p:sp>
-        <p:nvSpPr>
-          <p:cNvPr id="42" name="Rectangle 41">
-            <a:extLst>
-              <a:ext uri="{FF2B5EF4-FFF2-40B4-BE49-F238E27FC236}">
-                <a16:creationId xmlns:a16="http://schemas.microsoft.com/office/drawing/2014/main" id="{353BFA1C-32B8-4D02-82DD-D04AE5441E95}"/>
-              </a:ext>
-            </a:extLst>
-          </p:cNvPr>
-          <p:cNvSpPr/>
-          <p:nvPr/>
-        </p:nvSpPr>
-        <p:spPr>
-          <a:xfrm>
-            <a:off x="5943600" y="6364868"/>
-            <a:ext cx="1371600" cy="358165"/>
-          </a:xfrm>
-          <a:prstGeom prst="rect">
-            <a:avLst/>
-          </a:prstGeom>
-          <a:solidFill>
-            <a:schemeClr val="bg1">
-              <a:lumMod val="65000"/>
-            </a:schemeClr>
-          </a:solidFill>
-          <a:ln>
-            <a:noFill/>
-          </a:ln>
-        </p:spPr>
-        <p:style>
-          <a:lnRef idx="2">
-            <a:schemeClr val="accent1">
-              <a:shade val="50000"/>
-            </a:schemeClr>
-          </a:lnRef>
-          <a:fillRef idx="1">
-            <a:schemeClr val="accent1"/>
-          </a:fillRef>
-          <a:effectRef idx="0">
-            <a:schemeClr val="accent1"/>
-          </a:effectRef>
-          <a:fontRef idx="minor">
-            <a:schemeClr val="lt1"/>
-          </a:fontRef>
-        </p:style>
-        <p:txBody>
-          <a:bodyPr rtlCol="0" anchor="ctr"/>
-          <a:lstStyle/>
-          <a:p>
-            <a:pPr algn="ctr"/>
-            <a:r>
-              <a:rPr lang="en-US" dirty="0" err="1">
-                <a:latin typeface="+mj-lt"/>
-              </a:rPr>
-              <a:t>Trở</a:t>
-            </a:r>
-            <a:r>
-              <a:rPr lang="en-US" dirty="0">
-                <a:latin typeface="+mj-lt"/>
-              </a:rPr>
-              <a:t> </a:t>
-            </a:r>
-            <a:r>
-              <a:rPr lang="en-US" dirty="0" err="1">
-                <a:latin typeface="+mj-lt"/>
-              </a:rPr>
-              <a:t>lại</a:t>
-            </a:r>
-            <a:endParaRPr lang="en-US" dirty="0">
-              <a:latin typeface="+mj-lt"/>
-            </a:endParaRPr>
-          </a:p>
-        </p:txBody>
-      </p:sp>
       <p:sp>
         <p:nvSpPr>
           <p:cNvPr id="43" name="TextBox 42">
@@ -24881,7 +24903,7 @@
         </p:nvSpPr>
         <p:spPr>
           <a:xfrm>
-            <a:off x="6248400" y="4763637"/>
+            <a:off x="535413" y="5569634"/>
             <a:ext cx="1295400" cy="276999"/>
           </a:xfrm>
           <a:prstGeom prst="rect">
@@ -24936,7 +24958,7 @@
         </p:nvSpPr>
         <p:spPr>
           <a:xfrm>
-            <a:off x="6248400" y="5181899"/>
+            <a:off x="535413" y="5987896"/>
             <a:ext cx="1295400" cy="276999"/>
           </a:xfrm>
           <a:prstGeom prst="rect">
@@ -24966,12 +24988,24 @@
               <a:rPr lang="en-US" sz="1200" dirty="0" err="1">
                 <a:latin typeface="+mj-lt"/>
               </a:rPr>
-              <a:t>trả</a:t>
+              <a:t>thanh</a:t>
             </a:r>
             <a:r>
               <a:rPr lang="en-US" sz="1200" dirty="0">
                 <a:latin typeface="+mj-lt"/>
               </a:rPr>
+              <a:t> </a:t>
+            </a:r>
+            <a:r>
+              <a:rPr lang="en-US" sz="1200" dirty="0" err="1">
+                <a:latin typeface="+mj-lt"/>
+              </a:rPr>
+              <a:t>toán</a:t>
+            </a:r>
+            <a:r>
+              <a:rPr lang="en-US" sz="1200" dirty="0">
+                <a:latin typeface="+mj-lt"/>
+              </a:rPr>
               <a:t>:</a:t>
             </a:r>
           </a:p>
@@ -24991,7 +25025,7 @@
         </p:nvSpPr>
         <p:spPr>
           <a:xfrm>
-            <a:off x="6248400" y="5600161"/>
+            <a:off x="535413" y="6406158"/>
             <a:ext cx="1295400" cy="276999"/>
           </a:xfrm>
           <a:prstGeom prst="rect">
@@ -25046,8 +25080,8 @@
         </p:nvSpPr>
         <p:spPr>
           <a:xfrm>
-            <a:off x="7162800" y="4763637"/>
-            <a:ext cx="1295400" cy="276999"/>
+            <a:off x="1676400" y="5569634"/>
+            <a:ext cx="1295400" cy="307777"/>
           </a:xfrm>
           <a:prstGeom prst="rect">
             <a:avLst/>
@@ -25061,7 +25095,7 @@
           <a:lstStyle/>
           <a:p>
             <a:r>
-              <a:rPr lang="en-US" sz="1200" dirty="0">
+              <a:rPr lang="en-US" sz="1400" b="1" dirty="0">
                 <a:latin typeface="+mj-lt"/>
               </a:rPr>
               <a:t>500,000</a:t>
@@ -25083,7 +25117,7 @@
         </p:nvSpPr>
         <p:spPr>
           <a:xfrm>
-            <a:off x="7162800" y="5181899"/>
+            <a:off x="1676400" y="5987896"/>
             <a:ext cx="1295400" cy="276999"/>
           </a:xfrm>
           <a:prstGeom prst="rect">
@@ -25120,7 +25154,7 @@
         </p:nvSpPr>
         <p:spPr>
           <a:xfrm>
-            <a:off x="7162800" y="5600161"/>
+            <a:off x="1676400" y="6406158"/>
             <a:ext cx="1295400" cy="400110"/>
           </a:xfrm>
           <a:prstGeom prst="rect">
@@ -25324,10 +25358,212 @@
       </p:sp>
       <p:sp>
         <p:nvSpPr>
-          <p:cNvPr id="17" name="Rectangle 16">
-            <a:extLst>
-              <a:ext uri="{FF2B5EF4-FFF2-40B4-BE49-F238E27FC236}">
-                <a16:creationId xmlns:a16="http://schemas.microsoft.com/office/drawing/2014/main" id="{9BEF0E3C-8449-4AF0-A164-41E667D1DD98}"/>
+          <p:cNvPr id="18" name="TextBox 17">
+            <a:extLst>
+              <a:ext uri="{FF2B5EF4-FFF2-40B4-BE49-F238E27FC236}">
+                <a16:creationId xmlns:a16="http://schemas.microsoft.com/office/drawing/2014/main" id="{4AA1BF53-BC7B-40F6-92D8-40F53E3B5C1F}"/>
+              </a:ext>
+            </a:extLst>
+          </p:cNvPr>
+          <p:cNvSpPr txBox="1"/>
+          <p:nvPr/>
+        </p:nvSpPr>
+        <p:spPr>
+          <a:xfrm>
+            <a:off x="7315200" y="3429000"/>
+            <a:ext cx="1295400" cy="276999"/>
+          </a:xfrm>
+          <a:prstGeom prst="rect">
+            <a:avLst/>
+          </a:prstGeom>
+          <a:noFill/>
+        </p:spPr>
+        <p:txBody>
+          <a:bodyPr wrap="square" rtlCol="0">
+            <a:spAutoFit/>
+          </a:bodyPr>
+          <a:lstStyle/>
+          <a:p>
+            <a:pPr algn="r"/>
+            <a:r>
+              <a:rPr lang="en-US" sz="1200" i="1" u="sng" dirty="0" err="1">
+                <a:solidFill>
+                  <a:srgbClr val="0070C0"/>
+                </a:solidFill>
+                <a:latin typeface="+mj-lt"/>
+              </a:rPr>
+              <a:t>Xem</a:t>
+            </a:r>
+            <a:r>
+              <a:rPr lang="en-US" sz="1200" i="1" u="sng" dirty="0">
+                <a:solidFill>
+                  <a:srgbClr val="0070C0"/>
+                </a:solidFill>
+                <a:latin typeface="+mj-lt"/>
+              </a:rPr>
+              <a:t> </a:t>
+            </a:r>
+            <a:r>
+              <a:rPr lang="en-US" sz="1200" i="1" u="sng" dirty="0" err="1">
+                <a:solidFill>
+                  <a:srgbClr val="0070C0"/>
+                </a:solidFill>
+                <a:latin typeface="+mj-lt"/>
+              </a:rPr>
+              <a:t>hóa</a:t>
+            </a:r>
+            <a:r>
+              <a:rPr lang="en-US" sz="1200" i="1" u="sng" dirty="0">
+                <a:solidFill>
+                  <a:srgbClr val="0070C0"/>
+                </a:solidFill>
+                <a:latin typeface="+mj-lt"/>
+              </a:rPr>
+              <a:t> </a:t>
+            </a:r>
+            <a:r>
+              <a:rPr lang="en-US" sz="1200" i="1" u="sng" dirty="0" err="1">
+                <a:solidFill>
+                  <a:srgbClr val="0070C0"/>
+                </a:solidFill>
+                <a:latin typeface="+mj-lt"/>
+              </a:rPr>
+              <a:t>đơn</a:t>
+            </a:r>
+            <a:endParaRPr lang="en-US" sz="1200" i="1" u="sng" dirty="0">
+              <a:solidFill>
+                <a:srgbClr val="0070C0"/>
+              </a:solidFill>
+              <a:latin typeface="+mj-lt"/>
+            </a:endParaRPr>
+          </a:p>
+        </p:txBody>
+      </p:sp>
+      <p:sp>
+        <p:nvSpPr>
+          <p:cNvPr id="22" name="TextBox 21">
+            <a:extLst>
+              <a:ext uri="{FF2B5EF4-FFF2-40B4-BE49-F238E27FC236}">
+                <a16:creationId xmlns:a16="http://schemas.microsoft.com/office/drawing/2014/main" id="{6D247830-2565-4644-BF16-8F85EF250857}"/>
+              </a:ext>
+            </a:extLst>
+          </p:cNvPr>
+          <p:cNvSpPr txBox="1"/>
+          <p:nvPr/>
+        </p:nvSpPr>
+        <p:spPr>
+          <a:xfrm>
+            <a:off x="7315200" y="3857864"/>
+            <a:ext cx="1295400" cy="276999"/>
+          </a:xfrm>
+          <a:prstGeom prst="rect">
+            <a:avLst/>
+          </a:prstGeom>
+          <a:noFill/>
+        </p:spPr>
+        <p:txBody>
+          <a:bodyPr wrap="square" rtlCol="0">
+            <a:spAutoFit/>
+          </a:bodyPr>
+          <a:lstStyle/>
+          <a:p>
+            <a:pPr algn="r"/>
+            <a:r>
+              <a:rPr lang="en-US" sz="1200" i="1" u="sng" dirty="0" err="1">
+                <a:solidFill>
+                  <a:srgbClr val="0070C0"/>
+                </a:solidFill>
+                <a:latin typeface="+mj-lt"/>
+              </a:rPr>
+              <a:t>Xem</a:t>
+            </a:r>
+            <a:r>
+              <a:rPr lang="en-US" sz="1200" i="1" u="sng" dirty="0">
+                <a:solidFill>
+                  <a:srgbClr val="0070C0"/>
+                </a:solidFill>
+                <a:latin typeface="+mj-lt"/>
+              </a:rPr>
+              <a:t> </a:t>
+            </a:r>
+            <a:r>
+              <a:rPr lang="en-US" sz="1200" i="1" u="sng" dirty="0" err="1">
+                <a:solidFill>
+                  <a:srgbClr val="0070C0"/>
+                </a:solidFill>
+                <a:latin typeface="+mj-lt"/>
+              </a:rPr>
+              <a:t>hóa</a:t>
+            </a:r>
+            <a:r>
+              <a:rPr lang="en-US" sz="1200" i="1" u="sng" dirty="0">
+                <a:solidFill>
+                  <a:srgbClr val="0070C0"/>
+                </a:solidFill>
+                <a:latin typeface="+mj-lt"/>
+              </a:rPr>
+              <a:t> </a:t>
+            </a:r>
+            <a:r>
+              <a:rPr lang="en-US" sz="1200" i="1" u="sng" dirty="0" err="1">
+                <a:solidFill>
+                  <a:srgbClr val="0070C0"/>
+                </a:solidFill>
+                <a:latin typeface="+mj-lt"/>
+              </a:rPr>
+              <a:t>đơn</a:t>
+            </a:r>
+            <a:endParaRPr lang="en-US" sz="1200" i="1" u="sng" dirty="0">
+              <a:solidFill>
+                <a:srgbClr val="0070C0"/>
+              </a:solidFill>
+              <a:latin typeface="+mj-lt"/>
+            </a:endParaRPr>
+          </a:p>
+        </p:txBody>
+      </p:sp>
+      <p:pic>
+        <p:nvPicPr>
+          <p:cNvPr id="23" name="Picture 22">
+            <a:extLst>
+              <a:ext uri="{FF2B5EF4-FFF2-40B4-BE49-F238E27FC236}">
+                <a16:creationId xmlns:a16="http://schemas.microsoft.com/office/drawing/2014/main" id="{C646A48A-F738-43B4-9B1D-67FC4EF2DF4B}"/>
+              </a:ext>
+            </a:extLst>
+          </p:cNvPr>
+          <p:cNvPicPr>
+            <a:picLocks noChangeAspect="1"/>
+          </p:cNvPicPr>
+          <p:nvPr/>
+        </p:nvPicPr>
+        <p:blipFill>
+          <a:blip r:embed="rId4" cstate="print">
+            <a:extLst>
+              <a:ext uri="{28A0092B-C50C-407E-A947-70E740481C1C}">
+                <a14:useLocalDpi xmlns:a14="http://schemas.microsoft.com/office/drawing/2010/main" val="0"/>
+              </a:ext>
+            </a:extLst>
+          </a:blip>
+          <a:stretch>
+            <a:fillRect/>
+          </a:stretch>
+        </p:blipFill>
+        <p:spPr>
+          <a:xfrm>
+            <a:off x="506654" y="931247"/>
+            <a:ext cx="407746" cy="407746"/>
+          </a:xfrm>
+          <a:prstGeom prst="rect">
+            <a:avLst/>
+          </a:prstGeom>
+        </p:spPr>
+      </p:pic>
+      <p:sp>
+        <p:nvSpPr>
+          <p:cNvPr id="25" name="Rectangle 24">
+            <a:extLst>
+              <a:ext uri="{FF2B5EF4-FFF2-40B4-BE49-F238E27FC236}">
+                <a16:creationId xmlns:a16="http://schemas.microsoft.com/office/drawing/2014/main" id="{EC213373-7A4E-40B0-8875-BBFE323A15D8}"/>
               </a:ext>
             </a:extLst>
           </p:cNvPr>
@@ -25336,14 +25572,16 @@
         </p:nvSpPr>
         <p:spPr>
           <a:xfrm>
-            <a:off x="7467598" y="6361155"/>
+            <a:off x="7620000" y="6373058"/>
             <a:ext cx="1371600" cy="358165"/>
           </a:xfrm>
           <a:prstGeom prst="rect">
             <a:avLst/>
           </a:prstGeom>
           <a:solidFill>
-            <a:srgbClr val="4BBF60"/>
+            <a:schemeClr val="bg1">
+              <a:lumMod val="65000"/>
+            </a:schemeClr>
           </a:solidFill>
           <a:ln>
             <a:noFill/>
@@ -25371,16 +25609,22 @@
           <a:p>
             <a:pPr algn="ctr"/>
             <a:r>
+              <a:rPr lang="en-US" dirty="0" err="1">
+                <a:latin typeface="+mj-lt"/>
+              </a:rPr>
+              <a:t>Trở</a:t>
+            </a:r>
+            <a:r>
               <a:rPr lang="en-US" dirty="0">
                 <a:latin typeface="+mj-lt"/>
               </a:rPr>
-              <a:t>Thanh </a:t>
+              <a:t> </a:t>
             </a:r>
             <a:r>
               <a:rPr lang="en-US" dirty="0" err="1">
                 <a:latin typeface="+mj-lt"/>
               </a:rPr>
-              <a:t>toán</a:t>
+              <a:t>lại</a:t>
             </a:r>
             <a:endParaRPr lang="en-US" dirty="0">
               <a:latin typeface="+mj-lt"/>
@@ -25388,208 +25632,141 @@
           </a:p>
         </p:txBody>
       </p:sp>
-      <p:sp>
-        <p:nvSpPr>
-          <p:cNvPr id="18" name="TextBox 17">
-            <a:extLst>
-              <a:ext uri="{FF2B5EF4-FFF2-40B4-BE49-F238E27FC236}">
-                <a16:creationId xmlns:a16="http://schemas.microsoft.com/office/drawing/2014/main" id="{4AA1BF53-BC7B-40F6-92D8-40F53E3B5C1F}"/>
-              </a:ext>
-            </a:extLst>
-          </p:cNvPr>
-          <p:cNvSpPr txBox="1"/>
-          <p:nvPr/>
-        </p:nvSpPr>
-        <p:spPr>
-          <a:xfrm>
-            <a:off x="7315200" y="3429000"/>
-            <a:ext cx="1295400" cy="276999"/>
-          </a:xfrm>
-          <a:prstGeom prst="rect">
-            <a:avLst/>
-          </a:prstGeom>
-          <a:noFill/>
-        </p:spPr>
-        <p:txBody>
-          <a:bodyPr wrap="square" rtlCol="0">
-            <a:spAutoFit/>
-          </a:bodyPr>
-          <a:lstStyle/>
-          <a:p>
-            <a:pPr algn="r"/>
-            <a:r>
-              <a:rPr lang="en-US" sz="1200" i="1" u="sng" dirty="0" err="1">
-                <a:solidFill>
-                  <a:srgbClr val="0070C0"/>
-                </a:solidFill>
-                <a:latin typeface="+mj-lt"/>
-              </a:rPr>
-              <a:t>Xem</a:t>
-            </a:r>
-            <a:r>
-              <a:rPr lang="en-US" sz="1200" i="1" u="sng" dirty="0">
-                <a:solidFill>
-                  <a:srgbClr val="0070C0"/>
-                </a:solidFill>
-                <a:latin typeface="+mj-lt"/>
-              </a:rPr>
-              <a:t> </a:t>
-            </a:r>
-            <a:r>
-              <a:rPr lang="en-US" sz="1200" i="1" u="sng" dirty="0" err="1">
-                <a:solidFill>
-                  <a:srgbClr val="0070C0"/>
-                </a:solidFill>
-                <a:latin typeface="+mj-lt"/>
-              </a:rPr>
-              <a:t>hóa</a:t>
-            </a:r>
-            <a:r>
-              <a:rPr lang="en-US" sz="1200" i="1" u="sng" dirty="0">
-                <a:solidFill>
-                  <a:srgbClr val="0070C0"/>
-                </a:solidFill>
-                <a:latin typeface="+mj-lt"/>
-              </a:rPr>
-              <a:t> </a:t>
-            </a:r>
-            <a:r>
-              <a:rPr lang="en-US" sz="1200" i="1" u="sng" dirty="0" err="1">
-                <a:solidFill>
-                  <a:srgbClr val="0070C0"/>
-                </a:solidFill>
-                <a:latin typeface="+mj-lt"/>
-              </a:rPr>
-              <a:t>đơn</a:t>
-            </a:r>
-            <a:endParaRPr lang="en-US" sz="1200" i="1" u="sng" dirty="0">
-              <a:solidFill>
-                <a:srgbClr val="0070C0"/>
-              </a:solidFill>
-              <a:latin typeface="+mj-lt"/>
-            </a:endParaRPr>
-          </a:p>
-        </p:txBody>
-      </p:sp>
-      <p:sp>
-        <p:nvSpPr>
-          <p:cNvPr id="22" name="TextBox 21">
-            <a:extLst>
-              <a:ext uri="{FF2B5EF4-FFF2-40B4-BE49-F238E27FC236}">
-                <a16:creationId xmlns:a16="http://schemas.microsoft.com/office/drawing/2014/main" id="{6D247830-2565-4644-BF16-8F85EF250857}"/>
-              </a:ext>
-            </a:extLst>
-          </p:cNvPr>
-          <p:cNvSpPr txBox="1"/>
-          <p:nvPr/>
-        </p:nvSpPr>
-        <p:spPr>
-          <a:xfrm>
-            <a:off x="7315200" y="3857864"/>
-            <a:ext cx="1295400" cy="276999"/>
-          </a:xfrm>
-          <a:prstGeom prst="rect">
-            <a:avLst/>
-          </a:prstGeom>
-          <a:noFill/>
-        </p:spPr>
-        <p:txBody>
-          <a:bodyPr wrap="square" rtlCol="0">
-            <a:spAutoFit/>
-          </a:bodyPr>
-          <a:lstStyle/>
-          <a:p>
-            <a:pPr algn="r"/>
-            <a:r>
-              <a:rPr lang="en-US" sz="1200" i="1" u="sng" dirty="0" err="1">
-                <a:solidFill>
-                  <a:srgbClr val="0070C0"/>
-                </a:solidFill>
-                <a:latin typeface="+mj-lt"/>
-              </a:rPr>
-              <a:t>Xem</a:t>
-            </a:r>
-            <a:r>
-              <a:rPr lang="en-US" sz="1200" i="1" u="sng" dirty="0">
-                <a:solidFill>
-                  <a:srgbClr val="0070C0"/>
-                </a:solidFill>
-                <a:latin typeface="+mj-lt"/>
-              </a:rPr>
-              <a:t> </a:t>
-            </a:r>
-            <a:r>
-              <a:rPr lang="en-US" sz="1200" i="1" u="sng" dirty="0" err="1">
-                <a:solidFill>
-                  <a:srgbClr val="0070C0"/>
-                </a:solidFill>
-                <a:latin typeface="+mj-lt"/>
-              </a:rPr>
-              <a:t>hóa</a:t>
-            </a:r>
-            <a:r>
-              <a:rPr lang="en-US" sz="1200" i="1" u="sng" dirty="0">
-                <a:solidFill>
-                  <a:srgbClr val="0070C0"/>
-                </a:solidFill>
-                <a:latin typeface="+mj-lt"/>
-              </a:rPr>
-              <a:t> </a:t>
-            </a:r>
-            <a:r>
-              <a:rPr lang="en-US" sz="1200" i="1" u="sng" dirty="0" err="1">
-                <a:solidFill>
-                  <a:srgbClr val="0070C0"/>
-                </a:solidFill>
-                <a:latin typeface="+mj-lt"/>
-              </a:rPr>
-              <a:t>đơn</a:t>
-            </a:r>
-            <a:endParaRPr lang="en-US" sz="1200" i="1" u="sng" dirty="0">
-              <a:solidFill>
-                <a:srgbClr val="0070C0"/>
-              </a:solidFill>
-              <a:latin typeface="+mj-lt"/>
-            </a:endParaRPr>
-          </a:p>
-        </p:txBody>
-      </p:sp>
-      <p:pic>
-        <p:nvPicPr>
-          <p:cNvPr id="23" name="Picture 22">
-            <a:extLst>
-              <a:ext uri="{FF2B5EF4-FFF2-40B4-BE49-F238E27FC236}">
-                <a16:creationId xmlns:a16="http://schemas.microsoft.com/office/drawing/2014/main" id="{C646A48A-F738-43B4-9B1D-67FC4EF2DF4B}"/>
-              </a:ext>
-            </a:extLst>
-          </p:cNvPr>
-          <p:cNvPicPr>
-            <a:picLocks noChangeAspect="1"/>
-          </p:cNvPicPr>
-          <p:nvPr/>
-        </p:nvPicPr>
-        <p:blipFill>
-          <a:blip r:embed="rId3" cstate="print">
-            <a:extLst>
-              <a:ext uri="{28A0092B-C50C-407E-A947-70E740481C1C}">
-                <a14:useLocalDpi xmlns:a14="http://schemas.microsoft.com/office/drawing/2010/main" val="0"/>
-              </a:ext>
-            </a:extLst>
-          </a:blip>
-          <a:stretch>
-            <a:fillRect/>
-          </a:stretch>
-        </p:blipFill>
-        <p:spPr>
-          <a:xfrm>
-            <a:off x="506654" y="931247"/>
-            <a:ext cx="407746" cy="407746"/>
-          </a:xfrm>
-          <a:prstGeom prst="rect">
-            <a:avLst/>
-          </a:prstGeom>
-        </p:spPr>
-      </p:pic>
+      <p:grpSp>
+        <p:nvGrpSpPr>
+          <p:cNvPr id="26" name="Group 25">
+            <a:extLst>
+              <a:ext uri="{FF2B5EF4-FFF2-40B4-BE49-F238E27FC236}">
+                <a16:creationId xmlns:a16="http://schemas.microsoft.com/office/drawing/2014/main" id="{C7B0FA4C-875E-4B2B-AA0C-41566882B7E2}"/>
+              </a:ext>
+            </a:extLst>
+          </p:cNvPr>
+          <p:cNvGrpSpPr/>
+          <p:nvPr/>
+        </p:nvGrpSpPr>
+        <p:grpSpPr>
+          <a:xfrm>
+            <a:off x="5867400" y="6380528"/>
+            <a:ext cx="1524000" cy="358165"/>
+            <a:chOff x="4648200" y="6324600"/>
+            <a:chExt cx="1524000" cy="358165"/>
+          </a:xfrm>
+        </p:grpSpPr>
+        <p:sp>
+          <p:nvSpPr>
+            <p:cNvPr id="27" name="Rectangle 26">
+              <a:extLst>
+                <a:ext uri="{FF2B5EF4-FFF2-40B4-BE49-F238E27FC236}">
+                  <a16:creationId xmlns:a16="http://schemas.microsoft.com/office/drawing/2014/main" id="{9969480F-3B74-4CC4-8434-19572E987218}"/>
+                </a:ext>
+              </a:extLst>
+            </p:cNvPr>
+            <p:cNvSpPr/>
+            <p:nvPr/>
+          </p:nvSpPr>
+          <p:spPr>
+            <a:xfrm>
+              <a:off x="4648200" y="6324600"/>
+              <a:ext cx="1524000" cy="358165"/>
+            </a:xfrm>
+            <a:prstGeom prst="rect">
+              <a:avLst/>
+            </a:prstGeom>
+            <a:solidFill>
+              <a:srgbClr val="0070C0"/>
+            </a:solidFill>
+            <a:ln>
+              <a:noFill/>
+            </a:ln>
+          </p:spPr>
+          <p:style>
+            <a:lnRef idx="2">
+              <a:schemeClr val="accent1">
+                <a:shade val="50000"/>
+              </a:schemeClr>
+            </a:lnRef>
+            <a:fillRef idx="1">
+              <a:schemeClr val="accent1"/>
+            </a:fillRef>
+            <a:effectRef idx="0">
+              <a:schemeClr val="accent1"/>
+            </a:effectRef>
+            <a:fontRef idx="minor">
+              <a:schemeClr val="lt1"/>
+            </a:fontRef>
+          </p:style>
+          <p:txBody>
+            <a:bodyPr rtlCol="0" anchor="ctr"/>
+            <a:lstStyle/>
+            <a:p>
+              <a:pPr algn="r"/>
+              <a:r>
+                <a:rPr lang="en-US" dirty="0">
+                  <a:latin typeface="+mj-lt"/>
+                </a:rPr>
+                <a:t>In </a:t>
+              </a:r>
+              <a:r>
+                <a:rPr lang="en-US" dirty="0" err="1">
+                  <a:latin typeface="+mj-lt"/>
+                </a:rPr>
+                <a:t>công</a:t>
+              </a:r>
+              <a:r>
+                <a:rPr lang="en-US" dirty="0">
+                  <a:latin typeface="+mj-lt"/>
+                </a:rPr>
+                <a:t> </a:t>
+              </a:r>
+              <a:r>
+                <a:rPr lang="en-US" dirty="0" err="1">
+                  <a:latin typeface="+mj-lt"/>
+                </a:rPr>
+                <a:t>nợ</a:t>
+              </a:r>
+              <a:endParaRPr lang="en-US" dirty="0">
+                <a:latin typeface="+mj-lt"/>
+              </a:endParaRPr>
+            </a:p>
+          </p:txBody>
+        </p:sp>
+        <p:pic>
+          <p:nvPicPr>
+            <p:cNvPr id="28" name="Picture 27">
+              <a:extLst>
+                <a:ext uri="{FF2B5EF4-FFF2-40B4-BE49-F238E27FC236}">
+                  <a16:creationId xmlns:a16="http://schemas.microsoft.com/office/drawing/2014/main" id="{203CB132-6C52-4CF5-8E55-A5968F1397A1}"/>
+                </a:ext>
+              </a:extLst>
+            </p:cNvPr>
+            <p:cNvPicPr>
+              <a:picLocks noChangeAspect="1"/>
+            </p:cNvPicPr>
+            <p:nvPr/>
+          </p:nvPicPr>
+          <p:blipFill>
+            <a:blip r:embed="rId5" cstate="print">
+              <a:extLst>
+                <a:ext uri="{28A0092B-C50C-407E-A947-70E740481C1C}">
+                  <a14:useLocalDpi xmlns:a14="http://schemas.microsoft.com/office/drawing/2010/main" val="0"/>
+                </a:ext>
+              </a:extLst>
+            </a:blip>
+            <a:stretch>
+              <a:fillRect/>
+            </a:stretch>
+          </p:blipFill>
+          <p:spPr>
+            <a:xfrm>
+              <a:off x="4786086" y="6374785"/>
+              <a:ext cx="263732" cy="263732"/>
+            </a:xfrm>
+            <a:prstGeom prst="rect">
+              <a:avLst/>
+            </a:prstGeom>
+          </p:spPr>
+        </p:pic>
+      </p:grpSp>
     </p:spTree>
     <p:extLst>
       <p:ext uri="{BB962C8B-B14F-4D97-AF65-F5344CB8AC3E}">

</xml_diff>

<commit_message>
[AppFeature] Implement AddOtherPaymentPage, Show invoice button of OtherPaymentsManagementPage
Signed-off-by: PhuocTran95 <nguyenbaphuoctran@gmail.com>
Change-Id: I2ce377b4366cf08badeca375c72e0fd55e084d75
</commit_message>
<xml_diff>
--- a/Pharmacy/UXUI/PagesUI.pptx
+++ b/Pharmacy/UXUI/PagesUI.pptx
@@ -235,7 +235,7 @@
           <a:p>
             <a:fld id="{E193EC3E-9EBC-4FB4-91A0-D81688C87301}" type="datetimeFigureOut">
               <a:rPr lang="en-US" smtClean="0"/>
-              <a:t>2/8/2021</a:t>
+              <a:t>2/21/2021</a:t>
             </a:fld>
             <a:endParaRPr lang="en-US"/>
           </a:p>
@@ -1605,7 +1605,7 @@
           <a:p>
             <a:fld id="{EA91886C-002B-40DC-BBAF-4CA608631BA0}" type="datetimeFigureOut">
               <a:rPr lang="en-US" smtClean="0"/>
-              <a:t>2/8/2021</a:t>
+              <a:t>2/21/2021</a:t>
             </a:fld>
             <a:endParaRPr lang="en-US"/>
           </a:p>
@@ -1773,7 +1773,7 @@
           <a:p>
             <a:fld id="{EA91886C-002B-40DC-BBAF-4CA608631BA0}" type="datetimeFigureOut">
               <a:rPr lang="en-US" smtClean="0"/>
-              <a:t>2/8/2021</a:t>
+              <a:t>2/21/2021</a:t>
             </a:fld>
             <a:endParaRPr lang="en-US"/>
           </a:p>
@@ -1951,7 +1951,7 @@
           <a:p>
             <a:fld id="{EA91886C-002B-40DC-BBAF-4CA608631BA0}" type="datetimeFigureOut">
               <a:rPr lang="en-US" smtClean="0"/>
-              <a:t>2/8/2021</a:t>
+              <a:t>2/21/2021</a:t>
             </a:fld>
             <a:endParaRPr lang="en-US"/>
           </a:p>
@@ -2119,7 +2119,7 @@
           <a:p>
             <a:fld id="{EA91886C-002B-40DC-BBAF-4CA608631BA0}" type="datetimeFigureOut">
               <a:rPr lang="en-US" smtClean="0"/>
-              <a:t>2/8/2021</a:t>
+              <a:t>2/21/2021</a:t>
             </a:fld>
             <a:endParaRPr lang="en-US"/>
           </a:p>
@@ -2364,7 +2364,7 @@
           <a:p>
             <a:fld id="{EA91886C-002B-40DC-BBAF-4CA608631BA0}" type="datetimeFigureOut">
               <a:rPr lang="en-US" smtClean="0"/>
-              <a:t>2/8/2021</a:t>
+              <a:t>2/21/2021</a:t>
             </a:fld>
             <a:endParaRPr lang="en-US"/>
           </a:p>
@@ -2649,7 +2649,7 @@
           <a:p>
             <a:fld id="{EA91886C-002B-40DC-BBAF-4CA608631BA0}" type="datetimeFigureOut">
               <a:rPr lang="en-US" smtClean="0"/>
-              <a:t>2/8/2021</a:t>
+              <a:t>2/21/2021</a:t>
             </a:fld>
             <a:endParaRPr lang="en-US"/>
           </a:p>
@@ -3068,7 +3068,7 @@
           <a:p>
             <a:fld id="{EA91886C-002B-40DC-BBAF-4CA608631BA0}" type="datetimeFigureOut">
               <a:rPr lang="en-US" smtClean="0"/>
-              <a:t>2/8/2021</a:t>
+              <a:t>2/21/2021</a:t>
             </a:fld>
             <a:endParaRPr lang="en-US"/>
           </a:p>
@@ -3185,7 +3185,7 @@
           <a:p>
             <a:fld id="{EA91886C-002B-40DC-BBAF-4CA608631BA0}" type="datetimeFigureOut">
               <a:rPr lang="en-US" smtClean="0"/>
-              <a:t>2/8/2021</a:t>
+              <a:t>2/21/2021</a:t>
             </a:fld>
             <a:endParaRPr lang="en-US"/>
           </a:p>
@@ -3280,7 +3280,7 @@
           <a:p>
             <a:fld id="{EA91886C-002B-40DC-BBAF-4CA608631BA0}" type="datetimeFigureOut">
               <a:rPr lang="en-US" smtClean="0"/>
-              <a:t>2/8/2021</a:t>
+              <a:t>2/21/2021</a:t>
             </a:fld>
             <a:endParaRPr lang="en-US"/>
           </a:p>
@@ -3555,7 +3555,7 @@
           <a:p>
             <a:fld id="{EA91886C-002B-40DC-BBAF-4CA608631BA0}" type="datetimeFigureOut">
               <a:rPr lang="en-US" smtClean="0"/>
-              <a:t>2/8/2021</a:t>
+              <a:t>2/21/2021</a:t>
             </a:fld>
             <a:endParaRPr lang="en-US"/>
           </a:p>
@@ -3807,7 +3807,7 @@
           <a:p>
             <a:fld id="{EA91886C-002B-40DC-BBAF-4CA608631BA0}" type="datetimeFigureOut">
               <a:rPr lang="en-US" smtClean="0"/>
-              <a:t>2/8/2021</a:t>
+              <a:t>2/21/2021</a:t>
             </a:fld>
             <a:endParaRPr lang="en-US"/>
           </a:p>
@@ -4018,7 +4018,7 @@
           <a:p>
             <a:fld id="{EA91886C-002B-40DC-BBAF-4CA608631BA0}" type="datetimeFigureOut">
               <a:rPr lang="en-US" smtClean="0"/>
-              <a:t>2/8/2021</a:t>
+              <a:t>2/21/2021</a:t>
             </a:fld>
             <a:endParaRPr lang="en-US"/>
           </a:p>
@@ -34264,22 +34264,16 @@
           <a:p>
             <a:pPr algn="ctr"/>
             <a:r>
+              <a:rPr lang="en-US" dirty="0">
+                <a:latin typeface="+mj-lt"/>
+              </a:rPr>
+              <a:t>Quay </a:t>
+            </a:r>
+            <a:r>
               <a:rPr lang="en-US" dirty="0" err="1">
                 <a:latin typeface="+mj-lt"/>
               </a:rPr>
-              <a:t>Tạo</a:t>
-            </a:r>
-            <a:r>
-              <a:rPr lang="en-US" dirty="0">
-                <a:latin typeface="+mj-lt"/>
-              </a:rPr>
-              <a:t> </a:t>
-            </a:r>
-            <a:r>
-              <a:rPr lang="en-US" dirty="0" err="1">
-                <a:latin typeface="+mj-lt"/>
-              </a:rPr>
-              <a:t>mới</a:t>
+              <a:t>lại</a:t>
             </a:r>
             <a:endParaRPr lang="en-US" dirty="0">
               <a:latin typeface="+mj-lt"/>
@@ -34315,6 +34309,18 @@
           </a:bodyPr>
           <a:lstStyle/>
           <a:p>
+            <a:r>
+              <a:rPr lang="en-US" b="1" dirty="0" err="1">
+                <a:solidFill>
+                  <a:schemeClr val="tx1">
+                    <a:lumMod val="85000"/>
+                    <a:lumOff val="15000"/>
+                  </a:schemeClr>
+                </a:solidFill>
+                <a:latin typeface="+mj-lt"/>
+              </a:rPr>
+              <a:t>Thông</a:t>
+            </a:r>
             <a:r>
               <a:rPr lang="en-US" b="1" dirty="0">
                 <a:solidFill>
@@ -34325,7 +34331,7 @@
                 </a:solidFill>
                 <a:latin typeface="+mj-lt"/>
               </a:rPr>
-              <a:t>Thanh </a:t>
+              <a:t> tin </a:t>
             </a:r>
             <a:r>
               <a:rPr lang="en-US" b="1" dirty="0" err="1">
@@ -34337,7 +34343,7 @@
                 </a:solidFill>
                 <a:latin typeface="+mj-lt"/>
               </a:rPr>
-              <a:t>toán</a:t>
+              <a:t>thanh</a:t>
             </a:r>
             <a:r>
               <a:rPr lang="en-US" b="1" dirty="0">
@@ -34361,7 +34367,7 @@
                 </a:solidFill>
                 <a:latin typeface="+mj-lt"/>
               </a:rPr>
-              <a:t>khác</a:t>
+              <a:t>toán</a:t>
             </a:r>
             <a:endParaRPr lang="en-US" b="1" dirty="0">
               <a:solidFill>
@@ -34407,7 +34413,19 @@
               <a:rPr lang="en-US" sz="1200" dirty="0" err="1">
                 <a:latin typeface="+mj-lt"/>
               </a:rPr>
-              <a:t>Ngày</a:t>
+              <a:t>Thời</a:t>
+            </a:r>
+            <a:r>
+              <a:rPr lang="en-US" sz="1200" dirty="0">
+                <a:latin typeface="+mj-lt"/>
+              </a:rPr>
+              <a:t> </a:t>
+            </a:r>
+            <a:r>
+              <a:rPr lang="en-US" sz="1200" dirty="0" err="1">
+                <a:latin typeface="+mj-lt"/>
+              </a:rPr>
+              <a:t>gian</a:t>
             </a:r>
             <a:r>
               <a:rPr lang="en-US" sz="1200" dirty="0">
@@ -34519,95 +34537,6 @@
               <a:t>Lưu</a:t>
             </a:r>
             <a:endParaRPr lang="en-US" dirty="0">
-              <a:latin typeface="+mj-lt"/>
-            </a:endParaRPr>
-          </a:p>
-        </p:txBody>
-      </p:sp>
-      <p:sp>
-        <p:nvSpPr>
-          <p:cNvPr id="61" name="TextBox 60">
-            <a:extLst>
-              <a:ext uri="{FF2B5EF4-FFF2-40B4-BE49-F238E27FC236}">
-                <a16:creationId xmlns:a16="http://schemas.microsoft.com/office/drawing/2014/main" id="{AB7A2275-3A78-4F02-BC15-060236729553}"/>
-              </a:ext>
-            </a:extLst>
-          </p:cNvPr>
-          <p:cNvSpPr txBox="1"/>
-          <p:nvPr/>
-        </p:nvSpPr>
-        <p:spPr>
-          <a:xfrm>
-            <a:off x="5257800" y="1446614"/>
-            <a:ext cx="990600" cy="276999"/>
-          </a:xfrm>
-          <a:prstGeom prst="rect">
-            <a:avLst/>
-          </a:prstGeom>
-          <a:noFill/>
-        </p:spPr>
-        <p:txBody>
-          <a:bodyPr wrap="square" rtlCol="0">
-            <a:spAutoFit/>
-          </a:bodyPr>
-          <a:lstStyle/>
-          <a:p>
-            <a:r>
-              <a:rPr lang="en-US" sz="1200" dirty="0" err="1">
-                <a:latin typeface="+mj-lt"/>
-              </a:rPr>
-              <a:t>Giờ</a:t>
-            </a:r>
-            <a:r>
-              <a:rPr lang="en-US" sz="1200" dirty="0">
-                <a:latin typeface="+mj-lt"/>
-              </a:rPr>
-              <a:t>:*</a:t>
-            </a:r>
-          </a:p>
-        </p:txBody>
-      </p:sp>
-      <p:sp>
-        <p:nvSpPr>
-          <p:cNvPr id="62" name="Rectangle 61">
-            <a:extLst>
-              <a:ext uri="{FF2B5EF4-FFF2-40B4-BE49-F238E27FC236}">
-                <a16:creationId xmlns:a16="http://schemas.microsoft.com/office/drawing/2014/main" id="{2975F9AD-5639-41AB-98F4-000F7727A8E2}"/>
-              </a:ext>
-            </a:extLst>
-          </p:cNvPr>
-          <p:cNvSpPr/>
-          <p:nvPr/>
-        </p:nvSpPr>
-        <p:spPr>
-          <a:xfrm>
-            <a:off x="5775896" y="1446614"/>
-            <a:ext cx="2987104" cy="261554"/>
-          </a:xfrm>
-          <a:prstGeom prst="rect">
-            <a:avLst/>
-          </a:prstGeom>
-        </p:spPr>
-        <p:style>
-          <a:lnRef idx="2">
-            <a:schemeClr val="dk1"/>
-          </a:lnRef>
-          <a:fillRef idx="1">
-            <a:schemeClr val="lt1"/>
-          </a:fillRef>
-          <a:effectRef idx="0">
-            <a:schemeClr val="dk1"/>
-          </a:effectRef>
-          <a:fontRef idx="minor">
-            <a:schemeClr val="dk1"/>
-          </a:fontRef>
-        </p:style>
-        <p:txBody>
-          <a:bodyPr rtlCol="0" anchor="ctr"/>
-          <a:lstStyle/>
-          <a:p>
-            <a:pPr algn="ctr"/>
-            <a:endParaRPr lang="en-US">
               <a:latin typeface="+mj-lt"/>
             </a:endParaRPr>
           </a:p>

</xml_diff>